<commit_message>
FROM SCRATCH VERSION 2
Nouvelle conception objet simplifiée.
</commit_message>
<xml_diff>
--- a/docs/brouillons.pptx
+++ b/docs/brouillons.pptx
@@ -15,6 +15,16 @@
     <p:sldId id="262" r:id="rId9"/>
     <p:sldId id="263" r:id="rId10"/>
     <p:sldId id="264" r:id="rId11"/>
+    <p:sldId id="266" r:id="rId12"/>
+    <p:sldId id="267" r:id="rId13"/>
+    <p:sldId id="268" r:id="rId14"/>
+    <p:sldId id="275" r:id="rId15"/>
+    <p:sldId id="269" r:id="rId16"/>
+    <p:sldId id="270" r:id="rId17"/>
+    <p:sldId id="271" r:id="rId18"/>
+    <p:sldId id="272" r:id="rId19"/>
+    <p:sldId id="273" r:id="rId20"/>
+    <p:sldId id="274" r:id="rId21"/>
   </p:sldIdLst>
   <p:sldSz cx="12192000" cy="6858000"/>
   <p:notesSz cx="6858000" cy="9144000"/>
@@ -268,7 +278,7 @@
           <a:p>
             <a:fld id="{107AB83E-34B7-49CA-AD50-EEE4555425AC}" type="datetimeFigureOut">
               <a:rPr lang="fr-FR" smtClean="0"/>
-              <a:t>02/03/2023</a:t>
+              <a:t>09/03/2023</a:t>
             </a:fld>
             <a:endParaRPr lang="fr-FR"/>
           </a:p>
@@ -466,7 +476,7 @@
           <a:p>
             <a:fld id="{107AB83E-34B7-49CA-AD50-EEE4555425AC}" type="datetimeFigureOut">
               <a:rPr lang="fr-FR" smtClean="0"/>
-              <a:t>02/03/2023</a:t>
+              <a:t>09/03/2023</a:t>
             </a:fld>
             <a:endParaRPr lang="fr-FR"/>
           </a:p>
@@ -674,7 +684,7 @@
           <a:p>
             <a:fld id="{107AB83E-34B7-49CA-AD50-EEE4555425AC}" type="datetimeFigureOut">
               <a:rPr lang="fr-FR" smtClean="0"/>
-              <a:t>02/03/2023</a:t>
+              <a:t>09/03/2023</a:t>
             </a:fld>
             <a:endParaRPr lang="fr-FR"/>
           </a:p>
@@ -872,7 +882,7 @@
           <a:p>
             <a:fld id="{107AB83E-34B7-49CA-AD50-EEE4555425AC}" type="datetimeFigureOut">
               <a:rPr lang="fr-FR" smtClean="0"/>
-              <a:t>02/03/2023</a:t>
+              <a:t>09/03/2023</a:t>
             </a:fld>
             <a:endParaRPr lang="fr-FR"/>
           </a:p>
@@ -1147,7 +1157,7 @@
           <a:p>
             <a:fld id="{107AB83E-34B7-49CA-AD50-EEE4555425AC}" type="datetimeFigureOut">
               <a:rPr lang="fr-FR" smtClean="0"/>
-              <a:t>02/03/2023</a:t>
+              <a:t>09/03/2023</a:t>
             </a:fld>
             <a:endParaRPr lang="fr-FR"/>
           </a:p>
@@ -1412,7 +1422,7 @@
           <a:p>
             <a:fld id="{107AB83E-34B7-49CA-AD50-EEE4555425AC}" type="datetimeFigureOut">
               <a:rPr lang="fr-FR" smtClean="0"/>
-              <a:t>02/03/2023</a:t>
+              <a:t>09/03/2023</a:t>
             </a:fld>
             <a:endParaRPr lang="fr-FR"/>
           </a:p>
@@ -1824,7 +1834,7 @@
           <a:p>
             <a:fld id="{107AB83E-34B7-49CA-AD50-EEE4555425AC}" type="datetimeFigureOut">
               <a:rPr lang="fr-FR" smtClean="0"/>
-              <a:t>02/03/2023</a:t>
+              <a:t>09/03/2023</a:t>
             </a:fld>
             <a:endParaRPr lang="fr-FR"/>
           </a:p>
@@ -1965,7 +1975,7 @@
           <a:p>
             <a:fld id="{107AB83E-34B7-49CA-AD50-EEE4555425AC}" type="datetimeFigureOut">
               <a:rPr lang="fr-FR" smtClean="0"/>
-              <a:t>02/03/2023</a:t>
+              <a:t>09/03/2023</a:t>
             </a:fld>
             <a:endParaRPr lang="fr-FR"/>
           </a:p>
@@ -2078,7 +2088,7 @@
           <a:p>
             <a:fld id="{107AB83E-34B7-49CA-AD50-EEE4555425AC}" type="datetimeFigureOut">
               <a:rPr lang="fr-FR" smtClean="0"/>
-              <a:t>02/03/2023</a:t>
+              <a:t>09/03/2023</a:t>
             </a:fld>
             <a:endParaRPr lang="fr-FR"/>
           </a:p>
@@ -2389,7 +2399,7 @@
           <a:p>
             <a:fld id="{107AB83E-34B7-49CA-AD50-EEE4555425AC}" type="datetimeFigureOut">
               <a:rPr lang="fr-FR" smtClean="0"/>
-              <a:t>02/03/2023</a:t>
+              <a:t>09/03/2023</a:t>
             </a:fld>
             <a:endParaRPr lang="fr-FR"/>
           </a:p>
@@ -2677,7 +2687,7 @@
           <a:p>
             <a:fld id="{107AB83E-34B7-49CA-AD50-EEE4555425AC}" type="datetimeFigureOut">
               <a:rPr lang="fr-FR" smtClean="0"/>
-              <a:t>02/03/2023</a:t>
+              <a:t>09/03/2023</a:t>
             </a:fld>
             <a:endParaRPr lang="fr-FR"/>
           </a:p>
@@ -2918,7 +2928,7 @@
           <a:p>
             <a:fld id="{107AB83E-34B7-49CA-AD50-EEE4555425AC}" type="datetimeFigureOut">
               <a:rPr lang="fr-FR" smtClean="0"/>
-              <a:t>02/03/2023</a:t>
+              <a:t>09/03/2023</a:t>
             </a:fld>
             <a:endParaRPr lang="fr-FR"/>
           </a:p>
@@ -3972,6 +3982,4177 @@
 </p:sld>
 </file>
 
+<file path=ppt/slides/slide11.xml><?xml version="1.0" encoding="utf-8"?>
+<p:sld xmlns:a="http://schemas.openxmlformats.org/drawingml/2006/main" xmlns:r="http://schemas.openxmlformats.org/officeDocument/2006/relationships" xmlns:p="http://schemas.openxmlformats.org/presentationml/2006/main">
+  <p:cSld>
+    <p:spTree>
+      <p:nvGrpSpPr>
+        <p:cNvPr id="1" name=""/>
+        <p:cNvGrpSpPr/>
+        <p:nvPr/>
+      </p:nvGrpSpPr>
+      <p:grpSpPr>
+        <a:xfrm>
+          <a:off x="0" y="0"/>
+          <a:ext cx="0" cy="0"/>
+          <a:chOff x="0" y="0"/>
+          <a:chExt cx="0" cy="0"/>
+        </a:xfrm>
+      </p:grpSpPr>
+      <p:pic>
+        <p:nvPicPr>
+          <p:cNvPr id="4" name="Image 3">
+            <a:extLst>
+              <a:ext uri="{FF2B5EF4-FFF2-40B4-BE49-F238E27FC236}">
+                <a16:creationId xmlns:a16="http://schemas.microsoft.com/office/drawing/2014/main" id="{9A61CA58-EA09-D319-230D-82917BA4C6E4}"/>
+              </a:ext>
+            </a:extLst>
+          </p:cNvPr>
+          <p:cNvPicPr>
+            <a:picLocks noChangeAspect="1"/>
+          </p:cNvPicPr>
+          <p:nvPr/>
+        </p:nvPicPr>
+        <p:blipFill rotWithShape="1">
+          <a:blip r:embed="rId2"/>
+          <a:srcRect l="441" r="1"/>
+          <a:stretch/>
+        </p:blipFill>
+        <p:spPr>
+          <a:xfrm rot="16200000">
+            <a:off x="-72055" y="1644130"/>
+            <a:ext cx="2422001" cy="1440000"/>
+          </a:xfrm>
+          <a:prstGeom prst="rect">
+            <a:avLst/>
+          </a:prstGeom>
+        </p:spPr>
+      </p:pic>
+      <p:pic>
+        <p:nvPicPr>
+          <p:cNvPr id="20" name="Image 19">
+            <a:extLst>
+              <a:ext uri="{FF2B5EF4-FFF2-40B4-BE49-F238E27FC236}">
+                <a16:creationId xmlns:a16="http://schemas.microsoft.com/office/drawing/2014/main" id="{9402C1CB-E635-BE7F-45A6-080E161FBAE0}"/>
+              </a:ext>
+            </a:extLst>
+          </p:cNvPr>
+          <p:cNvPicPr>
+            <a:picLocks noChangeAspect="1"/>
+          </p:cNvPicPr>
+          <p:nvPr/>
+        </p:nvPicPr>
+        <p:blipFill>
+          <a:blip r:embed="rId3"/>
+          <a:stretch>
+            <a:fillRect/>
+          </a:stretch>
+        </p:blipFill>
+        <p:spPr>
+          <a:xfrm rot="16200000">
+            <a:off x="4935532" y="1644129"/>
+            <a:ext cx="1440000" cy="1440000"/>
+          </a:xfrm>
+          <a:prstGeom prst="rect">
+            <a:avLst/>
+          </a:prstGeom>
+        </p:spPr>
+      </p:pic>
+      <p:pic>
+        <p:nvPicPr>
+          <p:cNvPr id="36" name="Image 35">
+            <a:extLst>
+              <a:ext uri="{FF2B5EF4-FFF2-40B4-BE49-F238E27FC236}">
+                <a16:creationId xmlns:a16="http://schemas.microsoft.com/office/drawing/2014/main" id="{2D741513-EA9A-D94F-5BE7-F4F773335E18}"/>
+              </a:ext>
+            </a:extLst>
+          </p:cNvPr>
+          <p:cNvPicPr>
+            <a:picLocks noChangeAspect="1"/>
+          </p:cNvPicPr>
+          <p:nvPr/>
+        </p:nvPicPr>
+        <p:blipFill>
+          <a:blip r:embed="rId4"/>
+          <a:stretch>
+            <a:fillRect/>
+          </a:stretch>
+        </p:blipFill>
+        <p:spPr>
+          <a:xfrm rot="16200000">
+            <a:off x="2316868" y="1644130"/>
+            <a:ext cx="2160740" cy="1440000"/>
+          </a:xfrm>
+          <a:prstGeom prst="rect">
+            <a:avLst/>
+          </a:prstGeom>
+        </p:spPr>
+      </p:pic>
+      <p:pic>
+        <p:nvPicPr>
+          <p:cNvPr id="54" name="Image 53">
+            <a:extLst>
+              <a:ext uri="{FF2B5EF4-FFF2-40B4-BE49-F238E27FC236}">
+                <a16:creationId xmlns:a16="http://schemas.microsoft.com/office/drawing/2014/main" id="{663DC639-10E0-D361-7B6E-B71DB898BE35}"/>
+              </a:ext>
+            </a:extLst>
+          </p:cNvPr>
+          <p:cNvPicPr>
+            <a:picLocks noChangeAspect="1"/>
+          </p:cNvPicPr>
+          <p:nvPr/>
+        </p:nvPicPr>
+        <p:blipFill>
+          <a:blip r:embed="rId5"/>
+          <a:stretch>
+            <a:fillRect/>
+          </a:stretch>
+        </p:blipFill>
+        <p:spPr>
+          <a:xfrm rot="16200000">
+            <a:off x="7193826" y="1644128"/>
+            <a:ext cx="1440000" cy="1440000"/>
+          </a:xfrm>
+          <a:prstGeom prst="rect">
+            <a:avLst/>
+          </a:prstGeom>
+        </p:spPr>
+      </p:pic>
+      <p:pic>
+        <p:nvPicPr>
+          <p:cNvPr id="55" name="Image 54">
+            <a:extLst>
+              <a:ext uri="{FF2B5EF4-FFF2-40B4-BE49-F238E27FC236}">
+                <a16:creationId xmlns:a16="http://schemas.microsoft.com/office/drawing/2014/main" id="{EBB732CC-1F99-22B1-B42B-3E83404D0143}"/>
+              </a:ext>
+            </a:extLst>
+          </p:cNvPr>
+          <p:cNvPicPr>
+            <a:picLocks noChangeAspect="1"/>
+          </p:cNvPicPr>
+          <p:nvPr/>
+        </p:nvPicPr>
+        <p:blipFill>
+          <a:blip r:embed="rId6"/>
+          <a:stretch>
+            <a:fillRect/>
+          </a:stretch>
+        </p:blipFill>
+        <p:spPr>
+          <a:xfrm rot="16200000">
+            <a:off x="11193982" y="1644128"/>
+            <a:ext cx="2472865" cy="1440000"/>
+          </a:xfrm>
+          <a:prstGeom prst="rect">
+            <a:avLst/>
+          </a:prstGeom>
+          <a:ln>
+            <a:solidFill>
+              <a:schemeClr val="tx1"/>
+            </a:solidFill>
+          </a:ln>
+        </p:spPr>
+      </p:pic>
+      <p:pic>
+        <p:nvPicPr>
+          <p:cNvPr id="57" name="Image 56">
+            <a:extLst>
+              <a:ext uri="{FF2B5EF4-FFF2-40B4-BE49-F238E27FC236}">
+                <a16:creationId xmlns:a16="http://schemas.microsoft.com/office/drawing/2014/main" id="{0E87D94F-4A66-2DEC-0BDA-2D59EE1787BB}"/>
+              </a:ext>
+            </a:extLst>
+          </p:cNvPr>
+          <p:cNvPicPr>
+            <a:picLocks noChangeAspect="1"/>
+          </p:cNvPicPr>
+          <p:nvPr/>
+        </p:nvPicPr>
+        <p:blipFill>
+          <a:blip r:embed="rId7"/>
+          <a:stretch>
+            <a:fillRect/>
+          </a:stretch>
+        </p:blipFill>
+        <p:spPr>
+          <a:xfrm rot="16200000">
+            <a:off x="9388403" y="1644128"/>
+            <a:ext cx="1567434" cy="1440000"/>
+          </a:xfrm>
+          <a:prstGeom prst="rect">
+            <a:avLst/>
+          </a:prstGeom>
+          <a:ln>
+            <a:solidFill>
+              <a:schemeClr val="tx1"/>
+            </a:solidFill>
+          </a:ln>
+        </p:spPr>
+      </p:pic>
+    </p:spTree>
+    <p:extLst>
+      <p:ext uri="{BB962C8B-B14F-4D97-AF65-F5344CB8AC3E}">
+        <p14:creationId xmlns:p14="http://schemas.microsoft.com/office/powerpoint/2010/main" val="3105177915"/>
+      </p:ext>
+    </p:extLst>
+  </p:cSld>
+  <p:clrMapOvr>
+    <a:masterClrMapping/>
+  </p:clrMapOvr>
+</p:sld>
+</file>
+
+<file path=ppt/slides/slide12.xml><?xml version="1.0" encoding="utf-8"?>
+<p:sld xmlns:a="http://schemas.openxmlformats.org/drawingml/2006/main" xmlns:r="http://schemas.openxmlformats.org/officeDocument/2006/relationships" xmlns:p="http://schemas.openxmlformats.org/presentationml/2006/main">
+  <p:cSld>
+    <p:spTree>
+      <p:nvGrpSpPr>
+        <p:cNvPr id="1" name=""/>
+        <p:cNvGrpSpPr/>
+        <p:nvPr/>
+      </p:nvGrpSpPr>
+      <p:grpSpPr>
+        <a:xfrm>
+          <a:off x="0" y="0"/>
+          <a:ext cx="0" cy="0"/>
+          <a:chOff x="0" y="0"/>
+          <a:chExt cx="0" cy="0"/>
+        </a:xfrm>
+      </p:grpSpPr>
+      <p:sp>
+        <p:nvSpPr>
+          <p:cNvPr id="20" name="Ellipse 19">
+            <a:extLst>
+              <a:ext uri="{FF2B5EF4-FFF2-40B4-BE49-F238E27FC236}">
+                <a16:creationId xmlns:a16="http://schemas.microsoft.com/office/drawing/2014/main" id="{4507DED6-DA40-B6C0-A302-26F3667A7DB0}"/>
+              </a:ext>
+            </a:extLst>
+          </p:cNvPr>
+          <p:cNvSpPr/>
+          <p:nvPr/>
+        </p:nvSpPr>
+        <p:spPr>
+          <a:xfrm>
+            <a:off x="1652272" y="486137"/>
+            <a:ext cx="720000" cy="720000"/>
+          </a:xfrm>
+          <a:prstGeom prst="ellipse">
+            <a:avLst/>
+          </a:prstGeom>
+          <a:solidFill>
+            <a:srgbClr val="FF0000"/>
+          </a:solidFill>
+          <a:ln>
+            <a:solidFill>
+              <a:schemeClr val="tx2">
+                <a:lumMod val="75000"/>
+              </a:schemeClr>
+            </a:solidFill>
+          </a:ln>
+        </p:spPr>
+        <p:style>
+          <a:lnRef idx="2">
+            <a:schemeClr val="accent1">
+              <a:shade val="50000"/>
+            </a:schemeClr>
+          </a:lnRef>
+          <a:fillRef idx="1">
+            <a:schemeClr val="accent1"/>
+          </a:fillRef>
+          <a:effectRef idx="0">
+            <a:schemeClr val="accent1"/>
+          </a:effectRef>
+          <a:fontRef idx="minor">
+            <a:schemeClr val="lt1"/>
+          </a:fontRef>
+        </p:style>
+        <p:txBody>
+          <a:bodyPr rtlCol="0" anchor="ctr"/>
+          <a:lstStyle/>
+          <a:p>
+            <a:pPr algn="ctr"/>
+            <a:r>
+              <a:rPr lang="fr-FR" dirty="0">
+                <a:solidFill>
+                  <a:sysClr val="windowText" lastClr="000000"/>
+                </a:solidFill>
+              </a:rPr>
+              <a:t>A1</a:t>
+            </a:r>
+          </a:p>
+        </p:txBody>
+      </p:sp>
+      <p:sp>
+        <p:nvSpPr>
+          <p:cNvPr id="21" name="Ellipse 20">
+            <a:extLst>
+              <a:ext uri="{FF2B5EF4-FFF2-40B4-BE49-F238E27FC236}">
+                <a16:creationId xmlns:a16="http://schemas.microsoft.com/office/drawing/2014/main" id="{2E5BFC85-851F-28D6-8EA0-5A6C54ECEE6C}"/>
+              </a:ext>
+            </a:extLst>
+          </p:cNvPr>
+          <p:cNvSpPr/>
+          <p:nvPr/>
+        </p:nvSpPr>
+        <p:spPr>
+          <a:xfrm>
+            <a:off x="3694136" y="486137"/>
+            <a:ext cx="720000" cy="720000"/>
+          </a:xfrm>
+          <a:prstGeom prst="ellipse">
+            <a:avLst/>
+          </a:prstGeom>
+          <a:solidFill>
+            <a:srgbClr val="00B050"/>
+          </a:solidFill>
+          <a:ln>
+            <a:solidFill>
+              <a:schemeClr val="tx2">
+                <a:lumMod val="75000"/>
+              </a:schemeClr>
+            </a:solidFill>
+          </a:ln>
+        </p:spPr>
+        <p:style>
+          <a:lnRef idx="2">
+            <a:schemeClr val="accent1">
+              <a:shade val="50000"/>
+            </a:schemeClr>
+          </a:lnRef>
+          <a:fillRef idx="1">
+            <a:schemeClr val="accent1"/>
+          </a:fillRef>
+          <a:effectRef idx="0">
+            <a:schemeClr val="accent1"/>
+          </a:effectRef>
+          <a:fontRef idx="minor">
+            <a:schemeClr val="lt1"/>
+          </a:fontRef>
+        </p:style>
+        <p:txBody>
+          <a:bodyPr rtlCol="0" anchor="ctr"/>
+          <a:lstStyle/>
+          <a:p>
+            <a:pPr algn="ctr"/>
+            <a:r>
+              <a:rPr lang="fr-FR" dirty="0">
+                <a:solidFill>
+                  <a:sysClr val="windowText" lastClr="000000"/>
+                </a:solidFill>
+              </a:rPr>
+              <a:t>A2</a:t>
+            </a:r>
+          </a:p>
+        </p:txBody>
+      </p:sp>
+      <p:sp>
+        <p:nvSpPr>
+          <p:cNvPr id="22" name="Ellipse 21">
+            <a:extLst>
+              <a:ext uri="{FF2B5EF4-FFF2-40B4-BE49-F238E27FC236}">
+                <a16:creationId xmlns:a16="http://schemas.microsoft.com/office/drawing/2014/main" id="{E61543E8-6DFE-3295-2B6F-5B11BB78926B}"/>
+              </a:ext>
+            </a:extLst>
+          </p:cNvPr>
+          <p:cNvSpPr/>
+          <p:nvPr/>
+        </p:nvSpPr>
+        <p:spPr>
+          <a:xfrm>
+            <a:off x="5736000" y="486137"/>
+            <a:ext cx="720000" cy="720000"/>
+          </a:xfrm>
+          <a:prstGeom prst="ellipse">
+            <a:avLst/>
+          </a:prstGeom>
+          <a:solidFill>
+            <a:schemeClr val="bg1"/>
+          </a:solidFill>
+          <a:ln>
+            <a:solidFill>
+              <a:schemeClr val="tx2">
+                <a:lumMod val="75000"/>
+              </a:schemeClr>
+            </a:solidFill>
+          </a:ln>
+        </p:spPr>
+        <p:style>
+          <a:lnRef idx="2">
+            <a:schemeClr val="accent1">
+              <a:shade val="50000"/>
+            </a:schemeClr>
+          </a:lnRef>
+          <a:fillRef idx="1">
+            <a:schemeClr val="accent1"/>
+          </a:fillRef>
+          <a:effectRef idx="0">
+            <a:schemeClr val="accent1"/>
+          </a:effectRef>
+          <a:fontRef idx="minor">
+            <a:schemeClr val="lt1"/>
+          </a:fontRef>
+        </p:style>
+        <p:txBody>
+          <a:bodyPr rtlCol="0" anchor="ctr"/>
+          <a:lstStyle/>
+          <a:p>
+            <a:pPr algn="ctr"/>
+            <a:r>
+              <a:rPr lang="fr-FR" dirty="0">
+                <a:solidFill>
+                  <a:sysClr val="windowText" lastClr="000000"/>
+                </a:solidFill>
+              </a:rPr>
+              <a:t>A3</a:t>
+            </a:r>
+          </a:p>
+        </p:txBody>
+      </p:sp>
+      <p:sp>
+        <p:nvSpPr>
+          <p:cNvPr id="23" name="Ellipse 22">
+            <a:extLst>
+              <a:ext uri="{FF2B5EF4-FFF2-40B4-BE49-F238E27FC236}">
+                <a16:creationId xmlns:a16="http://schemas.microsoft.com/office/drawing/2014/main" id="{66E61DDE-FF1C-0A1E-52CE-427836B22692}"/>
+              </a:ext>
+            </a:extLst>
+          </p:cNvPr>
+          <p:cNvSpPr/>
+          <p:nvPr/>
+        </p:nvSpPr>
+        <p:spPr>
+          <a:xfrm>
+            <a:off x="7777864" y="486137"/>
+            <a:ext cx="720000" cy="720000"/>
+          </a:xfrm>
+          <a:prstGeom prst="ellipse">
+            <a:avLst/>
+          </a:prstGeom>
+          <a:solidFill>
+            <a:schemeClr val="tx1"/>
+          </a:solidFill>
+          <a:ln>
+            <a:solidFill>
+              <a:schemeClr val="tx2">
+                <a:lumMod val="75000"/>
+              </a:schemeClr>
+            </a:solidFill>
+          </a:ln>
+        </p:spPr>
+        <p:style>
+          <a:lnRef idx="2">
+            <a:schemeClr val="accent1">
+              <a:shade val="50000"/>
+            </a:schemeClr>
+          </a:lnRef>
+          <a:fillRef idx="1">
+            <a:schemeClr val="accent1"/>
+          </a:fillRef>
+          <a:effectRef idx="0">
+            <a:schemeClr val="accent1"/>
+          </a:effectRef>
+          <a:fontRef idx="minor">
+            <a:schemeClr val="lt1"/>
+          </a:fontRef>
+        </p:style>
+        <p:txBody>
+          <a:bodyPr rtlCol="0" anchor="ctr"/>
+          <a:lstStyle/>
+          <a:p>
+            <a:pPr algn="ctr"/>
+            <a:r>
+              <a:rPr lang="fr-FR" dirty="0">
+                <a:solidFill>
+                  <a:sysClr val="windowText" lastClr="000000"/>
+                </a:solidFill>
+              </a:rPr>
+              <a:t>A4</a:t>
+            </a:r>
+          </a:p>
+        </p:txBody>
+      </p:sp>
+      <p:sp>
+        <p:nvSpPr>
+          <p:cNvPr id="24" name="Ellipse 23">
+            <a:extLst>
+              <a:ext uri="{FF2B5EF4-FFF2-40B4-BE49-F238E27FC236}">
+                <a16:creationId xmlns:a16="http://schemas.microsoft.com/office/drawing/2014/main" id="{1F0D24A7-D77F-1927-6439-6372869A8FE1}"/>
+              </a:ext>
+            </a:extLst>
+          </p:cNvPr>
+          <p:cNvSpPr/>
+          <p:nvPr/>
+        </p:nvSpPr>
+        <p:spPr>
+          <a:xfrm>
+            <a:off x="9819728" y="486137"/>
+            <a:ext cx="720000" cy="720000"/>
+          </a:xfrm>
+          <a:prstGeom prst="ellipse">
+            <a:avLst/>
+          </a:prstGeom>
+          <a:solidFill>
+            <a:srgbClr val="FF0000"/>
+          </a:solidFill>
+          <a:ln>
+            <a:solidFill>
+              <a:schemeClr val="tx2">
+                <a:lumMod val="75000"/>
+              </a:schemeClr>
+            </a:solidFill>
+          </a:ln>
+        </p:spPr>
+        <p:style>
+          <a:lnRef idx="2">
+            <a:schemeClr val="accent1">
+              <a:shade val="50000"/>
+            </a:schemeClr>
+          </a:lnRef>
+          <a:fillRef idx="1">
+            <a:schemeClr val="accent1"/>
+          </a:fillRef>
+          <a:effectRef idx="0">
+            <a:schemeClr val="accent1"/>
+          </a:effectRef>
+          <a:fontRef idx="minor">
+            <a:schemeClr val="lt1"/>
+          </a:fontRef>
+        </p:style>
+        <p:txBody>
+          <a:bodyPr rtlCol="0" anchor="ctr"/>
+          <a:lstStyle/>
+          <a:p>
+            <a:pPr algn="ctr"/>
+            <a:r>
+              <a:rPr lang="fr-FR" dirty="0">
+                <a:solidFill>
+                  <a:sysClr val="windowText" lastClr="000000"/>
+                </a:solidFill>
+              </a:rPr>
+              <a:t>A5</a:t>
+            </a:r>
+          </a:p>
+        </p:txBody>
+      </p:sp>
+      <p:cxnSp>
+        <p:nvCxnSpPr>
+          <p:cNvPr id="40" name="Connecteur droit avec flèche 39">
+            <a:extLst>
+              <a:ext uri="{FF2B5EF4-FFF2-40B4-BE49-F238E27FC236}">
+                <a16:creationId xmlns:a16="http://schemas.microsoft.com/office/drawing/2014/main" id="{36784693-526B-0EA1-5B3E-B2311A3F350E}"/>
+              </a:ext>
+            </a:extLst>
+          </p:cNvPr>
+          <p:cNvCxnSpPr>
+            <a:cxnSpLocks/>
+            <a:stCxn id="20" idx="6"/>
+            <a:endCxn id="21" idx="2"/>
+          </p:cNvCxnSpPr>
+          <p:nvPr/>
+        </p:nvCxnSpPr>
+        <p:spPr>
+          <a:xfrm>
+            <a:off x="2372272" y="846137"/>
+            <a:ext cx="1321864" cy="0"/>
+          </a:xfrm>
+          <a:prstGeom prst="straightConnector1">
+            <a:avLst/>
+          </a:prstGeom>
+          <a:ln w="38100">
+            <a:solidFill>
+              <a:schemeClr val="tx2"/>
+            </a:solidFill>
+            <a:headEnd type="triangle"/>
+            <a:tailEnd type="triangle"/>
+          </a:ln>
+        </p:spPr>
+        <p:style>
+          <a:lnRef idx="1">
+            <a:schemeClr val="accent1"/>
+          </a:lnRef>
+          <a:fillRef idx="0">
+            <a:schemeClr val="accent1"/>
+          </a:fillRef>
+          <a:effectRef idx="0">
+            <a:schemeClr val="accent1"/>
+          </a:effectRef>
+          <a:fontRef idx="minor">
+            <a:schemeClr val="tx1"/>
+          </a:fontRef>
+        </p:style>
+      </p:cxnSp>
+      <p:cxnSp>
+        <p:nvCxnSpPr>
+          <p:cNvPr id="43" name="Connecteur droit avec flèche 42">
+            <a:extLst>
+              <a:ext uri="{FF2B5EF4-FFF2-40B4-BE49-F238E27FC236}">
+                <a16:creationId xmlns:a16="http://schemas.microsoft.com/office/drawing/2014/main" id="{DF90C88E-2C0B-5DA0-EDFF-321C2406D8FF}"/>
+              </a:ext>
+            </a:extLst>
+          </p:cNvPr>
+          <p:cNvCxnSpPr>
+            <a:cxnSpLocks/>
+          </p:cNvCxnSpPr>
+          <p:nvPr/>
+        </p:nvCxnSpPr>
+        <p:spPr>
+          <a:xfrm>
+            <a:off x="4414136" y="846137"/>
+            <a:ext cx="1321864" cy="0"/>
+          </a:xfrm>
+          <a:prstGeom prst="straightConnector1">
+            <a:avLst/>
+          </a:prstGeom>
+          <a:ln w="38100">
+            <a:solidFill>
+              <a:schemeClr val="tx2"/>
+            </a:solidFill>
+            <a:headEnd type="triangle"/>
+            <a:tailEnd type="triangle"/>
+          </a:ln>
+        </p:spPr>
+        <p:style>
+          <a:lnRef idx="1">
+            <a:schemeClr val="accent1"/>
+          </a:lnRef>
+          <a:fillRef idx="0">
+            <a:schemeClr val="accent1"/>
+          </a:fillRef>
+          <a:effectRef idx="0">
+            <a:schemeClr val="accent1"/>
+          </a:effectRef>
+          <a:fontRef idx="minor">
+            <a:schemeClr val="tx1"/>
+          </a:fontRef>
+        </p:style>
+      </p:cxnSp>
+      <p:cxnSp>
+        <p:nvCxnSpPr>
+          <p:cNvPr id="44" name="Connecteur droit avec flèche 43">
+            <a:extLst>
+              <a:ext uri="{FF2B5EF4-FFF2-40B4-BE49-F238E27FC236}">
+                <a16:creationId xmlns:a16="http://schemas.microsoft.com/office/drawing/2014/main" id="{3F9B2246-3FD9-9219-94DB-B498A76B7286}"/>
+              </a:ext>
+            </a:extLst>
+          </p:cNvPr>
+          <p:cNvCxnSpPr>
+            <a:cxnSpLocks/>
+          </p:cNvCxnSpPr>
+          <p:nvPr/>
+        </p:nvCxnSpPr>
+        <p:spPr>
+          <a:xfrm>
+            <a:off x="6456000" y="846137"/>
+            <a:ext cx="1321864" cy="0"/>
+          </a:xfrm>
+          <a:prstGeom prst="straightConnector1">
+            <a:avLst/>
+          </a:prstGeom>
+          <a:ln w="38100">
+            <a:solidFill>
+              <a:schemeClr val="tx2"/>
+            </a:solidFill>
+            <a:headEnd type="triangle"/>
+            <a:tailEnd type="triangle"/>
+          </a:ln>
+        </p:spPr>
+        <p:style>
+          <a:lnRef idx="1">
+            <a:schemeClr val="accent1"/>
+          </a:lnRef>
+          <a:fillRef idx="0">
+            <a:schemeClr val="accent1"/>
+          </a:fillRef>
+          <a:effectRef idx="0">
+            <a:schemeClr val="accent1"/>
+          </a:effectRef>
+          <a:fontRef idx="minor">
+            <a:schemeClr val="tx1"/>
+          </a:fontRef>
+        </p:style>
+      </p:cxnSp>
+      <p:cxnSp>
+        <p:nvCxnSpPr>
+          <p:cNvPr id="45" name="Connecteur droit avec flèche 44">
+            <a:extLst>
+              <a:ext uri="{FF2B5EF4-FFF2-40B4-BE49-F238E27FC236}">
+                <a16:creationId xmlns:a16="http://schemas.microsoft.com/office/drawing/2014/main" id="{FA6D84C4-3F45-A8A6-6FD3-3BF5426F8895}"/>
+              </a:ext>
+            </a:extLst>
+          </p:cNvPr>
+          <p:cNvCxnSpPr>
+            <a:cxnSpLocks/>
+          </p:cNvCxnSpPr>
+          <p:nvPr/>
+        </p:nvCxnSpPr>
+        <p:spPr>
+          <a:xfrm>
+            <a:off x="8497864" y="846137"/>
+            <a:ext cx="1321864" cy="0"/>
+          </a:xfrm>
+          <a:prstGeom prst="straightConnector1">
+            <a:avLst/>
+          </a:prstGeom>
+          <a:ln w="38100">
+            <a:solidFill>
+              <a:schemeClr val="tx2"/>
+            </a:solidFill>
+            <a:headEnd type="triangle"/>
+            <a:tailEnd type="triangle"/>
+          </a:ln>
+        </p:spPr>
+        <p:style>
+          <a:lnRef idx="1">
+            <a:schemeClr val="accent1"/>
+          </a:lnRef>
+          <a:fillRef idx="0">
+            <a:schemeClr val="accent1"/>
+          </a:fillRef>
+          <a:effectRef idx="0">
+            <a:schemeClr val="accent1"/>
+          </a:effectRef>
+          <a:fontRef idx="minor">
+            <a:schemeClr val="tx1"/>
+          </a:fontRef>
+        </p:style>
+      </p:cxnSp>
+      <p:cxnSp>
+        <p:nvCxnSpPr>
+          <p:cNvPr id="46" name="Connecteur droit avec flèche 45">
+            <a:extLst>
+              <a:ext uri="{FF2B5EF4-FFF2-40B4-BE49-F238E27FC236}">
+                <a16:creationId xmlns:a16="http://schemas.microsoft.com/office/drawing/2014/main" id="{78F79A22-D783-7AD4-4A21-D563053160B8}"/>
+              </a:ext>
+            </a:extLst>
+          </p:cNvPr>
+          <p:cNvCxnSpPr>
+            <a:cxnSpLocks/>
+            <a:stCxn id="20" idx="4"/>
+          </p:cNvCxnSpPr>
+          <p:nvPr/>
+        </p:nvCxnSpPr>
+        <p:spPr>
+          <a:xfrm>
+            <a:off x="2012272" y="1206137"/>
+            <a:ext cx="0" cy="990587"/>
+          </a:xfrm>
+          <a:prstGeom prst="straightConnector1">
+            <a:avLst/>
+          </a:prstGeom>
+          <a:ln w="38100">
+            <a:solidFill>
+              <a:schemeClr val="tx2"/>
+            </a:solidFill>
+            <a:headEnd type="triangle"/>
+            <a:tailEnd type="triangle"/>
+          </a:ln>
+        </p:spPr>
+        <p:style>
+          <a:lnRef idx="1">
+            <a:schemeClr val="accent1"/>
+          </a:lnRef>
+          <a:fillRef idx="0">
+            <a:schemeClr val="accent1"/>
+          </a:fillRef>
+          <a:effectRef idx="0">
+            <a:schemeClr val="accent1"/>
+          </a:effectRef>
+          <a:fontRef idx="minor">
+            <a:schemeClr val="tx1"/>
+          </a:fontRef>
+        </p:style>
+      </p:cxnSp>
+      <p:cxnSp>
+        <p:nvCxnSpPr>
+          <p:cNvPr id="49" name="Connecteur droit avec flèche 48">
+            <a:extLst>
+              <a:ext uri="{FF2B5EF4-FFF2-40B4-BE49-F238E27FC236}">
+                <a16:creationId xmlns:a16="http://schemas.microsoft.com/office/drawing/2014/main" id="{A406EAE6-8ECD-4D3C-178B-8C9D2ABD13F5}"/>
+              </a:ext>
+            </a:extLst>
+          </p:cNvPr>
+          <p:cNvCxnSpPr>
+            <a:cxnSpLocks/>
+          </p:cNvCxnSpPr>
+          <p:nvPr/>
+        </p:nvCxnSpPr>
+        <p:spPr>
+          <a:xfrm>
+            <a:off x="4065917" y="1206137"/>
+            <a:ext cx="0" cy="990587"/>
+          </a:xfrm>
+          <a:prstGeom prst="straightConnector1">
+            <a:avLst/>
+          </a:prstGeom>
+          <a:ln w="38100">
+            <a:solidFill>
+              <a:schemeClr val="tx2"/>
+            </a:solidFill>
+            <a:headEnd type="triangle"/>
+            <a:tailEnd type="triangle"/>
+          </a:ln>
+        </p:spPr>
+        <p:style>
+          <a:lnRef idx="1">
+            <a:schemeClr val="accent1"/>
+          </a:lnRef>
+          <a:fillRef idx="0">
+            <a:schemeClr val="accent1"/>
+          </a:fillRef>
+          <a:effectRef idx="0">
+            <a:schemeClr val="accent1"/>
+          </a:effectRef>
+          <a:fontRef idx="minor">
+            <a:schemeClr val="tx1"/>
+          </a:fontRef>
+        </p:style>
+      </p:cxnSp>
+      <p:cxnSp>
+        <p:nvCxnSpPr>
+          <p:cNvPr id="50" name="Connecteur droit avec flèche 49">
+            <a:extLst>
+              <a:ext uri="{FF2B5EF4-FFF2-40B4-BE49-F238E27FC236}">
+                <a16:creationId xmlns:a16="http://schemas.microsoft.com/office/drawing/2014/main" id="{034BD7C8-05A9-6DB2-5F7A-04F98EEA61A3}"/>
+              </a:ext>
+            </a:extLst>
+          </p:cNvPr>
+          <p:cNvCxnSpPr>
+            <a:cxnSpLocks/>
+          </p:cNvCxnSpPr>
+          <p:nvPr/>
+        </p:nvCxnSpPr>
+        <p:spPr>
+          <a:xfrm>
+            <a:off x="6073057" y="1206137"/>
+            <a:ext cx="0" cy="990587"/>
+          </a:xfrm>
+          <a:prstGeom prst="straightConnector1">
+            <a:avLst/>
+          </a:prstGeom>
+          <a:ln w="38100">
+            <a:solidFill>
+              <a:schemeClr val="tx2"/>
+            </a:solidFill>
+            <a:headEnd type="triangle"/>
+            <a:tailEnd type="triangle"/>
+          </a:ln>
+        </p:spPr>
+        <p:style>
+          <a:lnRef idx="1">
+            <a:schemeClr val="accent1"/>
+          </a:lnRef>
+          <a:fillRef idx="0">
+            <a:schemeClr val="accent1"/>
+          </a:fillRef>
+          <a:effectRef idx="0">
+            <a:schemeClr val="accent1"/>
+          </a:effectRef>
+          <a:fontRef idx="minor">
+            <a:schemeClr val="tx1"/>
+          </a:fontRef>
+        </p:style>
+      </p:cxnSp>
+      <p:cxnSp>
+        <p:nvCxnSpPr>
+          <p:cNvPr id="51" name="Connecteur droit avec flèche 50">
+            <a:extLst>
+              <a:ext uri="{FF2B5EF4-FFF2-40B4-BE49-F238E27FC236}">
+                <a16:creationId xmlns:a16="http://schemas.microsoft.com/office/drawing/2014/main" id="{F2571F21-665D-FF90-51E0-F5060D739426}"/>
+              </a:ext>
+            </a:extLst>
+          </p:cNvPr>
+          <p:cNvCxnSpPr>
+            <a:cxnSpLocks/>
+          </p:cNvCxnSpPr>
+          <p:nvPr/>
+        </p:nvCxnSpPr>
+        <p:spPr>
+          <a:xfrm>
+            <a:off x="8137864" y="1206137"/>
+            <a:ext cx="0" cy="990587"/>
+          </a:xfrm>
+          <a:prstGeom prst="straightConnector1">
+            <a:avLst/>
+          </a:prstGeom>
+          <a:ln w="38100">
+            <a:solidFill>
+              <a:schemeClr val="tx2"/>
+            </a:solidFill>
+            <a:headEnd type="triangle"/>
+            <a:tailEnd type="triangle"/>
+          </a:ln>
+        </p:spPr>
+        <p:style>
+          <a:lnRef idx="1">
+            <a:schemeClr val="accent1"/>
+          </a:lnRef>
+          <a:fillRef idx="0">
+            <a:schemeClr val="accent1"/>
+          </a:fillRef>
+          <a:effectRef idx="0">
+            <a:schemeClr val="accent1"/>
+          </a:effectRef>
+          <a:fontRef idx="minor">
+            <a:schemeClr val="tx1"/>
+          </a:fontRef>
+        </p:style>
+      </p:cxnSp>
+      <p:cxnSp>
+        <p:nvCxnSpPr>
+          <p:cNvPr id="52" name="Connecteur droit avec flèche 51">
+            <a:extLst>
+              <a:ext uri="{FF2B5EF4-FFF2-40B4-BE49-F238E27FC236}">
+                <a16:creationId xmlns:a16="http://schemas.microsoft.com/office/drawing/2014/main" id="{F685125B-0B3A-372E-83F0-658FD7F1D14D}"/>
+              </a:ext>
+            </a:extLst>
+          </p:cNvPr>
+          <p:cNvCxnSpPr>
+            <a:cxnSpLocks/>
+          </p:cNvCxnSpPr>
+          <p:nvPr/>
+        </p:nvCxnSpPr>
+        <p:spPr>
+          <a:xfrm>
+            <a:off x="10179728" y="1206137"/>
+            <a:ext cx="0" cy="990587"/>
+          </a:xfrm>
+          <a:prstGeom prst="straightConnector1">
+            <a:avLst/>
+          </a:prstGeom>
+          <a:ln w="38100">
+            <a:solidFill>
+              <a:schemeClr val="tx2"/>
+            </a:solidFill>
+            <a:headEnd type="triangle"/>
+            <a:tailEnd type="triangle"/>
+          </a:ln>
+        </p:spPr>
+        <p:style>
+          <a:lnRef idx="1">
+            <a:schemeClr val="accent1"/>
+          </a:lnRef>
+          <a:fillRef idx="0">
+            <a:schemeClr val="accent1"/>
+          </a:fillRef>
+          <a:effectRef idx="0">
+            <a:schemeClr val="accent1"/>
+          </a:effectRef>
+          <a:fontRef idx="minor">
+            <a:schemeClr val="tx1"/>
+          </a:fontRef>
+        </p:style>
+      </p:cxnSp>
+      <p:cxnSp>
+        <p:nvCxnSpPr>
+          <p:cNvPr id="53" name="Connecteur droit avec flèche 52">
+            <a:extLst>
+              <a:ext uri="{FF2B5EF4-FFF2-40B4-BE49-F238E27FC236}">
+                <a16:creationId xmlns:a16="http://schemas.microsoft.com/office/drawing/2014/main" id="{F0953548-99C1-B6DB-C296-CC1A348ED585}"/>
+              </a:ext>
+            </a:extLst>
+          </p:cNvPr>
+          <p:cNvCxnSpPr>
+            <a:cxnSpLocks/>
+          </p:cNvCxnSpPr>
+          <p:nvPr/>
+        </p:nvCxnSpPr>
+        <p:spPr>
+          <a:xfrm>
+            <a:off x="2012272" y="2916724"/>
+            <a:ext cx="0" cy="990587"/>
+          </a:xfrm>
+          <a:prstGeom prst="straightConnector1">
+            <a:avLst/>
+          </a:prstGeom>
+          <a:ln w="38100">
+            <a:solidFill>
+              <a:schemeClr val="tx2"/>
+            </a:solidFill>
+            <a:headEnd type="triangle"/>
+            <a:tailEnd type="triangle"/>
+          </a:ln>
+        </p:spPr>
+        <p:style>
+          <a:lnRef idx="1">
+            <a:schemeClr val="accent1"/>
+          </a:lnRef>
+          <a:fillRef idx="0">
+            <a:schemeClr val="accent1"/>
+          </a:fillRef>
+          <a:effectRef idx="0">
+            <a:schemeClr val="accent1"/>
+          </a:effectRef>
+          <a:fontRef idx="minor">
+            <a:schemeClr val="tx1"/>
+          </a:fontRef>
+        </p:style>
+      </p:cxnSp>
+      <p:cxnSp>
+        <p:nvCxnSpPr>
+          <p:cNvPr id="54" name="Connecteur droit avec flèche 53">
+            <a:extLst>
+              <a:ext uri="{FF2B5EF4-FFF2-40B4-BE49-F238E27FC236}">
+                <a16:creationId xmlns:a16="http://schemas.microsoft.com/office/drawing/2014/main" id="{C99ED8FC-CDBC-C3DB-C18D-881E534A0B9E}"/>
+              </a:ext>
+            </a:extLst>
+          </p:cNvPr>
+          <p:cNvCxnSpPr>
+            <a:cxnSpLocks/>
+          </p:cNvCxnSpPr>
+          <p:nvPr/>
+        </p:nvCxnSpPr>
+        <p:spPr>
+          <a:xfrm>
+            <a:off x="4054136" y="2916723"/>
+            <a:ext cx="0" cy="990587"/>
+          </a:xfrm>
+          <a:prstGeom prst="straightConnector1">
+            <a:avLst/>
+          </a:prstGeom>
+          <a:ln w="38100">
+            <a:solidFill>
+              <a:schemeClr val="tx2"/>
+            </a:solidFill>
+            <a:headEnd type="triangle"/>
+            <a:tailEnd type="triangle"/>
+          </a:ln>
+        </p:spPr>
+        <p:style>
+          <a:lnRef idx="1">
+            <a:schemeClr val="accent1"/>
+          </a:lnRef>
+          <a:fillRef idx="0">
+            <a:schemeClr val="accent1"/>
+          </a:fillRef>
+          <a:effectRef idx="0">
+            <a:schemeClr val="accent1"/>
+          </a:effectRef>
+          <a:fontRef idx="minor">
+            <a:schemeClr val="tx1"/>
+          </a:fontRef>
+        </p:style>
+      </p:cxnSp>
+      <p:cxnSp>
+        <p:nvCxnSpPr>
+          <p:cNvPr id="55" name="Connecteur droit avec flèche 54">
+            <a:extLst>
+              <a:ext uri="{FF2B5EF4-FFF2-40B4-BE49-F238E27FC236}">
+                <a16:creationId xmlns:a16="http://schemas.microsoft.com/office/drawing/2014/main" id="{1B8C049A-9BAB-A9B5-2031-23EB820B9FC7}"/>
+              </a:ext>
+            </a:extLst>
+          </p:cNvPr>
+          <p:cNvCxnSpPr>
+            <a:cxnSpLocks/>
+          </p:cNvCxnSpPr>
+          <p:nvPr/>
+        </p:nvCxnSpPr>
+        <p:spPr>
+          <a:xfrm>
+            <a:off x="6096000" y="2916722"/>
+            <a:ext cx="0" cy="990587"/>
+          </a:xfrm>
+          <a:prstGeom prst="straightConnector1">
+            <a:avLst/>
+          </a:prstGeom>
+          <a:ln w="38100">
+            <a:solidFill>
+              <a:schemeClr val="tx2"/>
+            </a:solidFill>
+            <a:headEnd type="triangle"/>
+            <a:tailEnd type="triangle"/>
+          </a:ln>
+        </p:spPr>
+        <p:style>
+          <a:lnRef idx="1">
+            <a:schemeClr val="accent1"/>
+          </a:lnRef>
+          <a:fillRef idx="0">
+            <a:schemeClr val="accent1"/>
+          </a:fillRef>
+          <a:effectRef idx="0">
+            <a:schemeClr val="accent1"/>
+          </a:effectRef>
+          <a:fontRef idx="minor">
+            <a:schemeClr val="tx1"/>
+          </a:fontRef>
+        </p:style>
+      </p:cxnSp>
+      <p:cxnSp>
+        <p:nvCxnSpPr>
+          <p:cNvPr id="56" name="Connecteur droit avec flèche 55">
+            <a:extLst>
+              <a:ext uri="{FF2B5EF4-FFF2-40B4-BE49-F238E27FC236}">
+                <a16:creationId xmlns:a16="http://schemas.microsoft.com/office/drawing/2014/main" id="{82E04D41-B1F1-C382-C32A-348387BC2E2E}"/>
+              </a:ext>
+            </a:extLst>
+          </p:cNvPr>
+          <p:cNvCxnSpPr>
+            <a:cxnSpLocks/>
+          </p:cNvCxnSpPr>
+          <p:nvPr/>
+        </p:nvCxnSpPr>
+        <p:spPr>
+          <a:xfrm>
+            <a:off x="8137864" y="2916722"/>
+            <a:ext cx="0" cy="990587"/>
+          </a:xfrm>
+          <a:prstGeom prst="straightConnector1">
+            <a:avLst/>
+          </a:prstGeom>
+          <a:ln w="38100">
+            <a:solidFill>
+              <a:schemeClr val="tx2"/>
+            </a:solidFill>
+            <a:headEnd type="triangle"/>
+            <a:tailEnd type="triangle"/>
+          </a:ln>
+        </p:spPr>
+        <p:style>
+          <a:lnRef idx="1">
+            <a:schemeClr val="accent1"/>
+          </a:lnRef>
+          <a:fillRef idx="0">
+            <a:schemeClr val="accent1"/>
+          </a:fillRef>
+          <a:effectRef idx="0">
+            <a:schemeClr val="accent1"/>
+          </a:effectRef>
+          <a:fontRef idx="minor">
+            <a:schemeClr val="tx1"/>
+          </a:fontRef>
+        </p:style>
+      </p:cxnSp>
+      <p:cxnSp>
+        <p:nvCxnSpPr>
+          <p:cNvPr id="57" name="Connecteur droit avec flèche 56">
+            <a:extLst>
+              <a:ext uri="{FF2B5EF4-FFF2-40B4-BE49-F238E27FC236}">
+                <a16:creationId xmlns:a16="http://schemas.microsoft.com/office/drawing/2014/main" id="{C7A9051A-A31F-5FAF-5FF3-7433C7B1E846}"/>
+              </a:ext>
+            </a:extLst>
+          </p:cNvPr>
+          <p:cNvCxnSpPr>
+            <a:cxnSpLocks/>
+          </p:cNvCxnSpPr>
+          <p:nvPr/>
+        </p:nvCxnSpPr>
+        <p:spPr>
+          <a:xfrm>
+            <a:off x="10179728" y="2916722"/>
+            <a:ext cx="0" cy="990587"/>
+          </a:xfrm>
+          <a:prstGeom prst="straightConnector1">
+            <a:avLst/>
+          </a:prstGeom>
+          <a:ln w="38100">
+            <a:solidFill>
+              <a:schemeClr val="tx2"/>
+            </a:solidFill>
+            <a:headEnd type="triangle"/>
+            <a:tailEnd type="triangle"/>
+          </a:ln>
+        </p:spPr>
+        <p:style>
+          <a:lnRef idx="1">
+            <a:schemeClr val="accent1"/>
+          </a:lnRef>
+          <a:fillRef idx="0">
+            <a:schemeClr val="accent1"/>
+          </a:fillRef>
+          <a:effectRef idx="0">
+            <a:schemeClr val="accent1"/>
+          </a:effectRef>
+          <a:fontRef idx="minor">
+            <a:schemeClr val="tx1"/>
+          </a:fontRef>
+        </p:style>
+      </p:cxnSp>
+      <p:sp>
+        <p:nvSpPr>
+          <p:cNvPr id="58" name="Ellipse 57">
+            <a:extLst>
+              <a:ext uri="{FF2B5EF4-FFF2-40B4-BE49-F238E27FC236}">
+                <a16:creationId xmlns:a16="http://schemas.microsoft.com/office/drawing/2014/main" id="{282112DB-1E6C-DECB-FEF8-6A3F05555DC7}"/>
+              </a:ext>
+            </a:extLst>
+          </p:cNvPr>
+          <p:cNvSpPr/>
+          <p:nvPr/>
+        </p:nvSpPr>
+        <p:spPr>
+          <a:xfrm>
+            <a:off x="1652272" y="2196719"/>
+            <a:ext cx="720000" cy="720000"/>
+          </a:xfrm>
+          <a:prstGeom prst="ellipse">
+            <a:avLst/>
+          </a:prstGeom>
+          <a:noFill/>
+          <a:ln>
+            <a:solidFill>
+              <a:schemeClr val="tx2">
+                <a:lumMod val="75000"/>
+              </a:schemeClr>
+            </a:solidFill>
+          </a:ln>
+        </p:spPr>
+        <p:style>
+          <a:lnRef idx="2">
+            <a:schemeClr val="accent1">
+              <a:shade val="50000"/>
+            </a:schemeClr>
+          </a:lnRef>
+          <a:fillRef idx="1">
+            <a:schemeClr val="accent1"/>
+          </a:fillRef>
+          <a:effectRef idx="0">
+            <a:schemeClr val="accent1"/>
+          </a:effectRef>
+          <a:fontRef idx="minor">
+            <a:schemeClr val="lt1"/>
+          </a:fontRef>
+        </p:style>
+        <p:txBody>
+          <a:bodyPr rtlCol="0" anchor="ctr"/>
+          <a:lstStyle/>
+          <a:p>
+            <a:pPr algn="ctr"/>
+            <a:r>
+              <a:rPr lang="fr-FR" dirty="0">
+                <a:solidFill>
+                  <a:sysClr val="windowText" lastClr="000000"/>
+                </a:solidFill>
+              </a:rPr>
+              <a:t>B1</a:t>
+            </a:r>
+          </a:p>
+        </p:txBody>
+      </p:sp>
+      <p:sp>
+        <p:nvSpPr>
+          <p:cNvPr id="59" name="Ellipse 58">
+            <a:extLst>
+              <a:ext uri="{FF2B5EF4-FFF2-40B4-BE49-F238E27FC236}">
+                <a16:creationId xmlns:a16="http://schemas.microsoft.com/office/drawing/2014/main" id="{F4F4F011-FEFA-AFC2-6750-61AB65DDD10F}"/>
+              </a:ext>
+            </a:extLst>
+          </p:cNvPr>
+          <p:cNvSpPr/>
+          <p:nvPr/>
+        </p:nvSpPr>
+        <p:spPr>
+          <a:xfrm>
+            <a:off x="3694136" y="2196719"/>
+            <a:ext cx="720000" cy="720000"/>
+          </a:xfrm>
+          <a:prstGeom prst="ellipse">
+            <a:avLst/>
+          </a:prstGeom>
+          <a:solidFill>
+            <a:schemeClr val="tx1"/>
+          </a:solidFill>
+          <a:ln>
+            <a:solidFill>
+              <a:schemeClr val="tx1"/>
+            </a:solidFill>
+          </a:ln>
+        </p:spPr>
+        <p:style>
+          <a:lnRef idx="2">
+            <a:schemeClr val="accent1">
+              <a:shade val="50000"/>
+            </a:schemeClr>
+          </a:lnRef>
+          <a:fillRef idx="1">
+            <a:schemeClr val="accent1"/>
+          </a:fillRef>
+          <a:effectRef idx="0">
+            <a:schemeClr val="accent1"/>
+          </a:effectRef>
+          <a:fontRef idx="minor">
+            <a:schemeClr val="lt1"/>
+          </a:fontRef>
+        </p:style>
+        <p:txBody>
+          <a:bodyPr rtlCol="0" anchor="ctr"/>
+          <a:lstStyle/>
+          <a:p>
+            <a:pPr algn="ctr"/>
+            <a:r>
+              <a:rPr lang="fr-FR" dirty="0">
+                <a:solidFill>
+                  <a:sysClr val="windowText" lastClr="000000"/>
+                </a:solidFill>
+              </a:rPr>
+              <a:t>B2</a:t>
+            </a:r>
+          </a:p>
+        </p:txBody>
+      </p:sp>
+      <p:sp>
+        <p:nvSpPr>
+          <p:cNvPr id="60" name="Ellipse 59">
+            <a:extLst>
+              <a:ext uri="{FF2B5EF4-FFF2-40B4-BE49-F238E27FC236}">
+                <a16:creationId xmlns:a16="http://schemas.microsoft.com/office/drawing/2014/main" id="{3D3FB52C-1ED6-30C6-CE1A-02B9E78A681D}"/>
+              </a:ext>
+            </a:extLst>
+          </p:cNvPr>
+          <p:cNvSpPr/>
+          <p:nvPr/>
+        </p:nvSpPr>
+        <p:spPr>
+          <a:xfrm>
+            <a:off x="5736000" y="2196719"/>
+            <a:ext cx="720000" cy="720000"/>
+          </a:xfrm>
+          <a:prstGeom prst="ellipse">
+            <a:avLst/>
+          </a:prstGeom>
+          <a:solidFill>
+            <a:srgbClr val="00B050"/>
+          </a:solidFill>
+          <a:ln>
+            <a:solidFill>
+              <a:schemeClr val="tx2">
+                <a:lumMod val="75000"/>
+              </a:schemeClr>
+            </a:solidFill>
+          </a:ln>
+        </p:spPr>
+        <p:style>
+          <a:lnRef idx="2">
+            <a:schemeClr val="accent1">
+              <a:shade val="50000"/>
+            </a:schemeClr>
+          </a:lnRef>
+          <a:fillRef idx="1">
+            <a:schemeClr val="accent1"/>
+          </a:fillRef>
+          <a:effectRef idx="0">
+            <a:schemeClr val="accent1"/>
+          </a:effectRef>
+          <a:fontRef idx="minor">
+            <a:schemeClr val="lt1"/>
+          </a:fontRef>
+        </p:style>
+        <p:txBody>
+          <a:bodyPr rtlCol="0" anchor="ctr"/>
+          <a:lstStyle/>
+          <a:p>
+            <a:pPr algn="ctr"/>
+            <a:r>
+              <a:rPr lang="fr-FR" dirty="0">
+                <a:solidFill>
+                  <a:sysClr val="windowText" lastClr="000000"/>
+                </a:solidFill>
+              </a:rPr>
+              <a:t>B3</a:t>
+            </a:r>
+          </a:p>
+        </p:txBody>
+      </p:sp>
+      <p:sp>
+        <p:nvSpPr>
+          <p:cNvPr id="61" name="Ellipse 60">
+            <a:extLst>
+              <a:ext uri="{FF2B5EF4-FFF2-40B4-BE49-F238E27FC236}">
+                <a16:creationId xmlns:a16="http://schemas.microsoft.com/office/drawing/2014/main" id="{BB8C92AF-C1E1-4295-7563-052CBF9DB8BB}"/>
+              </a:ext>
+            </a:extLst>
+          </p:cNvPr>
+          <p:cNvSpPr/>
+          <p:nvPr/>
+        </p:nvSpPr>
+        <p:spPr>
+          <a:xfrm>
+            <a:off x="7777864" y="2196719"/>
+            <a:ext cx="720000" cy="720000"/>
+          </a:xfrm>
+          <a:prstGeom prst="ellipse">
+            <a:avLst/>
+          </a:prstGeom>
+          <a:solidFill>
+            <a:schemeClr val="tx1"/>
+          </a:solidFill>
+          <a:ln>
+            <a:solidFill>
+              <a:schemeClr val="tx2">
+                <a:lumMod val="75000"/>
+              </a:schemeClr>
+            </a:solidFill>
+          </a:ln>
+        </p:spPr>
+        <p:style>
+          <a:lnRef idx="2">
+            <a:schemeClr val="accent1">
+              <a:shade val="50000"/>
+            </a:schemeClr>
+          </a:lnRef>
+          <a:fillRef idx="1">
+            <a:schemeClr val="accent1"/>
+          </a:fillRef>
+          <a:effectRef idx="0">
+            <a:schemeClr val="accent1"/>
+          </a:effectRef>
+          <a:fontRef idx="minor">
+            <a:schemeClr val="lt1"/>
+          </a:fontRef>
+        </p:style>
+        <p:txBody>
+          <a:bodyPr rtlCol="0" anchor="ctr"/>
+          <a:lstStyle/>
+          <a:p>
+            <a:pPr algn="ctr"/>
+            <a:r>
+              <a:rPr lang="fr-FR" dirty="0">
+                <a:solidFill>
+                  <a:sysClr val="windowText" lastClr="000000"/>
+                </a:solidFill>
+              </a:rPr>
+              <a:t>B4</a:t>
+            </a:r>
+          </a:p>
+        </p:txBody>
+      </p:sp>
+      <p:sp>
+        <p:nvSpPr>
+          <p:cNvPr id="62" name="Ellipse 61">
+            <a:extLst>
+              <a:ext uri="{FF2B5EF4-FFF2-40B4-BE49-F238E27FC236}">
+                <a16:creationId xmlns:a16="http://schemas.microsoft.com/office/drawing/2014/main" id="{6684789E-BFFE-11F6-153E-CAE0947FEE77}"/>
+              </a:ext>
+            </a:extLst>
+          </p:cNvPr>
+          <p:cNvSpPr/>
+          <p:nvPr/>
+        </p:nvSpPr>
+        <p:spPr>
+          <a:xfrm>
+            <a:off x="9819728" y="2196719"/>
+            <a:ext cx="720000" cy="720000"/>
+          </a:xfrm>
+          <a:prstGeom prst="ellipse">
+            <a:avLst/>
+          </a:prstGeom>
+          <a:solidFill>
+            <a:schemeClr val="bg1"/>
+          </a:solidFill>
+          <a:ln>
+            <a:solidFill>
+              <a:schemeClr val="tx2">
+                <a:lumMod val="75000"/>
+              </a:schemeClr>
+            </a:solidFill>
+          </a:ln>
+        </p:spPr>
+        <p:style>
+          <a:lnRef idx="2">
+            <a:schemeClr val="accent1">
+              <a:shade val="50000"/>
+            </a:schemeClr>
+          </a:lnRef>
+          <a:fillRef idx="1">
+            <a:schemeClr val="accent1"/>
+          </a:fillRef>
+          <a:effectRef idx="0">
+            <a:schemeClr val="accent1"/>
+          </a:effectRef>
+          <a:fontRef idx="minor">
+            <a:schemeClr val="lt1"/>
+          </a:fontRef>
+        </p:style>
+        <p:txBody>
+          <a:bodyPr rtlCol="0" anchor="ctr"/>
+          <a:lstStyle/>
+          <a:p>
+            <a:pPr algn="ctr"/>
+            <a:r>
+              <a:rPr lang="fr-FR" dirty="0">
+                <a:solidFill>
+                  <a:sysClr val="windowText" lastClr="000000"/>
+                </a:solidFill>
+              </a:rPr>
+              <a:t>B5</a:t>
+            </a:r>
+          </a:p>
+        </p:txBody>
+      </p:sp>
+      <p:cxnSp>
+        <p:nvCxnSpPr>
+          <p:cNvPr id="63" name="Connecteur droit avec flèche 62">
+            <a:extLst>
+              <a:ext uri="{FF2B5EF4-FFF2-40B4-BE49-F238E27FC236}">
+                <a16:creationId xmlns:a16="http://schemas.microsoft.com/office/drawing/2014/main" id="{DAEB426B-6BF6-B0F7-0B98-9D13BD21AFBD}"/>
+              </a:ext>
+            </a:extLst>
+          </p:cNvPr>
+          <p:cNvCxnSpPr>
+            <a:cxnSpLocks/>
+            <a:stCxn id="58" idx="6"/>
+            <a:endCxn id="59" idx="2"/>
+          </p:cNvCxnSpPr>
+          <p:nvPr/>
+        </p:nvCxnSpPr>
+        <p:spPr>
+          <a:xfrm>
+            <a:off x="2372272" y="2556719"/>
+            <a:ext cx="1321864" cy="0"/>
+          </a:xfrm>
+          <a:prstGeom prst="straightConnector1">
+            <a:avLst/>
+          </a:prstGeom>
+          <a:ln w="38100">
+            <a:solidFill>
+              <a:schemeClr val="tx2"/>
+            </a:solidFill>
+            <a:headEnd type="triangle"/>
+            <a:tailEnd type="triangle"/>
+          </a:ln>
+        </p:spPr>
+        <p:style>
+          <a:lnRef idx="1">
+            <a:schemeClr val="accent1"/>
+          </a:lnRef>
+          <a:fillRef idx="0">
+            <a:schemeClr val="accent1"/>
+          </a:fillRef>
+          <a:effectRef idx="0">
+            <a:schemeClr val="accent1"/>
+          </a:effectRef>
+          <a:fontRef idx="minor">
+            <a:schemeClr val="tx1"/>
+          </a:fontRef>
+        </p:style>
+      </p:cxnSp>
+      <p:cxnSp>
+        <p:nvCxnSpPr>
+          <p:cNvPr id="64" name="Connecteur droit avec flèche 63">
+            <a:extLst>
+              <a:ext uri="{FF2B5EF4-FFF2-40B4-BE49-F238E27FC236}">
+                <a16:creationId xmlns:a16="http://schemas.microsoft.com/office/drawing/2014/main" id="{76374E70-CD48-BD51-6A77-66053ED16121}"/>
+              </a:ext>
+            </a:extLst>
+          </p:cNvPr>
+          <p:cNvCxnSpPr>
+            <a:cxnSpLocks/>
+          </p:cNvCxnSpPr>
+          <p:nvPr/>
+        </p:nvCxnSpPr>
+        <p:spPr>
+          <a:xfrm>
+            <a:off x="4414136" y="2556719"/>
+            <a:ext cx="1321864" cy="0"/>
+          </a:xfrm>
+          <a:prstGeom prst="straightConnector1">
+            <a:avLst/>
+          </a:prstGeom>
+          <a:ln w="38100">
+            <a:solidFill>
+              <a:schemeClr val="tx2"/>
+            </a:solidFill>
+            <a:headEnd type="triangle"/>
+            <a:tailEnd type="triangle"/>
+          </a:ln>
+        </p:spPr>
+        <p:style>
+          <a:lnRef idx="1">
+            <a:schemeClr val="accent1"/>
+          </a:lnRef>
+          <a:fillRef idx="0">
+            <a:schemeClr val="accent1"/>
+          </a:fillRef>
+          <a:effectRef idx="0">
+            <a:schemeClr val="accent1"/>
+          </a:effectRef>
+          <a:fontRef idx="minor">
+            <a:schemeClr val="tx1"/>
+          </a:fontRef>
+        </p:style>
+      </p:cxnSp>
+      <p:cxnSp>
+        <p:nvCxnSpPr>
+          <p:cNvPr id="65" name="Connecteur droit avec flèche 64">
+            <a:extLst>
+              <a:ext uri="{FF2B5EF4-FFF2-40B4-BE49-F238E27FC236}">
+                <a16:creationId xmlns:a16="http://schemas.microsoft.com/office/drawing/2014/main" id="{9C03071E-E9FC-2080-3EF8-849214A46144}"/>
+              </a:ext>
+            </a:extLst>
+          </p:cNvPr>
+          <p:cNvCxnSpPr>
+            <a:cxnSpLocks/>
+          </p:cNvCxnSpPr>
+          <p:nvPr/>
+        </p:nvCxnSpPr>
+        <p:spPr>
+          <a:xfrm>
+            <a:off x="6456000" y="2556719"/>
+            <a:ext cx="1321864" cy="0"/>
+          </a:xfrm>
+          <a:prstGeom prst="straightConnector1">
+            <a:avLst/>
+          </a:prstGeom>
+          <a:ln w="38100">
+            <a:solidFill>
+              <a:schemeClr val="tx2"/>
+            </a:solidFill>
+            <a:headEnd type="triangle"/>
+            <a:tailEnd type="triangle"/>
+          </a:ln>
+        </p:spPr>
+        <p:style>
+          <a:lnRef idx="1">
+            <a:schemeClr val="accent1"/>
+          </a:lnRef>
+          <a:fillRef idx="0">
+            <a:schemeClr val="accent1"/>
+          </a:fillRef>
+          <a:effectRef idx="0">
+            <a:schemeClr val="accent1"/>
+          </a:effectRef>
+          <a:fontRef idx="minor">
+            <a:schemeClr val="tx1"/>
+          </a:fontRef>
+        </p:style>
+      </p:cxnSp>
+      <p:cxnSp>
+        <p:nvCxnSpPr>
+          <p:cNvPr id="66" name="Connecteur droit avec flèche 65">
+            <a:extLst>
+              <a:ext uri="{FF2B5EF4-FFF2-40B4-BE49-F238E27FC236}">
+                <a16:creationId xmlns:a16="http://schemas.microsoft.com/office/drawing/2014/main" id="{3C3350B8-FDEE-8E41-C57A-E761A0848160}"/>
+              </a:ext>
+            </a:extLst>
+          </p:cNvPr>
+          <p:cNvCxnSpPr>
+            <a:cxnSpLocks/>
+          </p:cNvCxnSpPr>
+          <p:nvPr/>
+        </p:nvCxnSpPr>
+        <p:spPr>
+          <a:xfrm>
+            <a:off x="8497864" y="2556719"/>
+            <a:ext cx="1321864" cy="0"/>
+          </a:xfrm>
+          <a:prstGeom prst="straightConnector1">
+            <a:avLst/>
+          </a:prstGeom>
+          <a:ln w="38100">
+            <a:solidFill>
+              <a:schemeClr val="tx2"/>
+            </a:solidFill>
+            <a:headEnd type="triangle"/>
+            <a:tailEnd type="triangle"/>
+          </a:ln>
+        </p:spPr>
+        <p:style>
+          <a:lnRef idx="1">
+            <a:schemeClr val="accent1"/>
+          </a:lnRef>
+          <a:fillRef idx="0">
+            <a:schemeClr val="accent1"/>
+          </a:fillRef>
+          <a:effectRef idx="0">
+            <a:schemeClr val="accent1"/>
+          </a:effectRef>
+          <a:fontRef idx="minor">
+            <a:schemeClr val="tx1"/>
+          </a:fontRef>
+        </p:style>
+      </p:cxnSp>
+      <p:cxnSp>
+        <p:nvCxnSpPr>
+          <p:cNvPr id="85" name="Connecteur droit avec flèche 84">
+            <a:extLst>
+              <a:ext uri="{FF2B5EF4-FFF2-40B4-BE49-F238E27FC236}">
+                <a16:creationId xmlns:a16="http://schemas.microsoft.com/office/drawing/2014/main" id="{183DA2D0-CB26-8F19-28C7-444C6973B5CB}"/>
+              </a:ext>
+            </a:extLst>
+          </p:cNvPr>
+          <p:cNvCxnSpPr>
+            <a:cxnSpLocks/>
+          </p:cNvCxnSpPr>
+          <p:nvPr/>
+        </p:nvCxnSpPr>
+        <p:spPr>
+          <a:xfrm>
+            <a:off x="2012272" y="4661287"/>
+            <a:ext cx="0" cy="990587"/>
+          </a:xfrm>
+          <a:prstGeom prst="straightConnector1">
+            <a:avLst/>
+          </a:prstGeom>
+          <a:ln w="38100">
+            <a:solidFill>
+              <a:schemeClr val="tx2"/>
+            </a:solidFill>
+            <a:headEnd type="triangle"/>
+            <a:tailEnd type="triangle"/>
+          </a:ln>
+        </p:spPr>
+        <p:style>
+          <a:lnRef idx="1">
+            <a:schemeClr val="accent1"/>
+          </a:lnRef>
+          <a:fillRef idx="0">
+            <a:schemeClr val="accent1"/>
+          </a:fillRef>
+          <a:effectRef idx="0">
+            <a:schemeClr val="accent1"/>
+          </a:effectRef>
+          <a:fontRef idx="minor">
+            <a:schemeClr val="tx1"/>
+          </a:fontRef>
+        </p:style>
+      </p:cxnSp>
+      <p:cxnSp>
+        <p:nvCxnSpPr>
+          <p:cNvPr id="86" name="Connecteur droit avec flèche 85">
+            <a:extLst>
+              <a:ext uri="{FF2B5EF4-FFF2-40B4-BE49-F238E27FC236}">
+                <a16:creationId xmlns:a16="http://schemas.microsoft.com/office/drawing/2014/main" id="{360A1362-FD51-E627-0943-B8E86B4EA997}"/>
+              </a:ext>
+            </a:extLst>
+          </p:cNvPr>
+          <p:cNvCxnSpPr>
+            <a:cxnSpLocks/>
+          </p:cNvCxnSpPr>
+          <p:nvPr/>
+        </p:nvCxnSpPr>
+        <p:spPr>
+          <a:xfrm>
+            <a:off x="4054136" y="4661286"/>
+            <a:ext cx="0" cy="990587"/>
+          </a:xfrm>
+          <a:prstGeom prst="straightConnector1">
+            <a:avLst/>
+          </a:prstGeom>
+          <a:ln w="38100">
+            <a:solidFill>
+              <a:schemeClr val="tx2"/>
+            </a:solidFill>
+            <a:headEnd type="triangle"/>
+            <a:tailEnd type="triangle"/>
+          </a:ln>
+        </p:spPr>
+        <p:style>
+          <a:lnRef idx="1">
+            <a:schemeClr val="accent1"/>
+          </a:lnRef>
+          <a:fillRef idx="0">
+            <a:schemeClr val="accent1"/>
+          </a:fillRef>
+          <a:effectRef idx="0">
+            <a:schemeClr val="accent1"/>
+          </a:effectRef>
+          <a:fontRef idx="minor">
+            <a:schemeClr val="tx1"/>
+          </a:fontRef>
+        </p:style>
+      </p:cxnSp>
+      <p:cxnSp>
+        <p:nvCxnSpPr>
+          <p:cNvPr id="87" name="Connecteur droit avec flèche 86">
+            <a:extLst>
+              <a:ext uri="{FF2B5EF4-FFF2-40B4-BE49-F238E27FC236}">
+                <a16:creationId xmlns:a16="http://schemas.microsoft.com/office/drawing/2014/main" id="{9AFF194A-01A8-6FB1-71CC-52B00943C9D6}"/>
+              </a:ext>
+            </a:extLst>
+          </p:cNvPr>
+          <p:cNvCxnSpPr>
+            <a:cxnSpLocks/>
+          </p:cNvCxnSpPr>
+          <p:nvPr/>
+        </p:nvCxnSpPr>
+        <p:spPr>
+          <a:xfrm>
+            <a:off x="6096000" y="4661285"/>
+            <a:ext cx="0" cy="990587"/>
+          </a:xfrm>
+          <a:prstGeom prst="straightConnector1">
+            <a:avLst/>
+          </a:prstGeom>
+          <a:ln w="38100">
+            <a:solidFill>
+              <a:schemeClr val="tx2"/>
+            </a:solidFill>
+            <a:headEnd type="triangle"/>
+            <a:tailEnd type="triangle"/>
+          </a:ln>
+        </p:spPr>
+        <p:style>
+          <a:lnRef idx="1">
+            <a:schemeClr val="accent1"/>
+          </a:lnRef>
+          <a:fillRef idx="0">
+            <a:schemeClr val="accent1"/>
+          </a:fillRef>
+          <a:effectRef idx="0">
+            <a:schemeClr val="accent1"/>
+          </a:effectRef>
+          <a:fontRef idx="minor">
+            <a:schemeClr val="tx1"/>
+          </a:fontRef>
+        </p:style>
+      </p:cxnSp>
+      <p:cxnSp>
+        <p:nvCxnSpPr>
+          <p:cNvPr id="88" name="Connecteur droit avec flèche 87">
+            <a:extLst>
+              <a:ext uri="{FF2B5EF4-FFF2-40B4-BE49-F238E27FC236}">
+                <a16:creationId xmlns:a16="http://schemas.microsoft.com/office/drawing/2014/main" id="{75B0A282-4D76-4D5B-06F4-5162F823AB07}"/>
+              </a:ext>
+            </a:extLst>
+          </p:cNvPr>
+          <p:cNvCxnSpPr>
+            <a:cxnSpLocks/>
+          </p:cNvCxnSpPr>
+          <p:nvPr/>
+        </p:nvCxnSpPr>
+        <p:spPr>
+          <a:xfrm>
+            <a:off x="8137864" y="4661285"/>
+            <a:ext cx="0" cy="990587"/>
+          </a:xfrm>
+          <a:prstGeom prst="straightConnector1">
+            <a:avLst/>
+          </a:prstGeom>
+          <a:ln w="38100">
+            <a:solidFill>
+              <a:schemeClr val="tx2"/>
+            </a:solidFill>
+            <a:headEnd type="triangle"/>
+            <a:tailEnd type="triangle"/>
+          </a:ln>
+        </p:spPr>
+        <p:style>
+          <a:lnRef idx="1">
+            <a:schemeClr val="accent1"/>
+          </a:lnRef>
+          <a:fillRef idx="0">
+            <a:schemeClr val="accent1"/>
+          </a:fillRef>
+          <a:effectRef idx="0">
+            <a:schemeClr val="accent1"/>
+          </a:effectRef>
+          <a:fontRef idx="minor">
+            <a:schemeClr val="tx1"/>
+          </a:fontRef>
+        </p:style>
+      </p:cxnSp>
+      <p:cxnSp>
+        <p:nvCxnSpPr>
+          <p:cNvPr id="89" name="Connecteur droit avec flèche 88">
+            <a:extLst>
+              <a:ext uri="{FF2B5EF4-FFF2-40B4-BE49-F238E27FC236}">
+                <a16:creationId xmlns:a16="http://schemas.microsoft.com/office/drawing/2014/main" id="{28FFF5AC-A081-1F74-1217-43FC1F87DB4C}"/>
+              </a:ext>
+            </a:extLst>
+          </p:cNvPr>
+          <p:cNvCxnSpPr>
+            <a:cxnSpLocks/>
+          </p:cNvCxnSpPr>
+          <p:nvPr/>
+        </p:nvCxnSpPr>
+        <p:spPr>
+          <a:xfrm>
+            <a:off x="10179728" y="4661285"/>
+            <a:ext cx="0" cy="990587"/>
+          </a:xfrm>
+          <a:prstGeom prst="straightConnector1">
+            <a:avLst/>
+          </a:prstGeom>
+          <a:ln w="38100">
+            <a:solidFill>
+              <a:schemeClr val="tx2"/>
+            </a:solidFill>
+            <a:headEnd type="triangle"/>
+            <a:tailEnd type="triangle"/>
+          </a:ln>
+        </p:spPr>
+        <p:style>
+          <a:lnRef idx="1">
+            <a:schemeClr val="accent1"/>
+          </a:lnRef>
+          <a:fillRef idx="0">
+            <a:schemeClr val="accent1"/>
+          </a:fillRef>
+          <a:effectRef idx="0">
+            <a:schemeClr val="accent1"/>
+          </a:effectRef>
+          <a:fontRef idx="minor">
+            <a:schemeClr val="tx1"/>
+          </a:fontRef>
+        </p:style>
+      </p:cxnSp>
+      <p:sp>
+        <p:nvSpPr>
+          <p:cNvPr id="90" name="Ellipse 89">
+            <a:extLst>
+              <a:ext uri="{FF2B5EF4-FFF2-40B4-BE49-F238E27FC236}">
+                <a16:creationId xmlns:a16="http://schemas.microsoft.com/office/drawing/2014/main" id="{EBC68411-FC93-3268-927E-DB9A39B710C2}"/>
+              </a:ext>
+            </a:extLst>
+          </p:cNvPr>
+          <p:cNvSpPr/>
+          <p:nvPr/>
+        </p:nvSpPr>
+        <p:spPr>
+          <a:xfrm>
+            <a:off x="1652272" y="3941282"/>
+            <a:ext cx="720000" cy="720000"/>
+          </a:xfrm>
+          <a:prstGeom prst="ellipse">
+            <a:avLst/>
+          </a:prstGeom>
+          <a:noFill/>
+          <a:ln>
+            <a:solidFill>
+              <a:schemeClr val="tx2">
+                <a:lumMod val="75000"/>
+              </a:schemeClr>
+            </a:solidFill>
+          </a:ln>
+        </p:spPr>
+        <p:style>
+          <a:lnRef idx="2">
+            <a:schemeClr val="accent1">
+              <a:shade val="50000"/>
+            </a:schemeClr>
+          </a:lnRef>
+          <a:fillRef idx="1">
+            <a:schemeClr val="accent1"/>
+          </a:fillRef>
+          <a:effectRef idx="0">
+            <a:schemeClr val="accent1"/>
+          </a:effectRef>
+          <a:fontRef idx="minor">
+            <a:schemeClr val="lt1"/>
+          </a:fontRef>
+        </p:style>
+        <p:txBody>
+          <a:bodyPr rtlCol="0" anchor="ctr"/>
+          <a:lstStyle/>
+          <a:p>
+            <a:pPr algn="ctr"/>
+            <a:r>
+              <a:rPr lang="fr-FR" dirty="0">
+                <a:solidFill>
+                  <a:sysClr val="windowText" lastClr="000000"/>
+                </a:solidFill>
+              </a:rPr>
+              <a:t>C1</a:t>
+            </a:r>
+          </a:p>
+        </p:txBody>
+      </p:sp>
+      <p:sp>
+        <p:nvSpPr>
+          <p:cNvPr id="91" name="Ellipse 90">
+            <a:extLst>
+              <a:ext uri="{FF2B5EF4-FFF2-40B4-BE49-F238E27FC236}">
+                <a16:creationId xmlns:a16="http://schemas.microsoft.com/office/drawing/2014/main" id="{C450A81B-213F-7F6B-3306-2CCECDAB29D8}"/>
+              </a:ext>
+            </a:extLst>
+          </p:cNvPr>
+          <p:cNvSpPr/>
+          <p:nvPr/>
+        </p:nvSpPr>
+        <p:spPr>
+          <a:xfrm>
+            <a:off x="3694136" y="3941282"/>
+            <a:ext cx="720000" cy="720000"/>
+          </a:xfrm>
+          <a:prstGeom prst="ellipse">
+            <a:avLst/>
+          </a:prstGeom>
+          <a:solidFill>
+            <a:srgbClr val="FF0000"/>
+          </a:solidFill>
+          <a:ln>
+            <a:solidFill>
+              <a:schemeClr val="tx2">
+                <a:lumMod val="75000"/>
+              </a:schemeClr>
+            </a:solidFill>
+          </a:ln>
+        </p:spPr>
+        <p:style>
+          <a:lnRef idx="2">
+            <a:schemeClr val="accent1">
+              <a:shade val="50000"/>
+            </a:schemeClr>
+          </a:lnRef>
+          <a:fillRef idx="1">
+            <a:schemeClr val="accent1"/>
+          </a:fillRef>
+          <a:effectRef idx="0">
+            <a:schemeClr val="accent1"/>
+          </a:effectRef>
+          <a:fontRef idx="minor">
+            <a:schemeClr val="lt1"/>
+          </a:fontRef>
+        </p:style>
+        <p:txBody>
+          <a:bodyPr rtlCol="0" anchor="ctr"/>
+          <a:lstStyle/>
+          <a:p>
+            <a:pPr algn="ctr"/>
+            <a:r>
+              <a:rPr lang="fr-FR" dirty="0">
+                <a:solidFill>
+                  <a:sysClr val="windowText" lastClr="000000"/>
+                </a:solidFill>
+              </a:rPr>
+              <a:t>C2</a:t>
+            </a:r>
+          </a:p>
+        </p:txBody>
+      </p:sp>
+      <p:sp>
+        <p:nvSpPr>
+          <p:cNvPr id="92" name="Ellipse 91">
+            <a:extLst>
+              <a:ext uri="{FF2B5EF4-FFF2-40B4-BE49-F238E27FC236}">
+                <a16:creationId xmlns:a16="http://schemas.microsoft.com/office/drawing/2014/main" id="{9DF91975-EBB1-6329-7ACE-15F4ED0A66C9}"/>
+              </a:ext>
+            </a:extLst>
+          </p:cNvPr>
+          <p:cNvSpPr/>
+          <p:nvPr/>
+        </p:nvSpPr>
+        <p:spPr>
+          <a:xfrm>
+            <a:off x="5736000" y="3941282"/>
+            <a:ext cx="720000" cy="720000"/>
+          </a:xfrm>
+          <a:prstGeom prst="ellipse">
+            <a:avLst/>
+          </a:prstGeom>
+          <a:noFill/>
+          <a:ln>
+            <a:solidFill>
+              <a:schemeClr val="tx2">
+                <a:lumMod val="75000"/>
+              </a:schemeClr>
+            </a:solidFill>
+          </a:ln>
+        </p:spPr>
+        <p:style>
+          <a:lnRef idx="2">
+            <a:schemeClr val="accent1">
+              <a:shade val="50000"/>
+            </a:schemeClr>
+          </a:lnRef>
+          <a:fillRef idx="1">
+            <a:schemeClr val="accent1"/>
+          </a:fillRef>
+          <a:effectRef idx="0">
+            <a:schemeClr val="accent1"/>
+          </a:effectRef>
+          <a:fontRef idx="minor">
+            <a:schemeClr val="lt1"/>
+          </a:fontRef>
+        </p:style>
+        <p:txBody>
+          <a:bodyPr rtlCol="0" anchor="ctr"/>
+          <a:lstStyle/>
+          <a:p>
+            <a:pPr algn="ctr"/>
+            <a:r>
+              <a:rPr lang="fr-FR" dirty="0">
+                <a:solidFill>
+                  <a:sysClr val="windowText" lastClr="000000"/>
+                </a:solidFill>
+              </a:rPr>
+              <a:t>C3</a:t>
+            </a:r>
+          </a:p>
+        </p:txBody>
+      </p:sp>
+      <p:sp>
+        <p:nvSpPr>
+          <p:cNvPr id="93" name="Ellipse 92">
+            <a:extLst>
+              <a:ext uri="{FF2B5EF4-FFF2-40B4-BE49-F238E27FC236}">
+                <a16:creationId xmlns:a16="http://schemas.microsoft.com/office/drawing/2014/main" id="{AFC3435C-31F2-485B-47A3-02E71A52B40D}"/>
+              </a:ext>
+            </a:extLst>
+          </p:cNvPr>
+          <p:cNvSpPr/>
+          <p:nvPr/>
+        </p:nvSpPr>
+        <p:spPr>
+          <a:xfrm>
+            <a:off x="7777864" y="3941282"/>
+            <a:ext cx="720000" cy="720000"/>
+          </a:xfrm>
+          <a:prstGeom prst="ellipse">
+            <a:avLst/>
+          </a:prstGeom>
+          <a:solidFill>
+            <a:srgbClr val="FF0000"/>
+          </a:solidFill>
+          <a:ln>
+            <a:solidFill>
+              <a:schemeClr val="tx2">
+                <a:lumMod val="75000"/>
+              </a:schemeClr>
+            </a:solidFill>
+          </a:ln>
+        </p:spPr>
+        <p:style>
+          <a:lnRef idx="2">
+            <a:schemeClr val="accent1">
+              <a:shade val="50000"/>
+            </a:schemeClr>
+          </a:lnRef>
+          <a:fillRef idx="1">
+            <a:schemeClr val="accent1"/>
+          </a:fillRef>
+          <a:effectRef idx="0">
+            <a:schemeClr val="accent1"/>
+          </a:effectRef>
+          <a:fontRef idx="minor">
+            <a:schemeClr val="lt1"/>
+          </a:fontRef>
+        </p:style>
+        <p:txBody>
+          <a:bodyPr rtlCol="0" anchor="ctr"/>
+          <a:lstStyle/>
+          <a:p>
+            <a:pPr algn="ctr"/>
+            <a:r>
+              <a:rPr lang="fr-FR" dirty="0">
+                <a:solidFill>
+                  <a:sysClr val="windowText" lastClr="000000"/>
+                </a:solidFill>
+              </a:rPr>
+              <a:t>C4</a:t>
+            </a:r>
+          </a:p>
+        </p:txBody>
+      </p:sp>
+      <p:sp>
+        <p:nvSpPr>
+          <p:cNvPr id="94" name="Ellipse 93">
+            <a:extLst>
+              <a:ext uri="{FF2B5EF4-FFF2-40B4-BE49-F238E27FC236}">
+                <a16:creationId xmlns:a16="http://schemas.microsoft.com/office/drawing/2014/main" id="{E08C91F2-AA9D-00DD-92DF-1AC21543615C}"/>
+              </a:ext>
+            </a:extLst>
+          </p:cNvPr>
+          <p:cNvSpPr/>
+          <p:nvPr/>
+        </p:nvSpPr>
+        <p:spPr>
+          <a:xfrm>
+            <a:off x="9819728" y="3941282"/>
+            <a:ext cx="720000" cy="720000"/>
+          </a:xfrm>
+          <a:prstGeom prst="ellipse">
+            <a:avLst/>
+          </a:prstGeom>
+          <a:solidFill>
+            <a:srgbClr val="00B050"/>
+          </a:solidFill>
+          <a:ln>
+            <a:solidFill>
+              <a:schemeClr val="tx2">
+                <a:lumMod val="75000"/>
+              </a:schemeClr>
+            </a:solidFill>
+          </a:ln>
+        </p:spPr>
+        <p:style>
+          <a:lnRef idx="2">
+            <a:schemeClr val="accent1">
+              <a:shade val="50000"/>
+            </a:schemeClr>
+          </a:lnRef>
+          <a:fillRef idx="1">
+            <a:schemeClr val="accent1"/>
+          </a:fillRef>
+          <a:effectRef idx="0">
+            <a:schemeClr val="accent1"/>
+          </a:effectRef>
+          <a:fontRef idx="minor">
+            <a:schemeClr val="lt1"/>
+          </a:fontRef>
+        </p:style>
+        <p:txBody>
+          <a:bodyPr rtlCol="0" anchor="ctr"/>
+          <a:lstStyle/>
+          <a:p>
+            <a:pPr algn="ctr"/>
+            <a:r>
+              <a:rPr lang="fr-FR" dirty="0">
+                <a:solidFill>
+                  <a:sysClr val="windowText" lastClr="000000"/>
+                </a:solidFill>
+              </a:rPr>
+              <a:t>C5</a:t>
+            </a:r>
+          </a:p>
+        </p:txBody>
+      </p:sp>
+      <p:cxnSp>
+        <p:nvCxnSpPr>
+          <p:cNvPr id="95" name="Connecteur droit avec flèche 94">
+            <a:extLst>
+              <a:ext uri="{FF2B5EF4-FFF2-40B4-BE49-F238E27FC236}">
+                <a16:creationId xmlns:a16="http://schemas.microsoft.com/office/drawing/2014/main" id="{DD6C422B-52FB-6AF8-5539-7B1F3794D112}"/>
+              </a:ext>
+            </a:extLst>
+          </p:cNvPr>
+          <p:cNvCxnSpPr>
+            <a:cxnSpLocks/>
+            <a:stCxn id="90" idx="6"/>
+            <a:endCxn id="91" idx="2"/>
+          </p:cNvCxnSpPr>
+          <p:nvPr/>
+        </p:nvCxnSpPr>
+        <p:spPr>
+          <a:xfrm>
+            <a:off x="2372272" y="4301282"/>
+            <a:ext cx="1321864" cy="0"/>
+          </a:xfrm>
+          <a:prstGeom prst="straightConnector1">
+            <a:avLst/>
+          </a:prstGeom>
+          <a:ln w="38100">
+            <a:solidFill>
+              <a:schemeClr val="tx2"/>
+            </a:solidFill>
+            <a:headEnd type="triangle"/>
+            <a:tailEnd type="triangle"/>
+          </a:ln>
+        </p:spPr>
+        <p:style>
+          <a:lnRef idx="1">
+            <a:schemeClr val="accent1"/>
+          </a:lnRef>
+          <a:fillRef idx="0">
+            <a:schemeClr val="accent1"/>
+          </a:fillRef>
+          <a:effectRef idx="0">
+            <a:schemeClr val="accent1"/>
+          </a:effectRef>
+          <a:fontRef idx="minor">
+            <a:schemeClr val="tx1"/>
+          </a:fontRef>
+        </p:style>
+      </p:cxnSp>
+      <p:cxnSp>
+        <p:nvCxnSpPr>
+          <p:cNvPr id="96" name="Connecteur droit avec flèche 95">
+            <a:extLst>
+              <a:ext uri="{FF2B5EF4-FFF2-40B4-BE49-F238E27FC236}">
+                <a16:creationId xmlns:a16="http://schemas.microsoft.com/office/drawing/2014/main" id="{2EE189EF-1D8F-3476-FAB6-7887FD071251}"/>
+              </a:ext>
+            </a:extLst>
+          </p:cNvPr>
+          <p:cNvCxnSpPr>
+            <a:cxnSpLocks/>
+          </p:cNvCxnSpPr>
+          <p:nvPr/>
+        </p:nvCxnSpPr>
+        <p:spPr>
+          <a:xfrm>
+            <a:off x="4414136" y="4301282"/>
+            <a:ext cx="1321864" cy="0"/>
+          </a:xfrm>
+          <a:prstGeom prst="straightConnector1">
+            <a:avLst/>
+          </a:prstGeom>
+          <a:ln w="38100">
+            <a:solidFill>
+              <a:schemeClr val="tx2"/>
+            </a:solidFill>
+            <a:headEnd type="triangle"/>
+            <a:tailEnd type="triangle"/>
+          </a:ln>
+        </p:spPr>
+        <p:style>
+          <a:lnRef idx="1">
+            <a:schemeClr val="accent1"/>
+          </a:lnRef>
+          <a:fillRef idx="0">
+            <a:schemeClr val="accent1"/>
+          </a:fillRef>
+          <a:effectRef idx="0">
+            <a:schemeClr val="accent1"/>
+          </a:effectRef>
+          <a:fontRef idx="minor">
+            <a:schemeClr val="tx1"/>
+          </a:fontRef>
+        </p:style>
+      </p:cxnSp>
+      <p:cxnSp>
+        <p:nvCxnSpPr>
+          <p:cNvPr id="97" name="Connecteur droit avec flèche 96">
+            <a:extLst>
+              <a:ext uri="{FF2B5EF4-FFF2-40B4-BE49-F238E27FC236}">
+                <a16:creationId xmlns:a16="http://schemas.microsoft.com/office/drawing/2014/main" id="{C31D9118-21AD-1051-C27E-408629BEA9C6}"/>
+              </a:ext>
+            </a:extLst>
+          </p:cNvPr>
+          <p:cNvCxnSpPr>
+            <a:cxnSpLocks/>
+          </p:cNvCxnSpPr>
+          <p:nvPr/>
+        </p:nvCxnSpPr>
+        <p:spPr>
+          <a:xfrm>
+            <a:off x="6456000" y="4301282"/>
+            <a:ext cx="1321864" cy="0"/>
+          </a:xfrm>
+          <a:prstGeom prst="straightConnector1">
+            <a:avLst/>
+          </a:prstGeom>
+          <a:ln w="38100">
+            <a:solidFill>
+              <a:schemeClr val="tx2"/>
+            </a:solidFill>
+            <a:headEnd type="triangle"/>
+            <a:tailEnd type="triangle"/>
+          </a:ln>
+        </p:spPr>
+        <p:style>
+          <a:lnRef idx="1">
+            <a:schemeClr val="accent1"/>
+          </a:lnRef>
+          <a:fillRef idx="0">
+            <a:schemeClr val="accent1"/>
+          </a:fillRef>
+          <a:effectRef idx="0">
+            <a:schemeClr val="accent1"/>
+          </a:effectRef>
+          <a:fontRef idx="minor">
+            <a:schemeClr val="tx1"/>
+          </a:fontRef>
+        </p:style>
+      </p:cxnSp>
+      <p:cxnSp>
+        <p:nvCxnSpPr>
+          <p:cNvPr id="98" name="Connecteur droit avec flèche 97">
+            <a:extLst>
+              <a:ext uri="{FF2B5EF4-FFF2-40B4-BE49-F238E27FC236}">
+                <a16:creationId xmlns:a16="http://schemas.microsoft.com/office/drawing/2014/main" id="{A9AD4D3A-EB4D-90DF-4F50-90CE8F55A645}"/>
+              </a:ext>
+            </a:extLst>
+          </p:cNvPr>
+          <p:cNvCxnSpPr>
+            <a:cxnSpLocks/>
+          </p:cNvCxnSpPr>
+          <p:nvPr/>
+        </p:nvCxnSpPr>
+        <p:spPr>
+          <a:xfrm>
+            <a:off x="8497864" y="4301282"/>
+            <a:ext cx="1321864" cy="0"/>
+          </a:xfrm>
+          <a:prstGeom prst="straightConnector1">
+            <a:avLst/>
+          </a:prstGeom>
+          <a:ln w="38100">
+            <a:solidFill>
+              <a:schemeClr val="tx2"/>
+            </a:solidFill>
+            <a:headEnd type="triangle"/>
+            <a:tailEnd type="triangle"/>
+          </a:ln>
+        </p:spPr>
+        <p:style>
+          <a:lnRef idx="1">
+            <a:schemeClr val="accent1"/>
+          </a:lnRef>
+          <a:fillRef idx="0">
+            <a:schemeClr val="accent1"/>
+          </a:fillRef>
+          <a:effectRef idx="0">
+            <a:schemeClr val="accent1"/>
+          </a:effectRef>
+          <a:fontRef idx="minor">
+            <a:schemeClr val="tx1"/>
+          </a:fontRef>
+        </p:style>
+      </p:cxnSp>
+      <p:sp>
+        <p:nvSpPr>
+          <p:cNvPr id="99" name="Ellipse 98">
+            <a:extLst>
+              <a:ext uri="{FF2B5EF4-FFF2-40B4-BE49-F238E27FC236}">
+                <a16:creationId xmlns:a16="http://schemas.microsoft.com/office/drawing/2014/main" id="{A806EA29-175E-D1F9-F41E-DC3FA3B6EBBC}"/>
+              </a:ext>
+            </a:extLst>
+          </p:cNvPr>
+          <p:cNvSpPr/>
+          <p:nvPr/>
+        </p:nvSpPr>
+        <p:spPr>
+          <a:xfrm>
+            <a:off x="1652272" y="5685845"/>
+            <a:ext cx="720000" cy="720000"/>
+          </a:xfrm>
+          <a:prstGeom prst="ellipse">
+            <a:avLst/>
+          </a:prstGeom>
+          <a:solidFill>
+            <a:srgbClr val="00B050"/>
+          </a:solidFill>
+          <a:ln>
+            <a:solidFill>
+              <a:schemeClr val="tx2">
+                <a:lumMod val="75000"/>
+              </a:schemeClr>
+            </a:solidFill>
+          </a:ln>
+        </p:spPr>
+        <p:style>
+          <a:lnRef idx="2">
+            <a:schemeClr val="accent1">
+              <a:shade val="50000"/>
+            </a:schemeClr>
+          </a:lnRef>
+          <a:fillRef idx="1">
+            <a:schemeClr val="accent1"/>
+          </a:fillRef>
+          <a:effectRef idx="0">
+            <a:schemeClr val="accent1"/>
+          </a:effectRef>
+          <a:fontRef idx="minor">
+            <a:schemeClr val="lt1"/>
+          </a:fontRef>
+        </p:style>
+        <p:txBody>
+          <a:bodyPr rtlCol="0" anchor="ctr"/>
+          <a:lstStyle/>
+          <a:p>
+            <a:pPr algn="ctr"/>
+            <a:r>
+              <a:rPr lang="fr-FR" dirty="0">
+                <a:solidFill>
+                  <a:sysClr val="windowText" lastClr="000000"/>
+                </a:solidFill>
+              </a:rPr>
+              <a:t>D1</a:t>
+            </a:r>
+          </a:p>
+        </p:txBody>
+      </p:sp>
+      <p:sp>
+        <p:nvSpPr>
+          <p:cNvPr id="100" name="Ellipse 99">
+            <a:extLst>
+              <a:ext uri="{FF2B5EF4-FFF2-40B4-BE49-F238E27FC236}">
+                <a16:creationId xmlns:a16="http://schemas.microsoft.com/office/drawing/2014/main" id="{2A01CEF0-7F3F-9BA4-115F-BE74D505BD13}"/>
+              </a:ext>
+            </a:extLst>
+          </p:cNvPr>
+          <p:cNvSpPr/>
+          <p:nvPr/>
+        </p:nvSpPr>
+        <p:spPr>
+          <a:xfrm>
+            <a:off x="3694136" y="5685845"/>
+            <a:ext cx="720000" cy="720000"/>
+          </a:xfrm>
+          <a:prstGeom prst="ellipse">
+            <a:avLst/>
+          </a:prstGeom>
+          <a:solidFill>
+            <a:schemeClr val="bg1"/>
+          </a:solidFill>
+          <a:ln>
+            <a:solidFill>
+              <a:schemeClr val="tx2">
+                <a:lumMod val="75000"/>
+              </a:schemeClr>
+            </a:solidFill>
+          </a:ln>
+        </p:spPr>
+        <p:style>
+          <a:lnRef idx="2">
+            <a:schemeClr val="accent1">
+              <a:shade val="50000"/>
+            </a:schemeClr>
+          </a:lnRef>
+          <a:fillRef idx="1">
+            <a:schemeClr val="accent1"/>
+          </a:fillRef>
+          <a:effectRef idx="0">
+            <a:schemeClr val="accent1"/>
+          </a:effectRef>
+          <a:fontRef idx="minor">
+            <a:schemeClr val="lt1"/>
+          </a:fontRef>
+        </p:style>
+        <p:txBody>
+          <a:bodyPr rtlCol="0" anchor="ctr"/>
+          <a:lstStyle/>
+          <a:p>
+            <a:pPr algn="ctr"/>
+            <a:r>
+              <a:rPr lang="fr-FR" dirty="0">
+                <a:solidFill>
+                  <a:sysClr val="windowText" lastClr="000000"/>
+                </a:solidFill>
+              </a:rPr>
+              <a:t>D2</a:t>
+            </a:r>
+          </a:p>
+        </p:txBody>
+      </p:sp>
+      <p:sp>
+        <p:nvSpPr>
+          <p:cNvPr id="101" name="Ellipse 100">
+            <a:extLst>
+              <a:ext uri="{FF2B5EF4-FFF2-40B4-BE49-F238E27FC236}">
+                <a16:creationId xmlns:a16="http://schemas.microsoft.com/office/drawing/2014/main" id="{A8BA55D2-800E-71F0-0EA6-8465FB96B7CA}"/>
+              </a:ext>
+            </a:extLst>
+          </p:cNvPr>
+          <p:cNvSpPr/>
+          <p:nvPr/>
+        </p:nvSpPr>
+        <p:spPr>
+          <a:xfrm>
+            <a:off x="5736000" y="5685845"/>
+            <a:ext cx="720000" cy="720000"/>
+          </a:xfrm>
+          <a:prstGeom prst="ellipse">
+            <a:avLst/>
+          </a:prstGeom>
+          <a:solidFill>
+            <a:srgbClr val="FFC000"/>
+          </a:solidFill>
+          <a:ln>
+            <a:solidFill>
+              <a:schemeClr val="tx2">
+                <a:lumMod val="75000"/>
+              </a:schemeClr>
+            </a:solidFill>
+          </a:ln>
+        </p:spPr>
+        <p:style>
+          <a:lnRef idx="2">
+            <a:schemeClr val="accent1">
+              <a:shade val="50000"/>
+            </a:schemeClr>
+          </a:lnRef>
+          <a:fillRef idx="1">
+            <a:schemeClr val="accent1"/>
+          </a:fillRef>
+          <a:effectRef idx="0">
+            <a:schemeClr val="accent1"/>
+          </a:effectRef>
+          <a:fontRef idx="minor">
+            <a:schemeClr val="lt1"/>
+          </a:fontRef>
+        </p:style>
+        <p:txBody>
+          <a:bodyPr rtlCol="0" anchor="ctr"/>
+          <a:lstStyle/>
+          <a:p>
+            <a:pPr algn="ctr"/>
+            <a:r>
+              <a:rPr lang="fr-FR" dirty="0">
+                <a:solidFill>
+                  <a:sysClr val="windowText" lastClr="000000"/>
+                </a:solidFill>
+              </a:rPr>
+              <a:t>D3</a:t>
+            </a:r>
+          </a:p>
+        </p:txBody>
+      </p:sp>
+      <p:sp>
+        <p:nvSpPr>
+          <p:cNvPr id="102" name="Ellipse 101">
+            <a:extLst>
+              <a:ext uri="{FF2B5EF4-FFF2-40B4-BE49-F238E27FC236}">
+                <a16:creationId xmlns:a16="http://schemas.microsoft.com/office/drawing/2014/main" id="{7D6525C5-7B77-1CEF-3CDD-CAB3DAD12D9E}"/>
+              </a:ext>
+            </a:extLst>
+          </p:cNvPr>
+          <p:cNvSpPr/>
+          <p:nvPr/>
+        </p:nvSpPr>
+        <p:spPr>
+          <a:xfrm>
+            <a:off x="7777864" y="5685845"/>
+            <a:ext cx="720000" cy="720000"/>
+          </a:xfrm>
+          <a:prstGeom prst="ellipse">
+            <a:avLst/>
+          </a:prstGeom>
+          <a:solidFill>
+            <a:schemeClr val="bg1"/>
+          </a:solidFill>
+          <a:ln>
+            <a:solidFill>
+              <a:schemeClr val="tx2">
+                <a:lumMod val="75000"/>
+              </a:schemeClr>
+            </a:solidFill>
+          </a:ln>
+        </p:spPr>
+        <p:style>
+          <a:lnRef idx="2">
+            <a:schemeClr val="accent1">
+              <a:shade val="50000"/>
+            </a:schemeClr>
+          </a:lnRef>
+          <a:fillRef idx="1">
+            <a:schemeClr val="accent1"/>
+          </a:fillRef>
+          <a:effectRef idx="0">
+            <a:schemeClr val="accent1"/>
+          </a:effectRef>
+          <a:fontRef idx="minor">
+            <a:schemeClr val="lt1"/>
+          </a:fontRef>
+        </p:style>
+        <p:txBody>
+          <a:bodyPr rtlCol="0" anchor="ctr"/>
+          <a:lstStyle/>
+          <a:p>
+            <a:pPr algn="ctr"/>
+            <a:r>
+              <a:rPr lang="fr-FR" dirty="0">
+                <a:solidFill>
+                  <a:sysClr val="windowText" lastClr="000000"/>
+                </a:solidFill>
+              </a:rPr>
+              <a:t>D4</a:t>
+            </a:r>
+          </a:p>
+        </p:txBody>
+      </p:sp>
+      <p:sp>
+        <p:nvSpPr>
+          <p:cNvPr id="103" name="Ellipse 102">
+            <a:extLst>
+              <a:ext uri="{FF2B5EF4-FFF2-40B4-BE49-F238E27FC236}">
+                <a16:creationId xmlns:a16="http://schemas.microsoft.com/office/drawing/2014/main" id="{7029EDC1-CBCC-BDF8-D3C7-C11DBB62A882}"/>
+              </a:ext>
+            </a:extLst>
+          </p:cNvPr>
+          <p:cNvSpPr/>
+          <p:nvPr/>
+        </p:nvSpPr>
+        <p:spPr>
+          <a:xfrm>
+            <a:off x="9819728" y="5685845"/>
+            <a:ext cx="720000" cy="720000"/>
+          </a:xfrm>
+          <a:prstGeom prst="ellipse">
+            <a:avLst/>
+          </a:prstGeom>
+          <a:solidFill>
+            <a:schemeClr val="bg1"/>
+          </a:solidFill>
+          <a:ln>
+            <a:solidFill>
+              <a:schemeClr val="tx2">
+                <a:lumMod val="75000"/>
+              </a:schemeClr>
+            </a:solidFill>
+          </a:ln>
+        </p:spPr>
+        <p:style>
+          <a:lnRef idx="2">
+            <a:schemeClr val="accent1">
+              <a:shade val="50000"/>
+            </a:schemeClr>
+          </a:lnRef>
+          <a:fillRef idx="1">
+            <a:schemeClr val="accent1"/>
+          </a:fillRef>
+          <a:effectRef idx="0">
+            <a:schemeClr val="accent1"/>
+          </a:effectRef>
+          <a:fontRef idx="minor">
+            <a:schemeClr val="lt1"/>
+          </a:fontRef>
+        </p:style>
+        <p:txBody>
+          <a:bodyPr rtlCol="0" anchor="ctr"/>
+          <a:lstStyle/>
+          <a:p>
+            <a:pPr algn="ctr"/>
+            <a:r>
+              <a:rPr lang="fr-FR" dirty="0">
+                <a:solidFill>
+                  <a:sysClr val="windowText" lastClr="000000"/>
+                </a:solidFill>
+              </a:rPr>
+              <a:t>D5</a:t>
+            </a:r>
+          </a:p>
+        </p:txBody>
+      </p:sp>
+      <p:cxnSp>
+        <p:nvCxnSpPr>
+          <p:cNvPr id="104" name="Connecteur droit avec flèche 103">
+            <a:extLst>
+              <a:ext uri="{FF2B5EF4-FFF2-40B4-BE49-F238E27FC236}">
+                <a16:creationId xmlns:a16="http://schemas.microsoft.com/office/drawing/2014/main" id="{75DFCCDD-9C0C-CDDC-D4AA-09DF384C83C3}"/>
+              </a:ext>
+            </a:extLst>
+          </p:cNvPr>
+          <p:cNvCxnSpPr>
+            <a:cxnSpLocks/>
+            <a:stCxn id="99" idx="6"/>
+            <a:endCxn id="100" idx="2"/>
+          </p:cNvCxnSpPr>
+          <p:nvPr/>
+        </p:nvCxnSpPr>
+        <p:spPr>
+          <a:xfrm>
+            <a:off x="2372272" y="6045845"/>
+            <a:ext cx="1321864" cy="0"/>
+          </a:xfrm>
+          <a:prstGeom prst="straightConnector1">
+            <a:avLst/>
+          </a:prstGeom>
+          <a:ln w="38100">
+            <a:solidFill>
+              <a:schemeClr val="tx2"/>
+            </a:solidFill>
+            <a:headEnd type="triangle"/>
+            <a:tailEnd type="triangle"/>
+          </a:ln>
+        </p:spPr>
+        <p:style>
+          <a:lnRef idx="1">
+            <a:schemeClr val="accent1"/>
+          </a:lnRef>
+          <a:fillRef idx="0">
+            <a:schemeClr val="accent1"/>
+          </a:fillRef>
+          <a:effectRef idx="0">
+            <a:schemeClr val="accent1"/>
+          </a:effectRef>
+          <a:fontRef idx="minor">
+            <a:schemeClr val="tx1"/>
+          </a:fontRef>
+        </p:style>
+      </p:cxnSp>
+      <p:cxnSp>
+        <p:nvCxnSpPr>
+          <p:cNvPr id="105" name="Connecteur droit avec flèche 104">
+            <a:extLst>
+              <a:ext uri="{FF2B5EF4-FFF2-40B4-BE49-F238E27FC236}">
+                <a16:creationId xmlns:a16="http://schemas.microsoft.com/office/drawing/2014/main" id="{4B431C1F-C7D9-872B-16BA-E9D50A0BE069}"/>
+              </a:ext>
+            </a:extLst>
+          </p:cNvPr>
+          <p:cNvCxnSpPr>
+            <a:cxnSpLocks/>
+          </p:cNvCxnSpPr>
+          <p:nvPr/>
+        </p:nvCxnSpPr>
+        <p:spPr>
+          <a:xfrm>
+            <a:off x="4414136" y="6045845"/>
+            <a:ext cx="1321864" cy="0"/>
+          </a:xfrm>
+          <a:prstGeom prst="straightConnector1">
+            <a:avLst/>
+          </a:prstGeom>
+          <a:ln w="38100">
+            <a:solidFill>
+              <a:schemeClr val="tx2"/>
+            </a:solidFill>
+            <a:headEnd type="triangle"/>
+            <a:tailEnd type="triangle"/>
+          </a:ln>
+        </p:spPr>
+        <p:style>
+          <a:lnRef idx="1">
+            <a:schemeClr val="accent1"/>
+          </a:lnRef>
+          <a:fillRef idx="0">
+            <a:schemeClr val="accent1"/>
+          </a:fillRef>
+          <a:effectRef idx="0">
+            <a:schemeClr val="accent1"/>
+          </a:effectRef>
+          <a:fontRef idx="minor">
+            <a:schemeClr val="tx1"/>
+          </a:fontRef>
+        </p:style>
+      </p:cxnSp>
+      <p:cxnSp>
+        <p:nvCxnSpPr>
+          <p:cNvPr id="106" name="Connecteur droit avec flèche 105">
+            <a:extLst>
+              <a:ext uri="{FF2B5EF4-FFF2-40B4-BE49-F238E27FC236}">
+                <a16:creationId xmlns:a16="http://schemas.microsoft.com/office/drawing/2014/main" id="{6CE67B39-F4CC-7515-C3B2-1B2B93C3B785}"/>
+              </a:ext>
+            </a:extLst>
+          </p:cNvPr>
+          <p:cNvCxnSpPr>
+            <a:cxnSpLocks/>
+          </p:cNvCxnSpPr>
+          <p:nvPr/>
+        </p:nvCxnSpPr>
+        <p:spPr>
+          <a:xfrm>
+            <a:off x="6456000" y="6045845"/>
+            <a:ext cx="1321864" cy="0"/>
+          </a:xfrm>
+          <a:prstGeom prst="straightConnector1">
+            <a:avLst/>
+          </a:prstGeom>
+          <a:ln w="38100">
+            <a:solidFill>
+              <a:schemeClr val="tx2"/>
+            </a:solidFill>
+            <a:headEnd type="triangle"/>
+            <a:tailEnd type="triangle"/>
+          </a:ln>
+        </p:spPr>
+        <p:style>
+          <a:lnRef idx="1">
+            <a:schemeClr val="accent1"/>
+          </a:lnRef>
+          <a:fillRef idx="0">
+            <a:schemeClr val="accent1"/>
+          </a:fillRef>
+          <a:effectRef idx="0">
+            <a:schemeClr val="accent1"/>
+          </a:effectRef>
+          <a:fontRef idx="minor">
+            <a:schemeClr val="tx1"/>
+          </a:fontRef>
+        </p:style>
+      </p:cxnSp>
+      <p:cxnSp>
+        <p:nvCxnSpPr>
+          <p:cNvPr id="107" name="Connecteur droit avec flèche 106">
+            <a:extLst>
+              <a:ext uri="{FF2B5EF4-FFF2-40B4-BE49-F238E27FC236}">
+                <a16:creationId xmlns:a16="http://schemas.microsoft.com/office/drawing/2014/main" id="{AE89FC9F-85E6-1493-6E0B-DF200F5D188F}"/>
+              </a:ext>
+            </a:extLst>
+          </p:cNvPr>
+          <p:cNvCxnSpPr>
+            <a:cxnSpLocks/>
+          </p:cNvCxnSpPr>
+          <p:nvPr/>
+        </p:nvCxnSpPr>
+        <p:spPr>
+          <a:xfrm>
+            <a:off x="8497864" y="6045845"/>
+            <a:ext cx="1321864" cy="0"/>
+          </a:xfrm>
+          <a:prstGeom prst="straightConnector1">
+            <a:avLst/>
+          </a:prstGeom>
+          <a:ln w="38100">
+            <a:solidFill>
+              <a:schemeClr val="tx2"/>
+            </a:solidFill>
+            <a:headEnd type="triangle"/>
+            <a:tailEnd type="triangle"/>
+          </a:ln>
+        </p:spPr>
+        <p:style>
+          <a:lnRef idx="1">
+            <a:schemeClr val="accent1"/>
+          </a:lnRef>
+          <a:fillRef idx="0">
+            <a:schemeClr val="accent1"/>
+          </a:fillRef>
+          <a:effectRef idx="0">
+            <a:schemeClr val="accent1"/>
+          </a:effectRef>
+          <a:fontRef idx="minor">
+            <a:schemeClr val="tx1"/>
+          </a:fontRef>
+        </p:style>
+      </p:cxnSp>
+    </p:spTree>
+    <p:extLst>
+      <p:ext uri="{BB962C8B-B14F-4D97-AF65-F5344CB8AC3E}">
+        <p14:creationId xmlns:p14="http://schemas.microsoft.com/office/powerpoint/2010/main" val="269461092"/>
+      </p:ext>
+    </p:extLst>
+  </p:cSld>
+  <p:clrMapOvr>
+    <a:masterClrMapping/>
+  </p:clrMapOvr>
+</p:sld>
+</file>
+
+<file path=ppt/slides/slide13.xml><?xml version="1.0" encoding="utf-8"?>
+<p:sld xmlns:a="http://schemas.openxmlformats.org/drawingml/2006/main" xmlns:r="http://schemas.openxmlformats.org/officeDocument/2006/relationships" xmlns:p="http://schemas.openxmlformats.org/presentationml/2006/main">
+  <p:cSld>
+    <p:spTree>
+      <p:nvGrpSpPr>
+        <p:cNvPr id="1" name=""/>
+        <p:cNvGrpSpPr/>
+        <p:nvPr/>
+      </p:nvGrpSpPr>
+      <p:grpSpPr>
+        <a:xfrm>
+          <a:off x="0" y="0"/>
+          <a:ext cx="0" cy="0"/>
+          <a:chOff x="0" y="0"/>
+          <a:chExt cx="0" cy="0"/>
+        </a:xfrm>
+      </p:grpSpPr>
+      <p:sp>
+        <p:nvSpPr>
+          <p:cNvPr id="13" name="Ellipse 12">
+            <a:extLst>
+              <a:ext uri="{FF2B5EF4-FFF2-40B4-BE49-F238E27FC236}">
+                <a16:creationId xmlns:a16="http://schemas.microsoft.com/office/drawing/2014/main" id="{B0A0F783-7ABA-32D5-26DA-AAA1C9DFC04E}"/>
+              </a:ext>
+            </a:extLst>
+          </p:cNvPr>
+          <p:cNvSpPr/>
+          <p:nvPr/>
+        </p:nvSpPr>
+        <p:spPr>
+          <a:xfrm>
+            <a:off x="7656094" y="162094"/>
+            <a:ext cx="720000" cy="720000"/>
+          </a:xfrm>
+          <a:prstGeom prst="ellipse">
+            <a:avLst/>
+          </a:prstGeom>
+          <a:solidFill>
+            <a:srgbClr val="FF0000"/>
+          </a:solidFill>
+          <a:ln>
+            <a:solidFill>
+              <a:schemeClr val="tx2">
+                <a:lumMod val="75000"/>
+              </a:schemeClr>
+            </a:solidFill>
+          </a:ln>
+        </p:spPr>
+        <p:style>
+          <a:lnRef idx="2">
+            <a:schemeClr val="accent1">
+              <a:shade val="50000"/>
+            </a:schemeClr>
+          </a:lnRef>
+          <a:fillRef idx="1">
+            <a:schemeClr val="accent1"/>
+          </a:fillRef>
+          <a:effectRef idx="0">
+            <a:schemeClr val="accent1"/>
+          </a:effectRef>
+          <a:fontRef idx="minor">
+            <a:schemeClr val="lt1"/>
+          </a:fontRef>
+        </p:style>
+        <p:txBody>
+          <a:bodyPr rtlCol="0" anchor="ctr"/>
+          <a:lstStyle/>
+          <a:p>
+            <a:pPr algn="ctr"/>
+            <a:r>
+              <a:rPr lang="fr-FR" dirty="0">
+                <a:solidFill>
+                  <a:sysClr val="windowText" lastClr="000000"/>
+                </a:solidFill>
+              </a:rPr>
+              <a:t>B</a:t>
+            </a:r>
+          </a:p>
+        </p:txBody>
+      </p:sp>
+      <p:sp>
+        <p:nvSpPr>
+          <p:cNvPr id="14" name="Ellipse 13">
+            <a:extLst>
+              <a:ext uri="{FF2B5EF4-FFF2-40B4-BE49-F238E27FC236}">
+                <a16:creationId xmlns:a16="http://schemas.microsoft.com/office/drawing/2014/main" id="{E3626859-6516-4C29-8E10-D9C2929BA6CE}"/>
+              </a:ext>
+            </a:extLst>
+          </p:cNvPr>
+          <p:cNvSpPr/>
+          <p:nvPr/>
+        </p:nvSpPr>
+        <p:spPr>
+          <a:xfrm>
+            <a:off x="6509083" y="3762094"/>
+            <a:ext cx="720000" cy="720000"/>
+          </a:xfrm>
+          <a:prstGeom prst="ellipse">
+            <a:avLst/>
+          </a:prstGeom>
+          <a:solidFill>
+            <a:srgbClr val="FFC000"/>
+          </a:solidFill>
+          <a:ln>
+            <a:solidFill>
+              <a:schemeClr val="tx2">
+                <a:lumMod val="75000"/>
+              </a:schemeClr>
+            </a:solidFill>
+          </a:ln>
+        </p:spPr>
+        <p:style>
+          <a:lnRef idx="2">
+            <a:schemeClr val="accent1">
+              <a:shade val="50000"/>
+            </a:schemeClr>
+          </a:lnRef>
+          <a:fillRef idx="1">
+            <a:schemeClr val="accent1"/>
+          </a:fillRef>
+          <a:effectRef idx="0">
+            <a:schemeClr val="accent1"/>
+          </a:effectRef>
+          <a:fontRef idx="minor">
+            <a:schemeClr val="lt1"/>
+          </a:fontRef>
+        </p:style>
+        <p:txBody>
+          <a:bodyPr rtlCol="0" anchor="ctr"/>
+          <a:lstStyle/>
+          <a:p>
+            <a:pPr algn="ctr"/>
+            <a:r>
+              <a:rPr lang="fr-FR" dirty="0">
+                <a:solidFill>
+                  <a:sysClr val="windowText" lastClr="000000"/>
+                </a:solidFill>
+              </a:rPr>
+              <a:t>E</a:t>
+            </a:r>
+          </a:p>
+        </p:txBody>
+      </p:sp>
+      <p:sp>
+        <p:nvSpPr>
+          <p:cNvPr id="15" name="Ellipse 14">
+            <a:extLst>
+              <a:ext uri="{FF2B5EF4-FFF2-40B4-BE49-F238E27FC236}">
+                <a16:creationId xmlns:a16="http://schemas.microsoft.com/office/drawing/2014/main" id="{8709E339-1873-5717-29CC-79550A263084}"/>
+              </a:ext>
+            </a:extLst>
+          </p:cNvPr>
+          <p:cNvSpPr/>
+          <p:nvPr/>
+        </p:nvSpPr>
+        <p:spPr>
+          <a:xfrm>
+            <a:off x="8803107" y="3762094"/>
+            <a:ext cx="720000" cy="720000"/>
+          </a:xfrm>
+          <a:prstGeom prst="ellipse">
+            <a:avLst/>
+          </a:prstGeom>
+          <a:solidFill>
+            <a:srgbClr val="FF0000"/>
+          </a:solidFill>
+          <a:ln>
+            <a:solidFill>
+              <a:schemeClr val="tx2">
+                <a:lumMod val="75000"/>
+              </a:schemeClr>
+            </a:solidFill>
+          </a:ln>
+        </p:spPr>
+        <p:style>
+          <a:lnRef idx="2">
+            <a:schemeClr val="accent1">
+              <a:shade val="50000"/>
+            </a:schemeClr>
+          </a:lnRef>
+          <a:fillRef idx="1">
+            <a:schemeClr val="accent1"/>
+          </a:fillRef>
+          <a:effectRef idx="0">
+            <a:schemeClr val="accent1"/>
+          </a:effectRef>
+          <a:fontRef idx="minor">
+            <a:schemeClr val="lt1"/>
+          </a:fontRef>
+        </p:style>
+        <p:txBody>
+          <a:bodyPr rtlCol="0" anchor="ctr"/>
+          <a:lstStyle/>
+          <a:p>
+            <a:pPr algn="ctr"/>
+            <a:r>
+              <a:rPr lang="fr-FR" dirty="0">
+                <a:solidFill>
+                  <a:sysClr val="windowText" lastClr="000000"/>
+                </a:solidFill>
+              </a:rPr>
+              <a:t>D</a:t>
+            </a:r>
+          </a:p>
+        </p:txBody>
+      </p:sp>
+      <p:sp>
+        <p:nvSpPr>
+          <p:cNvPr id="16" name="Ellipse 15">
+            <a:extLst>
+              <a:ext uri="{FF2B5EF4-FFF2-40B4-BE49-F238E27FC236}">
+                <a16:creationId xmlns:a16="http://schemas.microsoft.com/office/drawing/2014/main" id="{6B08FA4E-82A3-49CF-94AF-C3AF9A17377D}"/>
+              </a:ext>
+            </a:extLst>
+          </p:cNvPr>
+          <p:cNvSpPr/>
+          <p:nvPr/>
+        </p:nvSpPr>
+        <p:spPr>
+          <a:xfrm>
+            <a:off x="9456094" y="1602094"/>
+            <a:ext cx="720000" cy="720000"/>
+          </a:xfrm>
+          <a:prstGeom prst="ellipse">
+            <a:avLst/>
+          </a:prstGeom>
+          <a:solidFill>
+            <a:srgbClr val="00B050"/>
+          </a:solidFill>
+          <a:ln>
+            <a:solidFill>
+              <a:schemeClr val="tx2">
+                <a:lumMod val="75000"/>
+              </a:schemeClr>
+            </a:solidFill>
+          </a:ln>
+        </p:spPr>
+        <p:style>
+          <a:lnRef idx="2">
+            <a:schemeClr val="accent1">
+              <a:shade val="50000"/>
+            </a:schemeClr>
+          </a:lnRef>
+          <a:fillRef idx="1">
+            <a:schemeClr val="accent1"/>
+          </a:fillRef>
+          <a:effectRef idx="0">
+            <a:schemeClr val="accent1"/>
+          </a:effectRef>
+          <a:fontRef idx="minor">
+            <a:schemeClr val="lt1"/>
+          </a:fontRef>
+        </p:style>
+        <p:txBody>
+          <a:bodyPr rtlCol="0" anchor="ctr"/>
+          <a:lstStyle/>
+          <a:p>
+            <a:pPr algn="ctr"/>
+            <a:r>
+              <a:rPr lang="fr-FR" dirty="0">
+                <a:solidFill>
+                  <a:sysClr val="windowText" lastClr="000000"/>
+                </a:solidFill>
+              </a:rPr>
+              <a:t>C</a:t>
+            </a:r>
+          </a:p>
+        </p:txBody>
+      </p:sp>
+      <p:sp>
+        <p:nvSpPr>
+          <p:cNvPr id="17" name="Ellipse 16">
+            <a:extLst>
+              <a:ext uri="{FF2B5EF4-FFF2-40B4-BE49-F238E27FC236}">
+                <a16:creationId xmlns:a16="http://schemas.microsoft.com/office/drawing/2014/main" id="{5296B788-81F9-5C13-10C5-616B0736AECF}"/>
+              </a:ext>
+            </a:extLst>
+          </p:cNvPr>
+          <p:cNvSpPr/>
+          <p:nvPr/>
+        </p:nvSpPr>
+        <p:spPr>
+          <a:xfrm>
+            <a:off x="5856095" y="1602094"/>
+            <a:ext cx="720000" cy="720000"/>
+          </a:xfrm>
+          <a:prstGeom prst="ellipse">
+            <a:avLst/>
+          </a:prstGeom>
+          <a:solidFill>
+            <a:srgbClr val="00B050"/>
+          </a:solidFill>
+          <a:ln>
+            <a:solidFill>
+              <a:schemeClr val="tx2">
+                <a:lumMod val="75000"/>
+              </a:schemeClr>
+            </a:solidFill>
+          </a:ln>
+        </p:spPr>
+        <p:style>
+          <a:lnRef idx="2">
+            <a:schemeClr val="accent1">
+              <a:shade val="50000"/>
+            </a:schemeClr>
+          </a:lnRef>
+          <a:fillRef idx="1">
+            <a:schemeClr val="accent1"/>
+          </a:fillRef>
+          <a:effectRef idx="0">
+            <a:schemeClr val="accent1"/>
+          </a:effectRef>
+          <a:fontRef idx="minor">
+            <a:schemeClr val="lt1"/>
+          </a:fontRef>
+        </p:style>
+        <p:txBody>
+          <a:bodyPr rtlCol="0" anchor="ctr"/>
+          <a:lstStyle/>
+          <a:p>
+            <a:pPr algn="ctr"/>
+            <a:r>
+              <a:rPr lang="fr-FR" dirty="0">
+                <a:solidFill>
+                  <a:sysClr val="windowText" lastClr="000000"/>
+                </a:solidFill>
+              </a:rPr>
+              <a:t>A</a:t>
+            </a:r>
+          </a:p>
+        </p:txBody>
+      </p:sp>
+      <p:cxnSp>
+        <p:nvCxnSpPr>
+          <p:cNvPr id="3" name="Connecteur droit avec flèche 2">
+            <a:extLst>
+              <a:ext uri="{FF2B5EF4-FFF2-40B4-BE49-F238E27FC236}">
+                <a16:creationId xmlns:a16="http://schemas.microsoft.com/office/drawing/2014/main" id="{9AFE0879-E009-6244-73C5-D82726C94D12}"/>
+              </a:ext>
+            </a:extLst>
+          </p:cNvPr>
+          <p:cNvCxnSpPr>
+            <a:stCxn id="14" idx="7"/>
+            <a:endCxn id="16" idx="2"/>
+          </p:cNvCxnSpPr>
+          <p:nvPr/>
+        </p:nvCxnSpPr>
+        <p:spPr>
+          <a:xfrm flipV="1">
+            <a:off x="7123641" y="1962094"/>
+            <a:ext cx="2332453" cy="1905442"/>
+          </a:xfrm>
+          <a:prstGeom prst="straightConnector1">
+            <a:avLst/>
+          </a:prstGeom>
+          <a:ln w="57150">
+            <a:tailEnd type="triangle"/>
+          </a:ln>
+        </p:spPr>
+        <p:style>
+          <a:lnRef idx="1">
+            <a:schemeClr val="accent1"/>
+          </a:lnRef>
+          <a:fillRef idx="0">
+            <a:schemeClr val="accent1"/>
+          </a:fillRef>
+          <a:effectRef idx="0">
+            <a:schemeClr val="accent1"/>
+          </a:effectRef>
+          <a:fontRef idx="minor">
+            <a:schemeClr val="tx1"/>
+          </a:fontRef>
+        </p:style>
+      </p:cxnSp>
+      <p:cxnSp>
+        <p:nvCxnSpPr>
+          <p:cNvPr id="22" name="Connecteur droit avec flèche 21">
+            <a:extLst>
+              <a:ext uri="{FF2B5EF4-FFF2-40B4-BE49-F238E27FC236}">
+                <a16:creationId xmlns:a16="http://schemas.microsoft.com/office/drawing/2014/main" id="{E17DA64D-2D17-3D99-8D86-FAAEFBBA2E37}"/>
+              </a:ext>
+            </a:extLst>
+          </p:cNvPr>
+          <p:cNvCxnSpPr>
+            <a:cxnSpLocks/>
+            <a:stCxn id="16" idx="4"/>
+            <a:endCxn id="15" idx="7"/>
+          </p:cNvCxnSpPr>
+          <p:nvPr/>
+        </p:nvCxnSpPr>
+        <p:spPr>
+          <a:xfrm flipH="1">
+            <a:off x="9417665" y="2322094"/>
+            <a:ext cx="398429" cy="1545442"/>
+          </a:xfrm>
+          <a:prstGeom prst="straightConnector1">
+            <a:avLst/>
+          </a:prstGeom>
+          <a:ln w="57150">
+            <a:tailEnd type="triangle"/>
+          </a:ln>
+        </p:spPr>
+        <p:style>
+          <a:lnRef idx="1">
+            <a:schemeClr val="accent1"/>
+          </a:lnRef>
+          <a:fillRef idx="0">
+            <a:schemeClr val="accent1"/>
+          </a:fillRef>
+          <a:effectRef idx="0">
+            <a:schemeClr val="accent1"/>
+          </a:effectRef>
+          <a:fontRef idx="minor">
+            <a:schemeClr val="tx1"/>
+          </a:fontRef>
+        </p:style>
+      </p:cxnSp>
+      <p:cxnSp>
+        <p:nvCxnSpPr>
+          <p:cNvPr id="26" name="Connecteur droit avec flèche 25">
+            <a:extLst>
+              <a:ext uri="{FF2B5EF4-FFF2-40B4-BE49-F238E27FC236}">
+                <a16:creationId xmlns:a16="http://schemas.microsoft.com/office/drawing/2014/main" id="{30A673B5-965E-DB61-84F1-400C5B1992C8}"/>
+              </a:ext>
+            </a:extLst>
+          </p:cNvPr>
+          <p:cNvCxnSpPr>
+            <a:cxnSpLocks/>
+            <a:stCxn id="15" idx="0"/>
+            <a:endCxn id="13" idx="5"/>
+          </p:cNvCxnSpPr>
+          <p:nvPr/>
+        </p:nvCxnSpPr>
+        <p:spPr>
+          <a:xfrm flipH="1" flipV="1">
+            <a:off x="8270652" y="776652"/>
+            <a:ext cx="892455" cy="2985442"/>
+          </a:xfrm>
+          <a:prstGeom prst="straightConnector1">
+            <a:avLst/>
+          </a:prstGeom>
+          <a:ln w="57150">
+            <a:tailEnd type="triangle"/>
+          </a:ln>
+        </p:spPr>
+        <p:style>
+          <a:lnRef idx="1">
+            <a:schemeClr val="accent1"/>
+          </a:lnRef>
+          <a:fillRef idx="0">
+            <a:schemeClr val="accent1"/>
+          </a:fillRef>
+          <a:effectRef idx="0">
+            <a:schemeClr val="accent1"/>
+          </a:effectRef>
+          <a:fontRef idx="minor">
+            <a:schemeClr val="tx1"/>
+          </a:fontRef>
+        </p:style>
+      </p:cxnSp>
+    </p:spTree>
+    <p:extLst>
+      <p:ext uri="{BB962C8B-B14F-4D97-AF65-F5344CB8AC3E}">
+        <p14:creationId xmlns:p14="http://schemas.microsoft.com/office/powerpoint/2010/main" val="1853638013"/>
+      </p:ext>
+    </p:extLst>
+  </p:cSld>
+  <p:clrMapOvr>
+    <a:masterClrMapping/>
+  </p:clrMapOvr>
+</p:sld>
+</file>
+
+<file path=ppt/slides/slide14.xml><?xml version="1.0" encoding="utf-8"?>
+<p:sld xmlns:a="http://schemas.openxmlformats.org/drawingml/2006/main" xmlns:r="http://schemas.openxmlformats.org/officeDocument/2006/relationships" xmlns:p="http://schemas.openxmlformats.org/presentationml/2006/main">
+  <p:cSld>
+    <p:spTree>
+      <p:nvGrpSpPr>
+        <p:cNvPr id="1" name=""/>
+        <p:cNvGrpSpPr/>
+        <p:nvPr/>
+      </p:nvGrpSpPr>
+      <p:grpSpPr>
+        <a:xfrm>
+          <a:off x="0" y="0"/>
+          <a:ext cx="0" cy="0"/>
+          <a:chOff x="0" y="0"/>
+          <a:chExt cx="0" cy="0"/>
+        </a:xfrm>
+      </p:grpSpPr>
+      <p:pic>
+        <p:nvPicPr>
+          <p:cNvPr id="4" name="Image 3">
+            <a:extLst>
+              <a:ext uri="{FF2B5EF4-FFF2-40B4-BE49-F238E27FC236}">
+                <a16:creationId xmlns:a16="http://schemas.microsoft.com/office/drawing/2014/main" id="{D954B2A3-1BF1-173F-D394-CEA1E7B14011}"/>
+              </a:ext>
+            </a:extLst>
+          </p:cNvPr>
+          <p:cNvPicPr>
+            <a:picLocks noChangeAspect="1"/>
+          </p:cNvPicPr>
+          <p:nvPr/>
+        </p:nvPicPr>
+        <p:blipFill rotWithShape="1">
+          <a:blip r:embed="rId2"/>
+          <a:srcRect l="441" r="1"/>
+          <a:stretch/>
+        </p:blipFill>
+        <p:spPr>
+          <a:xfrm>
+            <a:off x="3221232" y="169404"/>
+            <a:ext cx="2422001" cy="1440000"/>
+          </a:xfrm>
+          <a:prstGeom prst="rect">
+            <a:avLst/>
+          </a:prstGeom>
+        </p:spPr>
+      </p:pic>
+      <p:pic>
+        <p:nvPicPr>
+          <p:cNvPr id="5" name="Image 4">
+            <a:extLst>
+              <a:ext uri="{FF2B5EF4-FFF2-40B4-BE49-F238E27FC236}">
+                <a16:creationId xmlns:a16="http://schemas.microsoft.com/office/drawing/2014/main" id="{F18641F5-4916-80F9-394B-D259A63B43C4}"/>
+              </a:ext>
+            </a:extLst>
+          </p:cNvPr>
+          <p:cNvPicPr>
+            <a:picLocks noChangeAspect="1"/>
+          </p:cNvPicPr>
+          <p:nvPr/>
+        </p:nvPicPr>
+        <p:blipFill>
+          <a:blip r:embed="rId3"/>
+          <a:stretch>
+            <a:fillRect/>
+          </a:stretch>
+        </p:blipFill>
+        <p:spPr>
+          <a:xfrm>
+            <a:off x="3712232" y="5179148"/>
+            <a:ext cx="1440000" cy="1440000"/>
+          </a:xfrm>
+          <a:prstGeom prst="rect">
+            <a:avLst/>
+          </a:prstGeom>
+        </p:spPr>
+      </p:pic>
+      <p:pic>
+        <p:nvPicPr>
+          <p:cNvPr id="8" name="Image 7">
+            <a:extLst>
+              <a:ext uri="{FF2B5EF4-FFF2-40B4-BE49-F238E27FC236}">
+                <a16:creationId xmlns:a16="http://schemas.microsoft.com/office/drawing/2014/main" id="{6FF67927-B984-1225-1728-53A9097DB226}"/>
+              </a:ext>
+            </a:extLst>
+          </p:cNvPr>
+          <p:cNvPicPr>
+            <a:picLocks noChangeAspect="1"/>
+          </p:cNvPicPr>
+          <p:nvPr/>
+        </p:nvPicPr>
+        <p:blipFill>
+          <a:blip r:embed="rId4"/>
+          <a:stretch>
+            <a:fillRect/>
+          </a:stretch>
+        </p:blipFill>
+        <p:spPr>
+          <a:xfrm>
+            <a:off x="6456873" y="169404"/>
+            <a:ext cx="2472865" cy="1440000"/>
+          </a:xfrm>
+          <a:prstGeom prst="rect">
+            <a:avLst/>
+          </a:prstGeom>
+          <a:ln>
+            <a:solidFill>
+              <a:schemeClr val="tx1"/>
+            </a:solidFill>
+          </a:ln>
+        </p:spPr>
+      </p:pic>
+      <p:pic>
+        <p:nvPicPr>
+          <p:cNvPr id="9" name="Image 8">
+            <a:extLst>
+              <a:ext uri="{FF2B5EF4-FFF2-40B4-BE49-F238E27FC236}">
+                <a16:creationId xmlns:a16="http://schemas.microsoft.com/office/drawing/2014/main" id="{C52507E0-3A80-AD7E-90AA-00534FEAEB06}"/>
+              </a:ext>
+            </a:extLst>
+          </p:cNvPr>
+          <p:cNvPicPr>
+            <a:picLocks noChangeAspect="1"/>
+          </p:cNvPicPr>
+          <p:nvPr/>
+        </p:nvPicPr>
+        <p:blipFill>
+          <a:blip r:embed="rId5"/>
+          <a:stretch>
+            <a:fillRect/>
+          </a:stretch>
+        </p:blipFill>
+        <p:spPr>
+          <a:xfrm>
+            <a:off x="6909589" y="2674276"/>
+            <a:ext cx="1567434" cy="1440000"/>
+          </a:xfrm>
+          <a:prstGeom prst="rect">
+            <a:avLst/>
+          </a:prstGeom>
+          <a:ln>
+            <a:solidFill>
+              <a:schemeClr val="tx1"/>
+            </a:solidFill>
+          </a:ln>
+        </p:spPr>
+      </p:pic>
+      <p:sp>
+        <p:nvSpPr>
+          <p:cNvPr id="10" name="Flèche : droite 9">
+            <a:extLst>
+              <a:ext uri="{FF2B5EF4-FFF2-40B4-BE49-F238E27FC236}">
+                <a16:creationId xmlns:a16="http://schemas.microsoft.com/office/drawing/2014/main" id="{88D0E747-96D5-512F-F42D-C11B01B806DC}"/>
+              </a:ext>
+            </a:extLst>
+          </p:cNvPr>
+          <p:cNvSpPr/>
+          <p:nvPr/>
+        </p:nvSpPr>
+        <p:spPr>
+          <a:xfrm rot="5400000">
+            <a:off x="4072232" y="1769742"/>
+            <a:ext cx="720000" cy="720000"/>
+          </a:xfrm>
+          <a:prstGeom prst="rightArrow">
+            <a:avLst/>
+          </a:prstGeom>
+          <a:solidFill>
+            <a:schemeClr val="tx1"/>
+          </a:solidFill>
+          <a:ln>
+            <a:solidFill>
+              <a:schemeClr val="tx1"/>
+            </a:solidFill>
+          </a:ln>
+        </p:spPr>
+        <p:style>
+          <a:lnRef idx="2">
+            <a:schemeClr val="accent1">
+              <a:shade val="50000"/>
+            </a:schemeClr>
+          </a:lnRef>
+          <a:fillRef idx="1">
+            <a:schemeClr val="accent1"/>
+          </a:fillRef>
+          <a:effectRef idx="0">
+            <a:schemeClr val="accent1"/>
+          </a:effectRef>
+          <a:fontRef idx="minor">
+            <a:schemeClr val="lt1"/>
+          </a:fontRef>
+        </p:style>
+        <p:txBody>
+          <a:bodyPr rtlCol="0" anchor="ctr"/>
+          <a:lstStyle/>
+          <a:p>
+            <a:pPr algn="ctr"/>
+            <a:endParaRPr lang="fr-FR"/>
+          </a:p>
+        </p:txBody>
+      </p:sp>
+      <p:sp>
+        <p:nvSpPr>
+          <p:cNvPr id="11" name="Flèche : droite 10">
+            <a:extLst>
+              <a:ext uri="{FF2B5EF4-FFF2-40B4-BE49-F238E27FC236}">
+                <a16:creationId xmlns:a16="http://schemas.microsoft.com/office/drawing/2014/main" id="{3947F6BC-F500-924C-9C48-1D090A984A75}"/>
+              </a:ext>
+            </a:extLst>
+          </p:cNvPr>
+          <p:cNvSpPr/>
+          <p:nvPr/>
+        </p:nvSpPr>
+        <p:spPr>
+          <a:xfrm rot="5400000">
+            <a:off x="4072232" y="4298810"/>
+            <a:ext cx="720000" cy="720000"/>
+          </a:xfrm>
+          <a:prstGeom prst="rightArrow">
+            <a:avLst/>
+          </a:prstGeom>
+          <a:solidFill>
+            <a:schemeClr val="tx1"/>
+          </a:solidFill>
+          <a:ln>
+            <a:solidFill>
+              <a:schemeClr val="tx1"/>
+            </a:solidFill>
+          </a:ln>
+        </p:spPr>
+        <p:style>
+          <a:lnRef idx="2">
+            <a:schemeClr val="accent1">
+              <a:shade val="50000"/>
+            </a:schemeClr>
+          </a:lnRef>
+          <a:fillRef idx="1">
+            <a:schemeClr val="accent1"/>
+          </a:fillRef>
+          <a:effectRef idx="0">
+            <a:schemeClr val="accent1"/>
+          </a:effectRef>
+          <a:fontRef idx="minor">
+            <a:schemeClr val="lt1"/>
+          </a:fontRef>
+        </p:style>
+        <p:txBody>
+          <a:bodyPr rtlCol="0" anchor="ctr"/>
+          <a:lstStyle/>
+          <a:p>
+            <a:pPr algn="ctr"/>
+            <a:endParaRPr lang="fr-FR"/>
+          </a:p>
+        </p:txBody>
+      </p:sp>
+      <p:sp>
+        <p:nvSpPr>
+          <p:cNvPr id="12" name="Flèche : droite 11">
+            <a:extLst>
+              <a:ext uri="{FF2B5EF4-FFF2-40B4-BE49-F238E27FC236}">
+                <a16:creationId xmlns:a16="http://schemas.microsoft.com/office/drawing/2014/main" id="{178A8AE6-A93F-7AD4-20D8-B17B3A37EAF8}"/>
+              </a:ext>
+            </a:extLst>
+          </p:cNvPr>
+          <p:cNvSpPr/>
+          <p:nvPr/>
+        </p:nvSpPr>
+        <p:spPr>
+          <a:xfrm rot="16200000">
+            <a:off x="7333305" y="4298810"/>
+            <a:ext cx="720000" cy="720000"/>
+          </a:xfrm>
+          <a:prstGeom prst="rightArrow">
+            <a:avLst/>
+          </a:prstGeom>
+          <a:solidFill>
+            <a:schemeClr val="tx1"/>
+          </a:solidFill>
+          <a:ln>
+            <a:solidFill>
+              <a:schemeClr val="tx1"/>
+            </a:solidFill>
+          </a:ln>
+        </p:spPr>
+        <p:style>
+          <a:lnRef idx="2">
+            <a:schemeClr val="accent1">
+              <a:shade val="50000"/>
+            </a:schemeClr>
+          </a:lnRef>
+          <a:fillRef idx="1">
+            <a:schemeClr val="accent1"/>
+          </a:fillRef>
+          <a:effectRef idx="0">
+            <a:schemeClr val="accent1"/>
+          </a:effectRef>
+          <a:fontRef idx="minor">
+            <a:schemeClr val="lt1"/>
+          </a:fontRef>
+        </p:style>
+        <p:txBody>
+          <a:bodyPr rtlCol="0" anchor="ctr"/>
+          <a:lstStyle/>
+          <a:p>
+            <a:pPr algn="ctr"/>
+            <a:endParaRPr lang="fr-FR"/>
+          </a:p>
+        </p:txBody>
+      </p:sp>
+      <p:sp>
+        <p:nvSpPr>
+          <p:cNvPr id="13" name="Flèche : droite 12">
+            <a:extLst>
+              <a:ext uri="{FF2B5EF4-FFF2-40B4-BE49-F238E27FC236}">
+                <a16:creationId xmlns:a16="http://schemas.microsoft.com/office/drawing/2014/main" id="{567AF8B1-6C18-388F-587F-2BBDC3CC2688}"/>
+              </a:ext>
+            </a:extLst>
+          </p:cNvPr>
+          <p:cNvSpPr/>
+          <p:nvPr/>
+        </p:nvSpPr>
+        <p:spPr>
+          <a:xfrm rot="16200000">
+            <a:off x="7333306" y="1713577"/>
+            <a:ext cx="720000" cy="720000"/>
+          </a:xfrm>
+          <a:prstGeom prst="rightArrow">
+            <a:avLst/>
+          </a:prstGeom>
+          <a:solidFill>
+            <a:schemeClr val="tx1"/>
+          </a:solidFill>
+          <a:ln>
+            <a:solidFill>
+              <a:schemeClr val="tx1"/>
+            </a:solidFill>
+          </a:ln>
+        </p:spPr>
+        <p:style>
+          <a:lnRef idx="2">
+            <a:schemeClr val="accent1">
+              <a:shade val="50000"/>
+            </a:schemeClr>
+          </a:lnRef>
+          <a:fillRef idx="1">
+            <a:schemeClr val="accent1"/>
+          </a:fillRef>
+          <a:effectRef idx="0">
+            <a:schemeClr val="accent1"/>
+          </a:effectRef>
+          <a:fontRef idx="minor">
+            <a:schemeClr val="lt1"/>
+          </a:fontRef>
+        </p:style>
+        <p:txBody>
+          <a:bodyPr rtlCol="0" anchor="ctr"/>
+          <a:lstStyle/>
+          <a:p>
+            <a:pPr algn="ctr"/>
+            <a:endParaRPr lang="fr-FR"/>
+          </a:p>
+        </p:txBody>
+      </p:sp>
+      <p:sp>
+        <p:nvSpPr>
+          <p:cNvPr id="14" name="Flèche : droite 13">
+            <a:extLst>
+              <a:ext uri="{FF2B5EF4-FFF2-40B4-BE49-F238E27FC236}">
+                <a16:creationId xmlns:a16="http://schemas.microsoft.com/office/drawing/2014/main" id="{C3FB9085-7BB5-75A5-1AB3-5FA09C3E913E}"/>
+              </a:ext>
+            </a:extLst>
+          </p:cNvPr>
+          <p:cNvSpPr/>
+          <p:nvPr/>
+        </p:nvSpPr>
+        <p:spPr>
+          <a:xfrm>
+            <a:off x="5736873" y="5899148"/>
+            <a:ext cx="720000" cy="720000"/>
+          </a:xfrm>
+          <a:prstGeom prst="rightArrow">
+            <a:avLst/>
+          </a:prstGeom>
+          <a:solidFill>
+            <a:schemeClr val="tx1"/>
+          </a:solidFill>
+          <a:ln>
+            <a:solidFill>
+              <a:schemeClr val="tx1"/>
+            </a:solidFill>
+          </a:ln>
+        </p:spPr>
+        <p:style>
+          <a:lnRef idx="2">
+            <a:schemeClr val="accent1">
+              <a:shade val="50000"/>
+            </a:schemeClr>
+          </a:lnRef>
+          <a:fillRef idx="1">
+            <a:schemeClr val="accent1"/>
+          </a:fillRef>
+          <a:effectRef idx="0">
+            <a:schemeClr val="accent1"/>
+          </a:effectRef>
+          <a:fontRef idx="minor">
+            <a:schemeClr val="lt1"/>
+          </a:fontRef>
+        </p:style>
+        <p:txBody>
+          <a:bodyPr rtlCol="0" anchor="ctr"/>
+          <a:lstStyle/>
+          <a:p>
+            <a:pPr algn="ctr"/>
+            <a:endParaRPr lang="fr-FR"/>
+          </a:p>
+        </p:txBody>
+      </p:sp>
+      <p:pic>
+        <p:nvPicPr>
+          <p:cNvPr id="2" name="Image 1">
+            <a:extLst>
+              <a:ext uri="{FF2B5EF4-FFF2-40B4-BE49-F238E27FC236}">
+                <a16:creationId xmlns:a16="http://schemas.microsoft.com/office/drawing/2014/main" id="{B2AF4E2B-8522-A669-0C6A-9DB275FC0612}"/>
+              </a:ext>
+            </a:extLst>
+          </p:cNvPr>
+          <p:cNvPicPr>
+            <a:picLocks noChangeAspect="1"/>
+          </p:cNvPicPr>
+          <p:nvPr/>
+        </p:nvPicPr>
+        <p:blipFill>
+          <a:blip r:embed="rId6"/>
+          <a:stretch>
+            <a:fillRect/>
+          </a:stretch>
+        </p:blipFill>
+        <p:spPr>
+          <a:xfrm>
+            <a:off x="3351862" y="2674276"/>
+            <a:ext cx="2160740" cy="1440000"/>
+          </a:xfrm>
+          <a:prstGeom prst="rect">
+            <a:avLst/>
+          </a:prstGeom>
+        </p:spPr>
+      </p:pic>
+      <p:pic>
+        <p:nvPicPr>
+          <p:cNvPr id="3" name="Image 2">
+            <a:extLst>
+              <a:ext uri="{FF2B5EF4-FFF2-40B4-BE49-F238E27FC236}">
+                <a16:creationId xmlns:a16="http://schemas.microsoft.com/office/drawing/2014/main" id="{D8392B9C-873F-27B2-7203-64DB17337C96}"/>
+              </a:ext>
+            </a:extLst>
+          </p:cNvPr>
+          <p:cNvPicPr>
+            <a:picLocks noChangeAspect="1"/>
+          </p:cNvPicPr>
+          <p:nvPr/>
+        </p:nvPicPr>
+        <p:blipFill>
+          <a:blip r:embed="rId7"/>
+          <a:stretch>
+            <a:fillRect/>
+          </a:stretch>
+        </p:blipFill>
+        <p:spPr>
+          <a:xfrm>
+            <a:off x="6973305" y="5179148"/>
+            <a:ext cx="1440000" cy="1440000"/>
+          </a:xfrm>
+          <a:prstGeom prst="rect">
+            <a:avLst/>
+          </a:prstGeom>
+        </p:spPr>
+      </p:pic>
+    </p:spTree>
+    <p:extLst>
+      <p:ext uri="{BB962C8B-B14F-4D97-AF65-F5344CB8AC3E}">
+        <p14:creationId xmlns:p14="http://schemas.microsoft.com/office/powerpoint/2010/main" val="2342873752"/>
+      </p:ext>
+    </p:extLst>
+  </p:cSld>
+  <p:clrMapOvr>
+    <a:masterClrMapping/>
+  </p:clrMapOvr>
+</p:sld>
+</file>
+
+<file path=ppt/slides/slide15.xml><?xml version="1.0" encoding="utf-8"?>
+<p:sld xmlns:a="http://schemas.openxmlformats.org/drawingml/2006/main" xmlns:r="http://schemas.openxmlformats.org/officeDocument/2006/relationships" xmlns:p="http://schemas.openxmlformats.org/presentationml/2006/main">
+  <p:cSld>
+    <p:spTree>
+      <p:nvGrpSpPr>
+        <p:cNvPr id="1" name=""/>
+        <p:cNvGrpSpPr/>
+        <p:nvPr/>
+      </p:nvGrpSpPr>
+      <p:grpSpPr>
+        <a:xfrm>
+          <a:off x="0" y="0"/>
+          <a:ext cx="0" cy="0"/>
+          <a:chOff x="0" y="0"/>
+          <a:chExt cx="0" cy="0"/>
+        </a:xfrm>
+      </p:grpSpPr>
+      <p:pic>
+        <p:nvPicPr>
+          <p:cNvPr id="5" name="Image 4">
+            <a:extLst>
+              <a:ext uri="{FF2B5EF4-FFF2-40B4-BE49-F238E27FC236}">
+                <a16:creationId xmlns:a16="http://schemas.microsoft.com/office/drawing/2014/main" id="{B8F40A2D-531A-BFC4-A268-BBDD5705A382}"/>
+              </a:ext>
+            </a:extLst>
+          </p:cNvPr>
+          <p:cNvPicPr>
+            <a:picLocks noChangeAspect="1"/>
+          </p:cNvPicPr>
+          <p:nvPr/>
+        </p:nvPicPr>
+        <p:blipFill rotWithShape="1">
+          <a:blip r:embed="rId2"/>
+          <a:srcRect l="441" r="1"/>
+          <a:stretch/>
+        </p:blipFill>
+        <p:spPr>
+          <a:xfrm>
+            <a:off x="1554748" y="729000"/>
+            <a:ext cx="9082504" cy="5400000"/>
+          </a:xfrm>
+          <a:prstGeom prst="rect">
+            <a:avLst/>
+          </a:prstGeom>
+        </p:spPr>
+      </p:pic>
+    </p:spTree>
+    <p:extLst>
+      <p:ext uri="{BB962C8B-B14F-4D97-AF65-F5344CB8AC3E}">
+        <p14:creationId xmlns:p14="http://schemas.microsoft.com/office/powerpoint/2010/main" val="113855983"/>
+      </p:ext>
+    </p:extLst>
+  </p:cSld>
+  <p:clrMapOvr>
+    <a:masterClrMapping/>
+  </p:clrMapOvr>
+</p:sld>
+</file>
+
+<file path=ppt/slides/slide16.xml><?xml version="1.0" encoding="utf-8"?>
+<p:sld xmlns:a="http://schemas.openxmlformats.org/drawingml/2006/main" xmlns:r="http://schemas.openxmlformats.org/officeDocument/2006/relationships" xmlns:p="http://schemas.openxmlformats.org/presentationml/2006/main">
+  <p:cSld>
+    <p:spTree>
+      <p:nvGrpSpPr>
+        <p:cNvPr id="1" name=""/>
+        <p:cNvGrpSpPr/>
+        <p:nvPr/>
+      </p:nvGrpSpPr>
+      <p:grpSpPr>
+        <a:xfrm>
+          <a:off x="0" y="0"/>
+          <a:ext cx="0" cy="0"/>
+          <a:chOff x="0" y="0"/>
+          <a:chExt cx="0" cy="0"/>
+        </a:xfrm>
+      </p:grpSpPr>
+      <p:pic>
+        <p:nvPicPr>
+          <p:cNvPr id="5" name="Image 4">
+            <a:extLst>
+              <a:ext uri="{FF2B5EF4-FFF2-40B4-BE49-F238E27FC236}">
+                <a16:creationId xmlns:a16="http://schemas.microsoft.com/office/drawing/2014/main" id="{8D113428-5CEA-6B3A-7A0F-6EF9BF131BEE}"/>
+              </a:ext>
+            </a:extLst>
+          </p:cNvPr>
+          <p:cNvPicPr>
+            <a:picLocks noChangeAspect="1"/>
+          </p:cNvPicPr>
+          <p:nvPr/>
+        </p:nvPicPr>
+        <p:blipFill>
+          <a:blip r:embed="rId2"/>
+          <a:stretch>
+            <a:fillRect/>
+          </a:stretch>
+        </p:blipFill>
+        <p:spPr>
+          <a:xfrm>
+            <a:off x="2044612" y="729000"/>
+            <a:ext cx="8102775" cy="5400000"/>
+          </a:xfrm>
+          <a:prstGeom prst="rect">
+            <a:avLst/>
+          </a:prstGeom>
+        </p:spPr>
+      </p:pic>
+    </p:spTree>
+    <p:extLst>
+      <p:ext uri="{BB962C8B-B14F-4D97-AF65-F5344CB8AC3E}">
+        <p14:creationId xmlns:p14="http://schemas.microsoft.com/office/powerpoint/2010/main" val="2404082420"/>
+      </p:ext>
+    </p:extLst>
+  </p:cSld>
+  <p:clrMapOvr>
+    <a:masterClrMapping/>
+  </p:clrMapOvr>
+</p:sld>
+</file>
+
+<file path=ppt/slides/slide17.xml><?xml version="1.0" encoding="utf-8"?>
+<p:sld xmlns:a="http://schemas.openxmlformats.org/drawingml/2006/main" xmlns:r="http://schemas.openxmlformats.org/officeDocument/2006/relationships" xmlns:p="http://schemas.openxmlformats.org/presentationml/2006/main">
+  <p:cSld>
+    <p:spTree>
+      <p:nvGrpSpPr>
+        <p:cNvPr id="1" name=""/>
+        <p:cNvGrpSpPr/>
+        <p:nvPr/>
+      </p:nvGrpSpPr>
+      <p:grpSpPr>
+        <a:xfrm>
+          <a:off x="0" y="0"/>
+          <a:ext cx="0" cy="0"/>
+          <a:chOff x="0" y="0"/>
+          <a:chExt cx="0" cy="0"/>
+        </a:xfrm>
+      </p:grpSpPr>
+      <p:pic>
+        <p:nvPicPr>
+          <p:cNvPr id="4" name="Image 3">
+            <a:extLst>
+              <a:ext uri="{FF2B5EF4-FFF2-40B4-BE49-F238E27FC236}">
+                <a16:creationId xmlns:a16="http://schemas.microsoft.com/office/drawing/2014/main" id="{01282CE2-7D0A-E51A-DF71-858CC8B2D39B}"/>
+              </a:ext>
+            </a:extLst>
+          </p:cNvPr>
+          <p:cNvPicPr>
+            <a:picLocks noChangeAspect="1"/>
+          </p:cNvPicPr>
+          <p:nvPr/>
+        </p:nvPicPr>
+        <p:blipFill>
+          <a:blip r:embed="rId2"/>
+          <a:stretch>
+            <a:fillRect/>
+          </a:stretch>
+        </p:blipFill>
+        <p:spPr>
+          <a:xfrm>
+            <a:off x="3396000" y="729000"/>
+            <a:ext cx="5400000" cy="5400000"/>
+          </a:xfrm>
+          <a:prstGeom prst="rect">
+            <a:avLst/>
+          </a:prstGeom>
+        </p:spPr>
+      </p:pic>
+    </p:spTree>
+    <p:extLst>
+      <p:ext uri="{BB962C8B-B14F-4D97-AF65-F5344CB8AC3E}">
+        <p14:creationId xmlns:p14="http://schemas.microsoft.com/office/powerpoint/2010/main" val="59680007"/>
+      </p:ext>
+    </p:extLst>
+  </p:cSld>
+  <p:clrMapOvr>
+    <a:masterClrMapping/>
+  </p:clrMapOvr>
+</p:sld>
+</file>
+
+<file path=ppt/slides/slide18.xml><?xml version="1.0" encoding="utf-8"?>
+<p:sld xmlns:a="http://schemas.openxmlformats.org/drawingml/2006/main" xmlns:r="http://schemas.openxmlformats.org/officeDocument/2006/relationships" xmlns:p="http://schemas.openxmlformats.org/presentationml/2006/main">
+  <p:cSld>
+    <p:spTree>
+      <p:nvGrpSpPr>
+        <p:cNvPr id="1" name=""/>
+        <p:cNvGrpSpPr/>
+        <p:nvPr/>
+      </p:nvGrpSpPr>
+      <p:grpSpPr>
+        <a:xfrm>
+          <a:off x="0" y="0"/>
+          <a:ext cx="0" cy="0"/>
+          <a:chOff x="0" y="0"/>
+          <a:chExt cx="0" cy="0"/>
+        </a:xfrm>
+      </p:grpSpPr>
+      <p:pic>
+        <p:nvPicPr>
+          <p:cNvPr id="2" name="Image 1">
+            <a:extLst>
+              <a:ext uri="{FF2B5EF4-FFF2-40B4-BE49-F238E27FC236}">
+                <a16:creationId xmlns:a16="http://schemas.microsoft.com/office/drawing/2014/main" id="{BFFDBBD3-0915-26A8-0112-89E939BC2328}"/>
+              </a:ext>
+            </a:extLst>
+          </p:cNvPr>
+          <p:cNvPicPr>
+            <a:picLocks noChangeAspect="1"/>
+          </p:cNvPicPr>
+          <p:nvPr/>
+        </p:nvPicPr>
+        <p:blipFill>
+          <a:blip r:embed="rId2"/>
+          <a:stretch>
+            <a:fillRect/>
+          </a:stretch>
+        </p:blipFill>
+        <p:spPr>
+          <a:xfrm>
+            <a:off x="3396000" y="729000"/>
+            <a:ext cx="5400000" cy="5400000"/>
+          </a:xfrm>
+          <a:prstGeom prst="rect">
+            <a:avLst/>
+          </a:prstGeom>
+        </p:spPr>
+      </p:pic>
+    </p:spTree>
+    <p:extLst>
+      <p:ext uri="{BB962C8B-B14F-4D97-AF65-F5344CB8AC3E}">
+        <p14:creationId xmlns:p14="http://schemas.microsoft.com/office/powerpoint/2010/main" val="4003567920"/>
+      </p:ext>
+    </p:extLst>
+  </p:cSld>
+  <p:clrMapOvr>
+    <a:masterClrMapping/>
+  </p:clrMapOvr>
+</p:sld>
+</file>
+
+<file path=ppt/slides/slide19.xml><?xml version="1.0" encoding="utf-8"?>
+<p:sld xmlns:a="http://schemas.openxmlformats.org/drawingml/2006/main" xmlns:r="http://schemas.openxmlformats.org/officeDocument/2006/relationships" xmlns:p="http://schemas.openxmlformats.org/presentationml/2006/main">
+  <p:cSld>
+    <p:spTree>
+      <p:nvGrpSpPr>
+        <p:cNvPr id="1" name=""/>
+        <p:cNvGrpSpPr/>
+        <p:nvPr/>
+      </p:nvGrpSpPr>
+      <p:grpSpPr>
+        <a:xfrm>
+          <a:off x="0" y="0"/>
+          <a:ext cx="0" cy="0"/>
+          <a:chOff x="0" y="0"/>
+          <a:chExt cx="0" cy="0"/>
+        </a:xfrm>
+      </p:grpSpPr>
+      <p:pic>
+        <p:nvPicPr>
+          <p:cNvPr id="4" name="Image 3">
+            <a:extLst>
+              <a:ext uri="{FF2B5EF4-FFF2-40B4-BE49-F238E27FC236}">
+                <a16:creationId xmlns:a16="http://schemas.microsoft.com/office/drawing/2014/main" id="{EF713965-214A-8C73-8C1B-A18265050F11}"/>
+              </a:ext>
+            </a:extLst>
+          </p:cNvPr>
+          <p:cNvPicPr>
+            <a:picLocks noChangeAspect="1"/>
+          </p:cNvPicPr>
+          <p:nvPr/>
+        </p:nvPicPr>
+        <p:blipFill>
+          <a:blip r:embed="rId2"/>
+          <a:stretch>
+            <a:fillRect/>
+          </a:stretch>
+        </p:blipFill>
+        <p:spPr>
+          <a:xfrm>
+            <a:off x="3157061" y="729000"/>
+            <a:ext cx="5877878" cy="5400000"/>
+          </a:xfrm>
+          <a:prstGeom prst="rect">
+            <a:avLst/>
+          </a:prstGeom>
+          <a:ln>
+            <a:solidFill>
+              <a:schemeClr val="tx1"/>
+            </a:solidFill>
+          </a:ln>
+        </p:spPr>
+      </p:pic>
+    </p:spTree>
+    <p:extLst>
+      <p:ext uri="{BB962C8B-B14F-4D97-AF65-F5344CB8AC3E}">
+        <p14:creationId xmlns:p14="http://schemas.microsoft.com/office/powerpoint/2010/main" val="1648253722"/>
+      </p:ext>
+    </p:extLst>
+  </p:cSld>
+  <p:clrMapOvr>
+    <a:masterClrMapping/>
+  </p:clrMapOvr>
+</p:sld>
+</file>
+
 <file path=ppt/slides/slide2.xml><?xml version="1.0" encoding="utf-8"?>
 <p:sld xmlns:a="http://schemas.openxmlformats.org/drawingml/2006/main" xmlns:r="http://schemas.openxmlformats.org/officeDocument/2006/relationships" xmlns:p="http://schemas.openxmlformats.org/presentationml/2006/main">
   <p:cSld>
@@ -4460,6 +8641,71 @@
     <p:extLst>
       <p:ext uri="{BB962C8B-B14F-4D97-AF65-F5344CB8AC3E}">
         <p14:creationId xmlns:p14="http://schemas.microsoft.com/office/powerpoint/2010/main" val="2355507801"/>
+      </p:ext>
+    </p:extLst>
+  </p:cSld>
+  <p:clrMapOvr>
+    <a:masterClrMapping/>
+  </p:clrMapOvr>
+</p:sld>
+</file>
+
+<file path=ppt/slides/slide20.xml><?xml version="1.0" encoding="utf-8"?>
+<p:sld xmlns:a="http://schemas.openxmlformats.org/drawingml/2006/main" xmlns:r="http://schemas.openxmlformats.org/officeDocument/2006/relationships" xmlns:p="http://schemas.openxmlformats.org/presentationml/2006/main">
+  <p:cSld>
+    <p:spTree>
+      <p:nvGrpSpPr>
+        <p:cNvPr id="1" name=""/>
+        <p:cNvGrpSpPr/>
+        <p:nvPr/>
+      </p:nvGrpSpPr>
+      <p:grpSpPr>
+        <a:xfrm>
+          <a:off x="0" y="0"/>
+          <a:ext cx="0" cy="0"/>
+          <a:chOff x="0" y="0"/>
+          <a:chExt cx="0" cy="0"/>
+        </a:xfrm>
+      </p:grpSpPr>
+      <p:pic>
+        <p:nvPicPr>
+          <p:cNvPr id="4" name="Image 3">
+            <a:extLst>
+              <a:ext uri="{FF2B5EF4-FFF2-40B4-BE49-F238E27FC236}">
+                <a16:creationId xmlns:a16="http://schemas.microsoft.com/office/drawing/2014/main" id="{D9102EA5-7F78-2582-B203-330B3711B6E5}"/>
+              </a:ext>
+            </a:extLst>
+          </p:cNvPr>
+          <p:cNvPicPr>
+            <a:picLocks noChangeAspect="1"/>
+          </p:cNvPicPr>
+          <p:nvPr/>
+        </p:nvPicPr>
+        <p:blipFill>
+          <a:blip r:embed="rId2"/>
+          <a:stretch>
+            <a:fillRect/>
+          </a:stretch>
+        </p:blipFill>
+        <p:spPr>
+          <a:xfrm>
+            <a:off x="1459378" y="729000"/>
+            <a:ext cx="9273244" cy="5400000"/>
+          </a:xfrm>
+          <a:prstGeom prst="rect">
+            <a:avLst/>
+          </a:prstGeom>
+          <a:ln>
+            <a:solidFill>
+              <a:schemeClr val="tx1"/>
+            </a:solidFill>
+          </a:ln>
+        </p:spPr>
+      </p:pic>
+    </p:spTree>
+    <p:extLst>
+      <p:ext uri="{BB962C8B-B14F-4D97-AF65-F5344CB8AC3E}">
+        <p14:creationId xmlns:p14="http://schemas.microsoft.com/office/powerpoint/2010/main" val="4080206632"/>
       </p:ext>
     </p:extLst>
   </p:cSld>
@@ -6841,100 +11087,6 @@
       </p:cxnSp>
       <p:cxnSp>
         <p:nvCxnSpPr>
-          <p:cNvPr id="61" name="Connecteur droit avec flèche 60">
-            <a:extLst>
-              <a:ext uri="{FF2B5EF4-FFF2-40B4-BE49-F238E27FC236}">
-                <a16:creationId xmlns:a16="http://schemas.microsoft.com/office/drawing/2014/main" id="{B39E8715-791A-AD8D-E4D1-31035C375185}"/>
-              </a:ext>
-            </a:extLst>
-          </p:cNvPr>
-          <p:cNvCxnSpPr>
-            <a:cxnSpLocks/>
-            <a:stCxn id="57" idx="1"/>
-            <a:endCxn id="6" idx="6"/>
-          </p:cNvCxnSpPr>
-          <p:nvPr/>
-        </p:nvCxnSpPr>
-        <p:spPr>
-          <a:xfrm flipH="1" flipV="1">
-            <a:off x="2774337" y="522094"/>
-            <a:ext cx="1185442" cy="1185442"/>
-          </a:xfrm>
-          <a:prstGeom prst="straightConnector1">
-            <a:avLst/>
-          </a:prstGeom>
-          <a:ln w="38100">
-            <a:solidFill>
-              <a:schemeClr val="tx2"/>
-            </a:solidFill>
-            <a:headEnd type="triangle"/>
-            <a:tailEnd type="triangle"/>
-          </a:ln>
-        </p:spPr>
-        <p:style>
-          <a:lnRef idx="1">
-            <a:schemeClr val="accent1"/>
-          </a:lnRef>
-          <a:fillRef idx="0">
-            <a:schemeClr val="accent1"/>
-          </a:fillRef>
-          <a:effectRef idx="0">
-            <a:schemeClr val="accent1"/>
-          </a:effectRef>
-          <a:fontRef idx="minor">
-            <a:schemeClr val="tx1"/>
-          </a:fontRef>
-        </p:style>
-      </p:cxnSp>
-      <p:cxnSp>
-        <p:nvCxnSpPr>
-          <p:cNvPr id="64" name="Connecteur droit avec flèche 63">
-            <a:extLst>
-              <a:ext uri="{FF2B5EF4-FFF2-40B4-BE49-F238E27FC236}">
-                <a16:creationId xmlns:a16="http://schemas.microsoft.com/office/drawing/2014/main" id="{37CAD5C5-C826-605D-B9B7-519FCCB3346F}"/>
-              </a:ext>
-            </a:extLst>
-          </p:cNvPr>
-          <p:cNvCxnSpPr>
-            <a:cxnSpLocks/>
-            <a:stCxn id="55" idx="0"/>
-            <a:endCxn id="6" idx="3"/>
-          </p:cNvCxnSpPr>
-          <p:nvPr/>
-        </p:nvCxnSpPr>
-        <p:spPr>
-          <a:xfrm flipV="1">
-            <a:off x="1267326" y="776652"/>
-            <a:ext cx="892453" cy="2985442"/>
-          </a:xfrm>
-          <a:prstGeom prst="straightConnector1">
-            <a:avLst/>
-          </a:prstGeom>
-          <a:ln w="38100">
-            <a:solidFill>
-              <a:schemeClr val="tx2"/>
-            </a:solidFill>
-            <a:headEnd type="triangle"/>
-            <a:tailEnd type="triangle"/>
-          </a:ln>
-        </p:spPr>
-        <p:style>
-          <a:lnRef idx="1">
-            <a:schemeClr val="accent1"/>
-          </a:lnRef>
-          <a:fillRef idx="0">
-            <a:schemeClr val="accent1"/>
-          </a:fillRef>
-          <a:effectRef idx="0">
-            <a:schemeClr val="accent1"/>
-          </a:effectRef>
-          <a:fontRef idx="minor">
-            <a:schemeClr val="tx1"/>
-          </a:fontRef>
-        </p:style>
-      </p:cxnSp>
-      <p:cxnSp>
-        <p:nvCxnSpPr>
           <p:cNvPr id="67" name="Connecteur droit avec flèche 66">
             <a:extLst>
               <a:ext uri="{FF2B5EF4-FFF2-40B4-BE49-F238E27FC236}">
@@ -6982,147 +11134,6 @@
       </p:cxnSp>
       <p:cxnSp>
         <p:nvCxnSpPr>
-          <p:cNvPr id="70" name="Connecteur droit avec flèche 69">
-            <a:extLst>
-              <a:ext uri="{FF2B5EF4-FFF2-40B4-BE49-F238E27FC236}">
-                <a16:creationId xmlns:a16="http://schemas.microsoft.com/office/drawing/2014/main" id="{F21E6B60-66E7-40FA-7F1B-12C6F00EC9A4}"/>
-              </a:ext>
-            </a:extLst>
-          </p:cNvPr>
-          <p:cNvCxnSpPr>
-            <a:cxnSpLocks/>
-            <a:stCxn id="55" idx="6"/>
-            <a:endCxn id="56" idx="2"/>
-          </p:cNvCxnSpPr>
-          <p:nvPr/>
-        </p:nvCxnSpPr>
-        <p:spPr>
-          <a:xfrm>
-            <a:off x="1627326" y="4122094"/>
-            <a:ext cx="1574024" cy="0"/>
-          </a:xfrm>
-          <a:prstGeom prst="straightConnector1">
-            <a:avLst/>
-          </a:prstGeom>
-          <a:ln w="38100">
-            <a:solidFill>
-              <a:schemeClr val="tx2"/>
-            </a:solidFill>
-            <a:headEnd type="triangle"/>
-            <a:tailEnd type="triangle"/>
-          </a:ln>
-        </p:spPr>
-        <p:style>
-          <a:lnRef idx="1">
-            <a:schemeClr val="accent1"/>
-          </a:lnRef>
-          <a:fillRef idx="0">
-            <a:schemeClr val="accent1"/>
-          </a:fillRef>
-          <a:effectRef idx="0">
-            <a:schemeClr val="accent1"/>
-          </a:effectRef>
-          <a:fontRef idx="minor">
-            <a:schemeClr val="tx1"/>
-          </a:fontRef>
-        </p:style>
-      </p:cxnSp>
-      <p:cxnSp>
-        <p:nvCxnSpPr>
-          <p:cNvPr id="73" name="Connecteur droit avec flèche 72">
-            <a:extLst>
-              <a:ext uri="{FF2B5EF4-FFF2-40B4-BE49-F238E27FC236}">
-                <a16:creationId xmlns:a16="http://schemas.microsoft.com/office/drawing/2014/main" id="{36153713-EB60-D639-301C-77A5DCFA4A1A}"/>
-              </a:ext>
-            </a:extLst>
-          </p:cNvPr>
-          <p:cNvCxnSpPr>
-            <a:cxnSpLocks/>
-            <a:stCxn id="58" idx="6"/>
-            <a:endCxn id="57" idx="2"/>
-          </p:cNvCxnSpPr>
-          <p:nvPr/>
-        </p:nvCxnSpPr>
-        <p:spPr>
-          <a:xfrm>
-            <a:off x="974338" y="1962094"/>
-            <a:ext cx="2879999" cy="0"/>
-          </a:xfrm>
-          <a:prstGeom prst="straightConnector1">
-            <a:avLst/>
-          </a:prstGeom>
-          <a:ln w="38100">
-            <a:solidFill>
-              <a:schemeClr val="tx2"/>
-            </a:solidFill>
-            <a:headEnd type="triangle"/>
-            <a:tailEnd type="triangle"/>
-          </a:ln>
-        </p:spPr>
-        <p:style>
-          <a:lnRef idx="1">
-            <a:schemeClr val="accent1"/>
-          </a:lnRef>
-          <a:fillRef idx="0">
-            <a:schemeClr val="accent1"/>
-          </a:fillRef>
-          <a:effectRef idx="0">
-            <a:schemeClr val="accent1"/>
-          </a:effectRef>
-          <a:fontRef idx="minor">
-            <a:schemeClr val="tx1"/>
-          </a:fontRef>
-        </p:style>
-      </p:cxnSp>
-      <p:cxnSp>
-        <p:nvCxnSpPr>
-          <p:cNvPr id="76" name="Connecteur droit avec flèche 75">
-            <a:extLst>
-              <a:ext uri="{FF2B5EF4-FFF2-40B4-BE49-F238E27FC236}">
-                <a16:creationId xmlns:a16="http://schemas.microsoft.com/office/drawing/2014/main" id="{BA81C017-B7DF-46C4-2B35-D2F83441F443}"/>
-              </a:ext>
-            </a:extLst>
-          </p:cNvPr>
-          <p:cNvCxnSpPr>
-            <a:cxnSpLocks/>
-            <a:stCxn id="58" idx="4"/>
-            <a:endCxn id="55" idx="1"/>
-          </p:cNvCxnSpPr>
-          <p:nvPr/>
-        </p:nvCxnSpPr>
-        <p:spPr>
-          <a:xfrm>
-            <a:off x="614338" y="2322094"/>
-            <a:ext cx="398430" cy="1545442"/>
-          </a:xfrm>
-          <a:prstGeom prst="straightConnector1">
-            <a:avLst/>
-          </a:prstGeom>
-          <a:ln w="38100">
-            <a:solidFill>
-              <a:schemeClr val="tx2"/>
-            </a:solidFill>
-            <a:headEnd type="triangle"/>
-            <a:tailEnd type="triangle"/>
-          </a:ln>
-        </p:spPr>
-        <p:style>
-          <a:lnRef idx="1">
-            <a:schemeClr val="accent1"/>
-          </a:lnRef>
-          <a:fillRef idx="0">
-            <a:schemeClr val="accent1"/>
-          </a:fillRef>
-          <a:effectRef idx="0">
-            <a:schemeClr val="accent1"/>
-          </a:effectRef>
-          <a:fontRef idx="minor">
-            <a:schemeClr val="tx1"/>
-          </a:fontRef>
-        </p:style>
-      </p:cxnSp>
-      <p:cxnSp>
-        <p:nvCxnSpPr>
           <p:cNvPr id="81" name="Connecteur droit avec flèche 80">
             <a:extLst>
               <a:ext uri="{FF2B5EF4-FFF2-40B4-BE49-F238E27FC236}">
@@ -7188,53 +11199,6 @@
           <a:xfrm flipV="1">
             <a:off x="1521884" y="2216652"/>
             <a:ext cx="2437895" cy="1650884"/>
-          </a:xfrm>
-          <a:prstGeom prst="straightConnector1">
-            <a:avLst/>
-          </a:prstGeom>
-          <a:ln w="38100">
-            <a:solidFill>
-              <a:schemeClr val="tx2"/>
-            </a:solidFill>
-            <a:headEnd type="triangle"/>
-            <a:tailEnd type="triangle"/>
-          </a:ln>
-        </p:spPr>
-        <p:style>
-          <a:lnRef idx="1">
-            <a:schemeClr val="accent1"/>
-          </a:lnRef>
-          <a:fillRef idx="0">
-            <a:schemeClr val="accent1"/>
-          </a:fillRef>
-          <a:effectRef idx="0">
-            <a:schemeClr val="accent1"/>
-          </a:effectRef>
-          <a:fontRef idx="minor">
-            <a:schemeClr val="tx1"/>
-          </a:fontRef>
-        </p:style>
-      </p:cxnSp>
-      <p:cxnSp>
-        <p:nvCxnSpPr>
-          <p:cNvPr id="87" name="Connecteur droit avec flèche 86">
-            <a:extLst>
-              <a:ext uri="{FF2B5EF4-FFF2-40B4-BE49-F238E27FC236}">
-                <a16:creationId xmlns:a16="http://schemas.microsoft.com/office/drawing/2014/main" id="{F706A206-3C50-8A4E-1BB6-44FDB2BEC297}"/>
-              </a:ext>
-            </a:extLst>
-          </p:cNvPr>
-          <p:cNvCxnSpPr>
-            <a:cxnSpLocks/>
-            <a:stCxn id="58" idx="5"/>
-            <a:endCxn id="56" idx="1"/>
-          </p:cNvCxnSpPr>
-          <p:nvPr/>
-        </p:nvCxnSpPr>
-        <p:spPr>
-          <a:xfrm>
-            <a:off x="868896" y="2216652"/>
-            <a:ext cx="2437896" cy="1650884"/>
           </a:xfrm>
           <a:prstGeom prst="straightConnector1">
             <a:avLst/>

</xml_diff>

<commit_message>
Ajout de fonction d'importation et exportation de dataset
</commit_message>
<xml_diff>
--- a/docs/brouillons.pptx
+++ b/docs/brouillons.pptx
@@ -25,6 +25,9 @@
     <p:sldId id="272" r:id="rId19"/>
     <p:sldId id="273" r:id="rId20"/>
     <p:sldId id="274" r:id="rId21"/>
+    <p:sldId id="276" r:id="rId22"/>
+    <p:sldId id="277" r:id="rId23"/>
+    <p:sldId id="278" r:id="rId24"/>
   </p:sldIdLst>
   <p:sldSz cx="12192000" cy="6858000"/>
   <p:notesSz cx="6858000" cy="9144000"/>
@@ -278,7 +281,7 @@
           <a:p>
             <a:fld id="{107AB83E-34B7-49CA-AD50-EEE4555425AC}" type="datetimeFigureOut">
               <a:rPr lang="fr-FR" smtClean="0"/>
-              <a:t>09/03/2023</a:t>
+              <a:t>17/03/2023</a:t>
             </a:fld>
             <a:endParaRPr lang="fr-FR"/>
           </a:p>
@@ -476,7 +479,7 @@
           <a:p>
             <a:fld id="{107AB83E-34B7-49CA-AD50-EEE4555425AC}" type="datetimeFigureOut">
               <a:rPr lang="fr-FR" smtClean="0"/>
-              <a:t>09/03/2023</a:t>
+              <a:t>17/03/2023</a:t>
             </a:fld>
             <a:endParaRPr lang="fr-FR"/>
           </a:p>
@@ -684,7 +687,7 @@
           <a:p>
             <a:fld id="{107AB83E-34B7-49CA-AD50-EEE4555425AC}" type="datetimeFigureOut">
               <a:rPr lang="fr-FR" smtClean="0"/>
-              <a:t>09/03/2023</a:t>
+              <a:t>17/03/2023</a:t>
             </a:fld>
             <a:endParaRPr lang="fr-FR"/>
           </a:p>
@@ -882,7 +885,7 @@
           <a:p>
             <a:fld id="{107AB83E-34B7-49CA-AD50-EEE4555425AC}" type="datetimeFigureOut">
               <a:rPr lang="fr-FR" smtClean="0"/>
-              <a:t>09/03/2023</a:t>
+              <a:t>17/03/2023</a:t>
             </a:fld>
             <a:endParaRPr lang="fr-FR"/>
           </a:p>
@@ -1157,7 +1160,7 @@
           <a:p>
             <a:fld id="{107AB83E-34B7-49CA-AD50-EEE4555425AC}" type="datetimeFigureOut">
               <a:rPr lang="fr-FR" smtClean="0"/>
-              <a:t>09/03/2023</a:t>
+              <a:t>17/03/2023</a:t>
             </a:fld>
             <a:endParaRPr lang="fr-FR"/>
           </a:p>
@@ -1422,7 +1425,7 @@
           <a:p>
             <a:fld id="{107AB83E-34B7-49CA-AD50-EEE4555425AC}" type="datetimeFigureOut">
               <a:rPr lang="fr-FR" smtClean="0"/>
-              <a:t>09/03/2023</a:t>
+              <a:t>17/03/2023</a:t>
             </a:fld>
             <a:endParaRPr lang="fr-FR"/>
           </a:p>
@@ -1834,7 +1837,7 @@
           <a:p>
             <a:fld id="{107AB83E-34B7-49CA-AD50-EEE4555425AC}" type="datetimeFigureOut">
               <a:rPr lang="fr-FR" smtClean="0"/>
-              <a:t>09/03/2023</a:t>
+              <a:t>17/03/2023</a:t>
             </a:fld>
             <a:endParaRPr lang="fr-FR"/>
           </a:p>
@@ -1975,7 +1978,7 @@
           <a:p>
             <a:fld id="{107AB83E-34B7-49CA-AD50-EEE4555425AC}" type="datetimeFigureOut">
               <a:rPr lang="fr-FR" smtClean="0"/>
-              <a:t>09/03/2023</a:t>
+              <a:t>17/03/2023</a:t>
             </a:fld>
             <a:endParaRPr lang="fr-FR"/>
           </a:p>
@@ -2088,7 +2091,7 @@
           <a:p>
             <a:fld id="{107AB83E-34B7-49CA-AD50-EEE4555425AC}" type="datetimeFigureOut">
               <a:rPr lang="fr-FR" smtClean="0"/>
-              <a:t>09/03/2023</a:t>
+              <a:t>17/03/2023</a:t>
             </a:fld>
             <a:endParaRPr lang="fr-FR"/>
           </a:p>
@@ -2399,7 +2402,7 @@
           <a:p>
             <a:fld id="{107AB83E-34B7-49CA-AD50-EEE4555425AC}" type="datetimeFigureOut">
               <a:rPr lang="fr-FR" smtClean="0"/>
-              <a:t>09/03/2023</a:t>
+              <a:t>17/03/2023</a:t>
             </a:fld>
             <a:endParaRPr lang="fr-FR"/>
           </a:p>
@@ -2687,7 +2690,7 @@
           <a:p>
             <a:fld id="{107AB83E-34B7-49CA-AD50-EEE4555425AC}" type="datetimeFigureOut">
               <a:rPr lang="fr-FR" smtClean="0"/>
-              <a:t>09/03/2023</a:t>
+              <a:t>17/03/2023</a:t>
             </a:fld>
             <a:endParaRPr lang="fr-FR"/>
           </a:p>
@@ -2928,7 +2931,7 @@
           <a:p>
             <a:fld id="{107AB83E-34B7-49CA-AD50-EEE4555425AC}" type="datetimeFigureOut">
               <a:rPr lang="fr-FR" smtClean="0"/>
-              <a:t>09/03/2023</a:t>
+              <a:t>17/03/2023</a:t>
             </a:fld>
             <a:endParaRPr lang="fr-FR"/>
           </a:p>
@@ -8715,6 +8718,2024 @@
 </p:sld>
 </file>
 
+<file path=ppt/slides/slide21.xml><?xml version="1.0" encoding="utf-8"?>
+<p:sld xmlns:a="http://schemas.openxmlformats.org/drawingml/2006/main" xmlns:r="http://schemas.openxmlformats.org/officeDocument/2006/relationships" xmlns:p="http://schemas.openxmlformats.org/presentationml/2006/main">
+  <p:cSld>
+    <p:spTree>
+      <p:nvGrpSpPr>
+        <p:cNvPr id="1" name=""/>
+        <p:cNvGrpSpPr/>
+        <p:nvPr/>
+      </p:nvGrpSpPr>
+      <p:grpSpPr>
+        <a:xfrm>
+          <a:off x="0" y="0"/>
+          <a:ext cx="0" cy="0"/>
+          <a:chOff x="0" y="0"/>
+          <a:chExt cx="0" cy="0"/>
+        </a:xfrm>
+      </p:grpSpPr>
+      <p:sp>
+        <p:nvSpPr>
+          <p:cNvPr id="4" name="Ellipse 3">
+            <a:extLst>
+              <a:ext uri="{FF2B5EF4-FFF2-40B4-BE49-F238E27FC236}">
+                <a16:creationId xmlns:a16="http://schemas.microsoft.com/office/drawing/2014/main" id="{A15B1302-6934-69B1-88AE-B2D7F8FD8F51}"/>
+              </a:ext>
+            </a:extLst>
+          </p:cNvPr>
+          <p:cNvSpPr/>
+          <p:nvPr/>
+        </p:nvSpPr>
+        <p:spPr>
+          <a:xfrm>
+            <a:off x="1652272" y="486137"/>
+            <a:ext cx="720000" cy="720000"/>
+          </a:xfrm>
+          <a:prstGeom prst="ellipse">
+            <a:avLst/>
+          </a:prstGeom>
+          <a:solidFill>
+            <a:srgbClr val="FF0000"/>
+          </a:solidFill>
+          <a:ln>
+            <a:solidFill>
+              <a:schemeClr val="tx2">
+                <a:lumMod val="75000"/>
+              </a:schemeClr>
+            </a:solidFill>
+          </a:ln>
+        </p:spPr>
+        <p:style>
+          <a:lnRef idx="2">
+            <a:schemeClr val="accent1">
+              <a:shade val="50000"/>
+            </a:schemeClr>
+          </a:lnRef>
+          <a:fillRef idx="1">
+            <a:schemeClr val="accent1"/>
+          </a:fillRef>
+          <a:effectRef idx="0">
+            <a:schemeClr val="accent1"/>
+          </a:effectRef>
+          <a:fontRef idx="minor">
+            <a:schemeClr val="lt1"/>
+          </a:fontRef>
+        </p:style>
+        <p:txBody>
+          <a:bodyPr rtlCol="0" anchor="ctr"/>
+          <a:lstStyle/>
+          <a:p>
+            <a:pPr algn="ctr"/>
+            <a:r>
+              <a:rPr lang="fr-FR" dirty="0">
+                <a:solidFill>
+                  <a:sysClr val="windowText" lastClr="000000"/>
+                </a:solidFill>
+              </a:rPr>
+              <a:t>A1</a:t>
+            </a:r>
+          </a:p>
+        </p:txBody>
+      </p:sp>
+      <p:sp>
+        <p:nvSpPr>
+          <p:cNvPr id="5" name="Ellipse 4">
+            <a:extLst>
+              <a:ext uri="{FF2B5EF4-FFF2-40B4-BE49-F238E27FC236}">
+                <a16:creationId xmlns:a16="http://schemas.microsoft.com/office/drawing/2014/main" id="{323E12D3-07C1-1278-DAC8-3A7210C52B5F}"/>
+              </a:ext>
+            </a:extLst>
+          </p:cNvPr>
+          <p:cNvSpPr/>
+          <p:nvPr/>
+        </p:nvSpPr>
+        <p:spPr>
+          <a:xfrm>
+            <a:off x="3694136" y="486137"/>
+            <a:ext cx="720000" cy="720000"/>
+          </a:xfrm>
+          <a:prstGeom prst="ellipse">
+            <a:avLst/>
+          </a:prstGeom>
+          <a:solidFill>
+            <a:srgbClr val="00B050"/>
+          </a:solidFill>
+          <a:ln>
+            <a:solidFill>
+              <a:schemeClr val="tx2">
+                <a:lumMod val="75000"/>
+              </a:schemeClr>
+            </a:solidFill>
+          </a:ln>
+        </p:spPr>
+        <p:style>
+          <a:lnRef idx="2">
+            <a:schemeClr val="accent1">
+              <a:shade val="50000"/>
+            </a:schemeClr>
+          </a:lnRef>
+          <a:fillRef idx="1">
+            <a:schemeClr val="accent1"/>
+          </a:fillRef>
+          <a:effectRef idx="0">
+            <a:schemeClr val="accent1"/>
+          </a:effectRef>
+          <a:fontRef idx="minor">
+            <a:schemeClr val="lt1"/>
+          </a:fontRef>
+        </p:style>
+        <p:txBody>
+          <a:bodyPr rtlCol="0" anchor="ctr"/>
+          <a:lstStyle/>
+          <a:p>
+            <a:pPr algn="ctr"/>
+            <a:r>
+              <a:rPr lang="fr-FR" dirty="0">
+                <a:solidFill>
+                  <a:sysClr val="windowText" lastClr="000000"/>
+                </a:solidFill>
+              </a:rPr>
+              <a:t>A2</a:t>
+            </a:r>
+          </a:p>
+        </p:txBody>
+      </p:sp>
+      <p:sp>
+        <p:nvSpPr>
+          <p:cNvPr id="6" name="Ellipse 5">
+            <a:extLst>
+              <a:ext uri="{FF2B5EF4-FFF2-40B4-BE49-F238E27FC236}">
+                <a16:creationId xmlns:a16="http://schemas.microsoft.com/office/drawing/2014/main" id="{98BE3DD4-0196-9035-8FA0-5FF6EDAB86EF}"/>
+              </a:ext>
+            </a:extLst>
+          </p:cNvPr>
+          <p:cNvSpPr/>
+          <p:nvPr/>
+        </p:nvSpPr>
+        <p:spPr>
+          <a:xfrm>
+            <a:off x="5736000" y="486137"/>
+            <a:ext cx="720000" cy="720000"/>
+          </a:xfrm>
+          <a:prstGeom prst="ellipse">
+            <a:avLst/>
+          </a:prstGeom>
+          <a:solidFill>
+            <a:schemeClr val="bg1"/>
+          </a:solidFill>
+          <a:ln>
+            <a:solidFill>
+              <a:schemeClr val="tx2">
+                <a:lumMod val="75000"/>
+              </a:schemeClr>
+            </a:solidFill>
+          </a:ln>
+        </p:spPr>
+        <p:style>
+          <a:lnRef idx="2">
+            <a:schemeClr val="accent1">
+              <a:shade val="50000"/>
+            </a:schemeClr>
+          </a:lnRef>
+          <a:fillRef idx="1">
+            <a:schemeClr val="accent1"/>
+          </a:fillRef>
+          <a:effectRef idx="0">
+            <a:schemeClr val="accent1"/>
+          </a:effectRef>
+          <a:fontRef idx="minor">
+            <a:schemeClr val="lt1"/>
+          </a:fontRef>
+        </p:style>
+        <p:txBody>
+          <a:bodyPr rtlCol="0" anchor="ctr"/>
+          <a:lstStyle/>
+          <a:p>
+            <a:pPr algn="ctr"/>
+            <a:r>
+              <a:rPr lang="fr-FR" dirty="0">
+                <a:solidFill>
+                  <a:sysClr val="windowText" lastClr="000000"/>
+                </a:solidFill>
+              </a:rPr>
+              <a:t>A3</a:t>
+            </a:r>
+          </a:p>
+        </p:txBody>
+      </p:sp>
+      <p:cxnSp>
+        <p:nvCxnSpPr>
+          <p:cNvPr id="9" name="Connecteur droit avec flèche 8">
+            <a:extLst>
+              <a:ext uri="{FF2B5EF4-FFF2-40B4-BE49-F238E27FC236}">
+                <a16:creationId xmlns:a16="http://schemas.microsoft.com/office/drawing/2014/main" id="{E8465A82-4E85-F7DF-64BD-F6DA215D9604}"/>
+              </a:ext>
+            </a:extLst>
+          </p:cNvPr>
+          <p:cNvCxnSpPr>
+            <a:cxnSpLocks/>
+            <a:stCxn id="4" idx="6"/>
+            <a:endCxn id="5" idx="2"/>
+          </p:cNvCxnSpPr>
+          <p:nvPr/>
+        </p:nvCxnSpPr>
+        <p:spPr>
+          <a:xfrm>
+            <a:off x="2372272" y="846137"/>
+            <a:ext cx="1321864" cy="0"/>
+          </a:xfrm>
+          <a:prstGeom prst="straightConnector1">
+            <a:avLst/>
+          </a:prstGeom>
+          <a:ln w="38100">
+            <a:solidFill>
+              <a:schemeClr val="tx2"/>
+            </a:solidFill>
+            <a:headEnd type="triangle"/>
+            <a:tailEnd type="triangle"/>
+          </a:ln>
+        </p:spPr>
+        <p:style>
+          <a:lnRef idx="1">
+            <a:schemeClr val="accent1"/>
+          </a:lnRef>
+          <a:fillRef idx="0">
+            <a:schemeClr val="accent1"/>
+          </a:fillRef>
+          <a:effectRef idx="0">
+            <a:schemeClr val="accent1"/>
+          </a:effectRef>
+          <a:fontRef idx="minor">
+            <a:schemeClr val="tx1"/>
+          </a:fontRef>
+        </p:style>
+      </p:cxnSp>
+      <p:cxnSp>
+        <p:nvCxnSpPr>
+          <p:cNvPr id="10" name="Connecteur droit avec flèche 9">
+            <a:extLst>
+              <a:ext uri="{FF2B5EF4-FFF2-40B4-BE49-F238E27FC236}">
+                <a16:creationId xmlns:a16="http://schemas.microsoft.com/office/drawing/2014/main" id="{760222B1-4F79-DA4E-1727-C26848A3BFFD}"/>
+              </a:ext>
+            </a:extLst>
+          </p:cNvPr>
+          <p:cNvCxnSpPr>
+            <a:cxnSpLocks/>
+          </p:cNvCxnSpPr>
+          <p:nvPr/>
+        </p:nvCxnSpPr>
+        <p:spPr>
+          <a:xfrm>
+            <a:off x="4414136" y="846137"/>
+            <a:ext cx="1321864" cy="0"/>
+          </a:xfrm>
+          <a:prstGeom prst="straightConnector1">
+            <a:avLst/>
+          </a:prstGeom>
+          <a:ln w="38100">
+            <a:solidFill>
+              <a:schemeClr val="tx2"/>
+            </a:solidFill>
+            <a:headEnd type="triangle"/>
+            <a:tailEnd type="triangle"/>
+          </a:ln>
+        </p:spPr>
+        <p:style>
+          <a:lnRef idx="1">
+            <a:schemeClr val="accent1"/>
+          </a:lnRef>
+          <a:fillRef idx="0">
+            <a:schemeClr val="accent1"/>
+          </a:fillRef>
+          <a:effectRef idx="0">
+            <a:schemeClr val="accent1"/>
+          </a:effectRef>
+          <a:fontRef idx="minor">
+            <a:schemeClr val="tx1"/>
+          </a:fontRef>
+        </p:style>
+      </p:cxnSp>
+      <p:cxnSp>
+        <p:nvCxnSpPr>
+          <p:cNvPr id="13" name="Connecteur droit avec flèche 12">
+            <a:extLst>
+              <a:ext uri="{FF2B5EF4-FFF2-40B4-BE49-F238E27FC236}">
+                <a16:creationId xmlns:a16="http://schemas.microsoft.com/office/drawing/2014/main" id="{C558B491-1E78-6AE9-2407-A97F9489A458}"/>
+              </a:ext>
+            </a:extLst>
+          </p:cNvPr>
+          <p:cNvCxnSpPr>
+            <a:cxnSpLocks/>
+            <a:stCxn id="4" idx="4"/>
+          </p:cNvCxnSpPr>
+          <p:nvPr/>
+        </p:nvCxnSpPr>
+        <p:spPr>
+          <a:xfrm>
+            <a:off x="2012272" y="1206137"/>
+            <a:ext cx="0" cy="990587"/>
+          </a:xfrm>
+          <a:prstGeom prst="straightConnector1">
+            <a:avLst/>
+          </a:prstGeom>
+          <a:ln w="38100">
+            <a:solidFill>
+              <a:schemeClr val="tx2"/>
+            </a:solidFill>
+            <a:headEnd type="triangle"/>
+            <a:tailEnd type="triangle"/>
+          </a:ln>
+        </p:spPr>
+        <p:style>
+          <a:lnRef idx="1">
+            <a:schemeClr val="accent1"/>
+          </a:lnRef>
+          <a:fillRef idx="0">
+            <a:schemeClr val="accent1"/>
+          </a:fillRef>
+          <a:effectRef idx="0">
+            <a:schemeClr val="accent1"/>
+          </a:effectRef>
+          <a:fontRef idx="minor">
+            <a:schemeClr val="tx1"/>
+          </a:fontRef>
+        </p:style>
+      </p:cxnSp>
+      <p:cxnSp>
+        <p:nvCxnSpPr>
+          <p:cNvPr id="14" name="Connecteur droit avec flèche 13">
+            <a:extLst>
+              <a:ext uri="{FF2B5EF4-FFF2-40B4-BE49-F238E27FC236}">
+                <a16:creationId xmlns:a16="http://schemas.microsoft.com/office/drawing/2014/main" id="{1B69D213-5B15-4714-4300-CC256DBA180F}"/>
+              </a:ext>
+            </a:extLst>
+          </p:cNvPr>
+          <p:cNvCxnSpPr>
+            <a:cxnSpLocks/>
+          </p:cNvCxnSpPr>
+          <p:nvPr/>
+        </p:nvCxnSpPr>
+        <p:spPr>
+          <a:xfrm>
+            <a:off x="4065917" y="1206137"/>
+            <a:ext cx="0" cy="990587"/>
+          </a:xfrm>
+          <a:prstGeom prst="straightConnector1">
+            <a:avLst/>
+          </a:prstGeom>
+          <a:ln w="38100">
+            <a:solidFill>
+              <a:schemeClr val="tx2"/>
+            </a:solidFill>
+            <a:headEnd type="triangle"/>
+            <a:tailEnd type="triangle"/>
+          </a:ln>
+        </p:spPr>
+        <p:style>
+          <a:lnRef idx="1">
+            <a:schemeClr val="accent1"/>
+          </a:lnRef>
+          <a:fillRef idx="0">
+            <a:schemeClr val="accent1"/>
+          </a:fillRef>
+          <a:effectRef idx="0">
+            <a:schemeClr val="accent1"/>
+          </a:effectRef>
+          <a:fontRef idx="minor">
+            <a:schemeClr val="tx1"/>
+          </a:fontRef>
+        </p:style>
+      </p:cxnSp>
+      <p:cxnSp>
+        <p:nvCxnSpPr>
+          <p:cNvPr id="15" name="Connecteur droit avec flèche 14">
+            <a:extLst>
+              <a:ext uri="{FF2B5EF4-FFF2-40B4-BE49-F238E27FC236}">
+                <a16:creationId xmlns:a16="http://schemas.microsoft.com/office/drawing/2014/main" id="{C52B1E09-63A5-AC31-FDDE-7D7410F68292}"/>
+              </a:ext>
+            </a:extLst>
+          </p:cNvPr>
+          <p:cNvCxnSpPr>
+            <a:cxnSpLocks/>
+          </p:cNvCxnSpPr>
+          <p:nvPr/>
+        </p:nvCxnSpPr>
+        <p:spPr>
+          <a:xfrm>
+            <a:off x="6073057" y="1206137"/>
+            <a:ext cx="0" cy="990587"/>
+          </a:xfrm>
+          <a:prstGeom prst="straightConnector1">
+            <a:avLst/>
+          </a:prstGeom>
+          <a:ln w="38100">
+            <a:solidFill>
+              <a:schemeClr val="tx2"/>
+            </a:solidFill>
+            <a:headEnd type="triangle"/>
+            <a:tailEnd type="triangle"/>
+          </a:ln>
+        </p:spPr>
+        <p:style>
+          <a:lnRef idx="1">
+            <a:schemeClr val="accent1"/>
+          </a:lnRef>
+          <a:fillRef idx="0">
+            <a:schemeClr val="accent1"/>
+          </a:fillRef>
+          <a:effectRef idx="0">
+            <a:schemeClr val="accent1"/>
+          </a:effectRef>
+          <a:fontRef idx="minor">
+            <a:schemeClr val="tx1"/>
+          </a:fontRef>
+        </p:style>
+      </p:cxnSp>
+      <p:cxnSp>
+        <p:nvCxnSpPr>
+          <p:cNvPr id="18" name="Connecteur droit avec flèche 17">
+            <a:extLst>
+              <a:ext uri="{FF2B5EF4-FFF2-40B4-BE49-F238E27FC236}">
+                <a16:creationId xmlns:a16="http://schemas.microsoft.com/office/drawing/2014/main" id="{CBC3EF00-4562-5F8A-95B6-A15411E731C3}"/>
+              </a:ext>
+            </a:extLst>
+          </p:cNvPr>
+          <p:cNvCxnSpPr>
+            <a:cxnSpLocks/>
+          </p:cNvCxnSpPr>
+          <p:nvPr/>
+        </p:nvCxnSpPr>
+        <p:spPr>
+          <a:xfrm>
+            <a:off x="2012272" y="2916724"/>
+            <a:ext cx="0" cy="990587"/>
+          </a:xfrm>
+          <a:prstGeom prst="straightConnector1">
+            <a:avLst/>
+          </a:prstGeom>
+          <a:ln w="38100">
+            <a:solidFill>
+              <a:schemeClr val="tx2"/>
+            </a:solidFill>
+            <a:headEnd type="triangle"/>
+            <a:tailEnd type="triangle"/>
+          </a:ln>
+        </p:spPr>
+        <p:style>
+          <a:lnRef idx="1">
+            <a:schemeClr val="accent1"/>
+          </a:lnRef>
+          <a:fillRef idx="0">
+            <a:schemeClr val="accent1"/>
+          </a:fillRef>
+          <a:effectRef idx="0">
+            <a:schemeClr val="accent1"/>
+          </a:effectRef>
+          <a:fontRef idx="minor">
+            <a:schemeClr val="tx1"/>
+          </a:fontRef>
+        </p:style>
+      </p:cxnSp>
+      <p:cxnSp>
+        <p:nvCxnSpPr>
+          <p:cNvPr id="19" name="Connecteur droit avec flèche 18">
+            <a:extLst>
+              <a:ext uri="{FF2B5EF4-FFF2-40B4-BE49-F238E27FC236}">
+                <a16:creationId xmlns:a16="http://schemas.microsoft.com/office/drawing/2014/main" id="{AC49CA92-EBC4-12CD-F290-B051EC738A4E}"/>
+              </a:ext>
+            </a:extLst>
+          </p:cNvPr>
+          <p:cNvCxnSpPr>
+            <a:cxnSpLocks/>
+          </p:cNvCxnSpPr>
+          <p:nvPr/>
+        </p:nvCxnSpPr>
+        <p:spPr>
+          <a:xfrm>
+            <a:off x="4054136" y="2916723"/>
+            <a:ext cx="0" cy="990587"/>
+          </a:xfrm>
+          <a:prstGeom prst="straightConnector1">
+            <a:avLst/>
+          </a:prstGeom>
+          <a:ln w="38100">
+            <a:solidFill>
+              <a:schemeClr val="tx2"/>
+            </a:solidFill>
+            <a:headEnd type="triangle"/>
+            <a:tailEnd type="triangle"/>
+          </a:ln>
+        </p:spPr>
+        <p:style>
+          <a:lnRef idx="1">
+            <a:schemeClr val="accent1"/>
+          </a:lnRef>
+          <a:fillRef idx="0">
+            <a:schemeClr val="accent1"/>
+          </a:fillRef>
+          <a:effectRef idx="0">
+            <a:schemeClr val="accent1"/>
+          </a:effectRef>
+          <a:fontRef idx="minor">
+            <a:schemeClr val="tx1"/>
+          </a:fontRef>
+        </p:style>
+      </p:cxnSp>
+      <p:cxnSp>
+        <p:nvCxnSpPr>
+          <p:cNvPr id="20" name="Connecteur droit avec flèche 19">
+            <a:extLst>
+              <a:ext uri="{FF2B5EF4-FFF2-40B4-BE49-F238E27FC236}">
+                <a16:creationId xmlns:a16="http://schemas.microsoft.com/office/drawing/2014/main" id="{B884D416-66DD-A4CB-524E-B9924C86EC34}"/>
+              </a:ext>
+            </a:extLst>
+          </p:cNvPr>
+          <p:cNvCxnSpPr>
+            <a:cxnSpLocks/>
+          </p:cNvCxnSpPr>
+          <p:nvPr/>
+        </p:nvCxnSpPr>
+        <p:spPr>
+          <a:xfrm>
+            <a:off x="6096000" y="2916722"/>
+            <a:ext cx="0" cy="990587"/>
+          </a:xfrm>
+          <a:prstGeom prst="straightConnector1">
+            <a:avLst/>
+          </a:prstGeom>
+          <a:ln w="38100">
+            <a:solidFill>
+              <a:schemeClr val="tx2"/>
+            </a:solidFill>
+            <a:headEnd type="triangle"/>
+            <a:tailEnd type="triangle"/>
+          </a:ln>
+        </p:spPr>
+        <p:style>
+          <a:lnRef idx="1">
+            <a:schemeClr val="accent1"/>
+          </a:lnRef>
+          <a:fillRef idx="0">
+            <a:schemeClr val="accent1"/>
+          </a:fillRef>
+          <a:effectRef idx="0">
+            <a:schemeClr val="accent1"/>
+          </a:effectRef>
+          <a:fontRef idx="minor">
+            <a:schemeClr val="tx1"/>
+          </a:fontRef>
+        </p:style>
+      </p:cxnSp>
+      <p:sp>
+        <p:nvSpPr>
+          <p:cNvPr id="23" name="Ellipse 22">
+            <a:extLst>
+              <a:ext uri="{FF2B5EF4-FFF2-40B4-BE49-F238E27FC236}">
+                <a16:creationId xmlns:a16="http://schemas.microsoft.com/office/drawing/2014/main" id="{5C92D845-3DEB-6089-BE60-7E0C16C89A18}"/>
+              </a:ext>
+            </a:extLst>
+          </p:cNvPr>
+          <p:cNvSpPr/>
+          <p:nvPr/>
+        </p:nvSpPr>
+        <p:spPr>
+          <a:xfrm>
+            <a:off x="1652272" y="2196719"/>
+            <a:ext cx="720000" cy="720000"/>
+          </a:xfrm>
+          <a:prstGeom prst="ellipse">
+            <a:avLst/>
+          </a:prstGeom>
+          <a:noFill/>
+          <a:ln>
+            <a:solidFill>
+              <a:schemeClr val="tx2">
+                <a:lumMod val="75000"/>
+              </a:schemeClr>
+            </a:solidFill>
+          </a:ln>
+        </p:spPr>
+        <p:style>
+          <a:lnRef idx="2">
+            <a:schemeClr val="accent1">
+              <a:shade val="50000"/>
+            </a:schemeClr>
+          </a:lnRef>
+          <a:fillRef idx="1">
+            <a:schemeClr val="accent1"/>
+          </a:fillRef>
+          <a:effectRef idx="0">
+            <a:schemeClr val="accent1"/>
+          </a:effectRef>
+          <a:fontRef idx="minor">
+            <a:schemeClr val="lt1"/>
+          </a:fontRef>
+        </p:style>
+        <p:txBody>
+          <a:bodyPr rtlCol="0" anchor="ctr"/>
+          <a:lstStyle/>
+          <a:p>
+            <a:pPr algn="ctr"/>
+            <a:r>
+              <a:rPr lang="fr-FR" dirty="0">
+                <a:solidFill>
+                  <a:sysClr val="windowText" lastClr="000000"/>
+                </a:solidFill>
+              </a:rPr>
+              <a:t>B1</a:t>
+            </a:r>
+          </a:p>
+        </p:txBody>
+      </p:sp>
+      <p:sp>
+        <p:nvSpPr>
+          <p:cNvPr id="24" name="Ellipse 23">
+            <a:extLst>
+              <a:ext uri="{FF2B5EF4-FFF2-40B4-BE49-F238E27FC236}">
+                <a16:creationId xmlns:a16="http://schemas.microsoft.com/office/drawing/2014/main" id="{FFC39A81-124F-D7E8-7805-E6F85EE37A8F}"/>
+              </a:ext>
+            </a:extLst>
+          </p:cNvPr>
+          <p:cNvSpPr/>
+          <p:nvPr/>
+        </p:nvSpPr>
+        <p:spPr>
+          <a:xfrm>
+            <a:off x="3694136" y="2196719"/>
+            <a:ext cx="720000" cy="720000"/>
+          </a:xfrm>
+          <a:prstGeom prst="ellipse">
+            <a:avLst/>
+          </a:prstGeom>
+          <a:solidFill>
+            <a:schemeClr val="tx1"/>
+          </a:solidFill>
+          <a:ln>
+            <a:solidFill>
+              <a:schemeClr val="tx1"/>
+            </a:solidFill>
+          </a:ln>
+        </p:spPr>
+        <p:style>
+          <a:lnRef idx="2">
+            <a:schemeClr val="accent1">
+              <a:shade val="50000"/>
+            </a:schemeClr>
+          </a:lnRef>
+          <a:fillRef idx="1">
+            <a:schemeClr val="accent1"/>
+          </a:fillRef>
+          <a:effectRef idx="0">
+            <a:schemeClr val="accent1"/>
+          </a:effectRef>
+          <a:fontRef idx="minor">
+            <a:schemeClr val="lt1"/>
+          </a:fontRef>
+        </p:style>
+        <p:txBody>
+          <a:bodyPr rtlCol="0" anchor="ctr"/>
+          <a:lstStyle/>
+          <a:p>
+            <a:pPr algn="ctr"/>
+            <a:r>
+              <a:rPr lang="fr-FR" dirty="0">
+                <a:solidFill>
+                  <a:sysClr val="windowText" lastClr="000000"/>
+                </a:solidFill>
+              </a:rPr>
+              <a:t>B2</a:t>
+            </a:r>
+          </a:p>
+        </p:txBody>
+      </p:sp>
+      <p:sp>
+        <p:nvSpPr>
+          <p:cNvPr id="25" name="Ellipse 24">
+            <a:extLst>
+              <a:ext uri="{FF2B5EF4-FFF2-40B4-BE49-F238E27FC236}">
+                <a16:creationId xmlns:a16="http://schemas.microsoft.com/office/drawing/2014/main" id="{4E7F7429-0F85-72A3-54C1-7941674209FF}"/>
+              </a:ext>
+            </a:extLst>
+          </p:cNvPr>
+          <p:cNvSpPr/>
+          <p:nvPr/>
+        </p:nvSpPr>
+        <p:spPr>
+          <a:xfrm>
+            <a:off x="5736000" y="2196719"/>
+            <a:ext cx="720000" cy="720000"/>
+          </a:xfrm>
+          <a:prstGeom prst="ellipse">
+            <a:avLst/>
+          </a:prstGeom>
+          <a:solidFill>
+            <a:srgbClr val="00B050"/>
+          </a:solidFill>
+          <a:ln>
+            <a:solidFill>
+              <a:schemeClr val="tx2">
+                <a:lumMod val="75000"/>
+              </a:schemeClr>
+            </a:solidFill>
+          </a:ln>
+        </p:spPr>
+        <p:style>
+          <a:lnRef idx="2">
+            <a:schemeClr val="accent1">
+              <a:shade val="50000"/>
+            </a:schemeClr>
+          </a:lnRef>
+          <a:fillRef idx="1">
+            <a:schemeClr val="accent1"/>
+          </a:fillRef>
+          <a:effectRef idx="0">
+            <a:schemeClr val="accent1"/>
+          </a:effectRef>
+          <a:fontRef idx="minor">
+            <a:schemeClr val="lt1"/>
+          </a:fontRef>
+        </p:style>
+        <p:txBody>
+          <a:bodyPr rtlCol="0" anchor="ctr"/>
+          <a:lstStyle/>
+          <a:p>
+            <a:pPr algn="ctr"/>
+            <a:r>
+              <a:rPr lang="fr-FR" dirty="0">
+                <a:solidFill>
+                  <a:sysClr val="windowText" lastClr="000000"/>
+                </a:solidFill>
+              </a:rPr>
+              <a:t>B3</a:t>
+            </a:r>
+          </a:p>
+        </p:txBody>
+      </p:sp>
+      <p:cxnSp>
+        <p:nvCxnSpPr>
+          <p:cNvPr id="28" name="Connecteur droit avec flèche 27">
+            <a:extLst>
+              <a:ext uri="{FF2B5EF4-FFF2-40B4-BE49-F238E27FC236}">
+                <a16:creationId xmlns:a16="http://schemas.microsoft.com/office/drawing/2014/main" id="{0E2ABFD8-B3BA-28B8-916A-DF5327D9398C}"/>
+              </a:ext>
+            </a:extLst>
+          </p:cNvPr>
+          <p:cNvCxnSpPr>
+            <a:cxnSpLocks/>
+            <a:stCxn id="23" idx="6"/>
+            <a:endCxn id="24" idx="2"/>
+          </p:cNvCxnSpPr>
+          <p:nvPr/>
+        </p:nvCxnSpPr>
+        <p:spPr>
+          <a:xfrm>
+            <a:off x="2372272" y="2556719"/>
+            <a:ext cx="1321864" cy="0"/>
+          </a:xfrm>
+          <a:prstGeom prst="straightConnector1">
+            <a:avLst/>
+          </a:prstGeom>
+          <a:ln w="38100">
+            <a:solidFill>
+              <a:schemeClr val="tx2"/>
+            </a:solidFill>
+            <a:headEnd type="triangle"/>
+            <a:tailEnd type="triangle"/>
+          </a:ln>
+        </p:spPr>
+        <p:style>
+          <a:lnRef idx="1">
+            <a:schemeClr val="accent1"/>
+          </a:lnRef>
+          <a:fillRef idx="0">
+            <a:schemeClr val="accent1"/>
+          </a:fillRef>
+          <a:effectRef idx="0">
+            <a:schemeClr val="accent1"/>
+          </a:effectRef>
+          <a:fontRef idx="minor">
+            <a:schemeClr val="tx1"/>
+          </a:fontRef>
+        </p:style>
+      </p:cxnSp>
+      <p:cxnSp>
+        <p:nvCxnSpPr>
+          <p:cNvPr id="29" name="Connecteur droit avec flèche 28">
+            <a:extLst>
+              <a:ext uri="{FF2B5EF4-FFF2-40B4-BE49-F238E27FC236}">
+                <a16:creationId xmlns:a16="http://schemas.microsoft.com/office/drawing/2014/main" id="{9B31B06D-DBA3-352A-9677-8918A2268E15}"/>
+              </a:ext>
+            </a:extLst>
+          </p:cNvPr>
+          <p:cNvCxnSpPr>
+            <a:cxnSpLocks/>
+          </p:cNvCxnSpPr>
+          <p:nvPr/>
+        </p:nvCxnSpPr>
+        <p:spPr>
+          <a:xfrm>
+            <a:off x="4414136" y="2556719"/>
+            <a:ext cx="1321864" cy="0"/>
+          </a:xfrm>
+          <a:prstGeom prst="straightConnector1">
+            <a:avLst/>
+          </a:prstGeom>
+          <a:ln w="38100">
+            <a:solidFill>
+              <a:schemeClr val="tx2"/>
+            </a:solidFill>
+            <a:headEnd type="triangle"/>
+            <a:tailEnd type="triangle"/>
+          </a:ln>
+        </p:spPr>
+        <p:style>
+          <a:lnRef idx="1">
+            <a:schemeClr val="accent1"/>
+          </a:lnRef>
+          <a:fillRef idx="0">
+            <a:schemeClr val="accent1"/>
+          </a:fillRef>
+          <a:effectRef idx="0">
+            <a:schemeClr val="accent1"/>
+          </a:effectRef>
+          <a:fontRef idx="minor">
+            <a:schemeClr val="tx1"/>
+          </a:fontRef>
+        </p:style>
+      </p:cxnSp>
+      <p:sp>
+        <p:nvSpPr>
+          <p:cNvPr id="37" name="Ellipse 36">
+            <a:extLst>
+              <a:ext uri="{FF2B5EF4-FFF2-40B4-BE49-F238E27FC236}">
+                <a16:creationId xmlns:a16="http://schemas.microsoft.com/office/drawing/2014/main" id="{9F9A0F20-8E8E-C28A-C78A-182576160B07}"/>
+              </a:ext>
+            </a:extLst>
+          </p:cNvPr>
+          <p:cNvSpPr/>
+          <p:nvPr/>
+        </p:nvSpPr>
+        <p:spPr>
+          <a:xfrm>
+            <a:off x="1652272" y="3941282"/>
+            <a:ext cx="720000" cy="720000"/>
+          </a:xfrm>
+          <a:prstGeom prst="ellipse">
+            <a:avLst/>
+          </a:prstGeom>
+          <a:noFill/>
+          <a:ln>
+            <a:solidFill>
+              <a:schemeClr val="tx2">
+                <a:lumMod val="75000"/>
+              </a:schemeClr>
+            </a:solidFill>
+          </a:ln>
+        </p:spPr>
+        <p:style>
+          <a:lnRef idx="2">
+            <a:schemeClr val="accent1">
+              <a:shade val="50000"/>
+            </a:schemeClr>
+          </a:lnRef>
+          <a:fillRef idx="1">
+            <a:schemeClr val="accent1"/>
+          </a:fillRef>
+          <a:effectRef idx="0">
+            <a:schemeClr val="accent1"/>
+          </a:effectRef>
+          <a:fontRef idx="minor">
+            <a:schemeClr val="lt1"/>
+          </a:fontRef>
+        </p:style>
+        <p:txBody>
+          <a:bodyPr rtlCol="0" anchor="ctr"/>
+          <a:lstStyle/>
+          <a:p>
+            <a:pPr algn="ctr"/>
+            <a:r>
+              <a:rPr lang="fr-FR" dirty="0">
+                <a:solidFill>
+                  <a:sysClr val="windowText" lastClr="000000"/>
+                </a:solidFill>
+              </a:rPr>
+              <a:t>C1</a:t>
+            </a:r>
+          </a:p>
+        </p:txBody>
+      </p:sp>
+      <p:sp>
+        <p:nvSpPr>
+          <p:cNvPr id="38" name="Ellipse 37">
+            <a:extLst>
+              <a:ext uri="{FF2B5EF4-FFF2-40B4-BE49-F238E27FC236}">
+                <a16:creationId xmlns:a16="http://schemas.microsoft.com/office/drawing/2014/main" id="{8C0A4044-89AE-976E-E964-FED65C6DDF27}"/>
+              </a:ext>
+            </a:extLst>
+          </p:cNvPr>
+          <p:cNvSpPr/>
+          <p:nvPr/>
+        </p:nvSpPr>
+        <p:spPr>
+          <a:xfrm>
+            <a:off x="3694136" y="3941282"/>
+            <a:ext cx="720000" cy="720000"/>
+          </a:xfrm>
+          <a:prstGeom prst="ellipse">
+            <a:avLst/>
+          </a:prstGeom>
+          <a:solidFill>
+            <a:srgbClr val="FF0000"/>
+          </a:solidFill>
+          <a:ln>
+            <a:solidFill>
+              <a:schemeClr val="tx2">
+                <a:lumMod val="75000"/>
+              </a:schemeClr>
+            </a:solidFill>
+          </a:ln>
+        </p:spPr>
+        <p:style>
+          <a:lnRef idx="2">
+            <a:schemeClr val="accent1">
+              <a:shade val="50000"/>
+            </a:schemeClr>
+          </a:lnRef>
+          <a:fillRef idx="1">
+            <a:schemeClr val="accent1"/>
+          </a:fillRef>
+          <a:effectRef idx="0">
+            <a:schemeClr val="accent1"/>
+          </a:effectRef>
+          <a:fontRef idx="minor">
+            <a:schemeClr val="lt1"/>
+          </a:fontRef>
+        </p:style>
+        <p:txBody>
+          <a:bodyPr rtlCol="0" anchor="ctr"/>
+          <a:lstStyle/>
+          <a:p>
+            <a:pPr algn="ctr"/>
+            <a:r>
+              <a:rPr lang="fr-FR" dirty="0">
+                <a:solidFill>
+                  <a:sysClr val="windowText" lastClr="000000"/>
+                </a:solidFill>
+              </a:rPr>
+              <a:t>C2</a:t>
+            </a:r>
+          </a:p>
+        </p:txBody>
+      </p:sp>
+      <p:sp>
+        <p:nvSpPr>
+          <p:cNvPr id="39" name="Ellipse 38">
+            <a:extLst>
+              <a:ext uri="{FF2B5EF4-FFF2-40B4-BE49-F238E27FC236}">
+                <a16:creationId xmlns:a16="http://schemas.microsoft.com/office/drawing/2014/main" id="{61CD3BEB-E736-123C-09BC-28558081E8B9}"/>
+              </a:ext>
+            </a:extLst>
+          </p:cNvPr>
+          <p:cNvSpPr/>
+          <p:nvPr/>
+        </p:nvSpPr>
+        <p:spPr>
+          <a:xfrm>
+            <a:off x="5736000" y="3941282"/>
+            <a:ext cx="720000" cy="720000"/>
+          </a:xfrm>
+          <a:prstGeom prst="ellipse">
+            <a:avLst/>
+          </a:prstGeom>
+          <a:solidFill>
+            <a:schemeClr val="accent4">
+              <a:lumMod val="60000"/>
+              <a:lumOff val="40000"/>
+            </a:schemeClr>
+          </a:solidFill>
+          <a:ln>
+            <a:solidFill>
+              <a:schemeClr val="tx2">
+                <a:lumMod val="75000"/>
+              </a:schemeClr>
+            </a:solidFill>
+          </a:ln>
+        </p:spPr>
+        <p:style>
+          <a:lnRef idx="2">
+            <a:schemeClr val="accent1">
+              <a:shade val="50000"/>
+            </a:schemeClr>
+          </a:lnRef>
+          <a:fillRef idx="1">
+            <a:schemeClr val="accent1"/>
+          </a:fillRef>
+          <a:effectRef idx="0">
+            <a:schemeClr val="accent1"/>
+          </a:effectRef>
+          <a:fontRef idx="minor">
+            <a:schemeClr val="lt1"/>
+          </a:fontRef>
+        </p:style>
+        <p:txBody>
+          <a:bodyPr rtlCol="0" anchor="ctr"/>
+          <a:lstStyle/>
+          <a:p>
+            <a:pPr algn="ctr"/>
+            <a:r>
+              <a:rPr lang="fr-FR" dirty="0">
+                <a:solidFill>
+                  <a:sysClr val="windowText" lastClr="000000"/>
+                </a:solidFill>
+              </a:rPr>
+              <a:t>C3</a:t>
+            </a:r>
+          </a:p>
+        </p:txBody>
+      </p:sp>
+      <p:cxnSp>
+        <p:nvCxnSpPr>
+          <p:cNvPr id="42" name="Connecteur droit avec flèche 41">
+            <a:extLst>
+              <a:ext uri="{FF2B5EF4-FFF2-40B4-BE49-F238E27FC236}">
+                <a16:creationId xmlns:a16="http://schemas.microsoft.com/office/drawing/2014/main" id="{99343603-282A-1853-70B3-FF7DD93EBDF3}"/>
+              </a:ext>
+            </a:extLst>
+          </p:cNvPr>
+          <p:cNvCxnSpPr>
+            <a:cxnSpLocks/>
+            <a:stCxn id="37" idx="6"/>
+            <a:endCxn id="38" idx="2"/>
+          </p:cNvCxnSpPr>
+          <p:nvPr/>
+        </p:nvCxnSpPr>
+        <p:spPr>
+          <a:xfrm>
+            <a:off x="2372272" y="4301282"/>
+            <a:ext cx="1321864" cy="0"/>
+          </a:xfrm>
+          <a:prstGeom prst="straightConnector1">
+            <a:avLst/>
+          </a:prstGeom>
+          <a:ln w="38100">
+            <a:solidFill>
+              <a:schemeClr val="tx2"/>
+            </a:solidFill>
+            <a:headEnd type="triangle"/>
+            <a:tailEnd type="triangle"/>
+          </a:ln>
+        </p:spPr>
+        <p:style>
+          <a:lnRef idx="1">
+            <a:schemeClr val="accent1"/>
+          </a:lnRef>
+          <a:fillRef idx="0">
+            <a:schemeClr val="accent1"/>
+          </a:fillRef>
+          <a:effectRef idx="0">
+            <a:schemeClr val="accent1"/>
+          </a:effectRef>
+          <a:fontRef idx="minor">
+            <a:schemeClr val="tx1"/>
+          </a:fontRef>
+        </p:style>
+      </p:cxnSp>
+      <p:cxnSp>
+        <p:nvCxnSpPr>
+          <p:cNvPr id="43" name="Connecteur droit avec flèche 42">
+            <a:extLst>
+              <a:ext uri="{FF2B5EF4-FFF2-40B4-BE49-F238E27FC236}">
+                <a16:creationId xmlns:a16="http://schemas.microsoft.com/office/drawing/2014/main" id="{DD850A8B-03B6-3E3B-4252-8F02C69227DF}"/>
+              </a:ext>
+            </a:extLst>
+          </p:cNvPr>
+          <p:cNvCxnSpPr>
+            <a:cxnSpLocks/>
+          </p:cNvCxnSpPr>
+          <p:nvPr/>
+        </p:nvCxnSpPr>
+        <p:spPr>
+          <a:xfrm>
+            <a:off x="4414136" y="4301282"/>
+            <a:ext cx="1321864" cy="0"/>
+          </a:xfrm>
+          <a:prstGeom prst="straightConnector1">
+            <a:avLst/>
+          </a:prstGeom>
+          <a:ln w="38100">
+            <a:solidFill>
+              <a:schemeClr val="tx2"/>
+            </a:solidFill>
+            <a:headEnd type="triangle"/>
+            <a:tailEnd type="triangle"/>
+          </a:ln>
+        </p:spPr>
+        <p:style>
+          <a:lnRef idx="1">
+            <a:schemeClr val="accent1"/>
+          </a:lnRef>
+          <a:fillRef idx="0">
+            <a:schemeClr val="accent1"/>
+          </a:fillRef>
+          <a:effectRef idx="0">
+            <a:schemeClr val="accent1"/>
+          </a:effectRef>
+          <a:fontRef idx="minor">
+            <a:schemeClr val="tx1"/>
+          </a:fontRef>
+        </p:style>
+      </p:cxnSp>
+      <p:sp>
+        <p:nvSpPr>
+          <p:cNvPr id="56" name="ZoneTexte 55">
+            <a:extLst>
+              <a:ext uri="{FF2B5EF4-FFF2-40B4-BE49-F238E27FC236}">
+                <a16:creationId xmlns:a16="http://schemas.microsoft.com/office/drawing/2014/main" id="{CADC23E3-1581-13B9-4759-EEB2E0A8D767}"/>
+              </a:ext>
+            </a:extLst>
+          </p:cNvPr>
+          <p:cNvSpPr txBox="1"/>
+          <p:nvPr/>
+        </p:nvSpPr>
+        <p:spPr>
+          <a:xfrm>
+            <a:off x="1350586" y="301466"/>
+            <a:ext cx="301686" cy="369332"/>
+          </a:xfrm>
+          <a:prstGeom prst="rect">
+            <a:avLst/>
+          </a:prstGeom>
+          <a:noFill/>
+        </p:spPr>
+        <p:txBody>
+          <a:bodyPr wrap="none" rtlCol="0">
+            <a:spAutoFit/>
+          </a:bodyPr>
+          <a:lstStyle/>
+          <a:p>
+            <a:r>
+              <a:rPr lang="fr-FR" dirty="0"/>
+              <a:t>1</a:t>
+            </a:r>
+          </a:p>
+        </p:txBody>
+      </p:sp>
+      <p:sp>
+        <p:nvSpPr>
+          <p:cNvPr id="57" name="ZoneTexte 56">
+            <a:extLst>
+              <a:ext uri="{FF2B5EF4-FFF2-40B4-BE49-F238E27FC236}">
+                <a16:creationId xmlns:a16="http://schemas.microsoft.com/office/drawing/2014/main" id="{0B6FEFC7-4880-37AC-4830-82E48ACEE61B}"/>
+              </a:ext>
+            </a:extLst>
+          </p:cNvPr>
+          <p:cNvSpPr txBox="1"/>
+          <p:nvPr/>
+        </p:nvSpPr>
+        <p:spPr>
+          <a:xfrm>
+            <a:off x="3545185" y="301466"/>
+            <a:ext cx="301686" cy="369332"/>
+          </a:xfrm>
+          <a:prstGeom prst="rect">
+            <a:avLst/>
+          </a:prstGeom>
+          <a:noFill/>
+        </p:spPr>
+        <p:txBody>
+          <a:bodyPr wrap="none" rtlCol="0">
+            <a:spAutoFit/>
+          </a:bodyPr>
+          <a:lstStyle/>
+          <a:p>
+            <a:r>
+              <a:rPr lang="fr-FR" dirty="0"/>
+              <a:t>2</a:t>
+            </a:r>
+          </a:p>
+        </p:txBody>
+      </p:sp>
+      <p:sp>
+        <p:nvSpPr>
+          <p:cNvPr id="58" name="ZoneTexte 57">
+            <a:extLst>
+              <a:ext uri="{FF2B5EF4-FFF2-40B4-BE49-F238E27FC236}">
+                <a16:creationId xmlns:a16="http://schemas.microsoft.com/office/drawing/2014/main" id="{140B4DD7-0938-AB5B-67DA-059F4A3A3513}"/>
+              </a:ext>
+            </a:extLst>
+          </p:cNvPr>
+          <p:cNvSpPr txBox="1"/>
+          <p:nvPr/>
+        </p:nvSpPr>
+        <p:spPr>
+          <a:xfrm>
+            <a:off x="5585157" y="303789"/>
+            <a:ext cx="301686" cy="369332"/>
+          </a:xfrm>
+          <a:prstGeom prst="rect">
+            <a:avLst/>
+          </a:prstGeom>
+          <a:noFill/>
+        </p:spPr>
+        <p:txBody>
+          <a:bodyPr wrap="none" rtlCol="0">
+            <a:spAutoFit/>
+          </a:bodyPr>
+          <a:lstStyle/>
+          <a:p>
+            <a:r>
+              <a:rPr lang="fr-FR" dirty="0"/>
+              <a:t>1</a:t>
+            </a:r>
+          </a:p>
+        </p:txBody>
+      </p:sp>
+      <p:sp>
+        <p:nvSpPr>
+          <p:cNvPr id="59" name="ZoneTexte 58">
+            <a:extLst>
+              <a:ext uri="{FF2B5EF4-FFF2-40B4-BE49-F238E27FC236}">
+                <a16:creationId xmlns:a16="http://schemas.microsoft.com/office/drawing/2014/main" id="{A0388215-E918-69F7-7FD3-945B9AB88FE1}"/>
+              </a:ext>
+            </a:extLst>
+          </p:cNvPr>
+          <p:cNvSpPr txBox="1"/>
+          <p:nvPr/>
+        </p:nvSpPr>
+        <p:spPr>
+          <a:xfrm>
+            <a:off x="1350586" y="2012048"/>
+            <a:ext cx="301686" cy="369332"/>
+          </a:xfrm>
+          <a:prstGeom prst="rect">
+            <a:avLst/>
+          </a:prstGeom>
+          <a:noFill/>
+        </p:spPr>
+        <p:txBody>
+          <a:bodyPr wrap="none" rtlCol="0">
+            <a:spAutoFit/>
+          </a:bodyPr>
+          <a:lstStyle/>
+          <a:p>
+            <a:r>
+              <a:rPr lang="fr-FR" dirty="0"/>
+              <a:t>4</a:t>
+            </a:r>
+          </a:p>
+        </p:txBody>
+      </p:sp>
+      <p:sp>
+        <p:nvSpPr>
+          <p:cNvPr id="60" name="ZoneTexte 59">
+            <a:extLst>
+              <a:ext uri="{FF2B5EF4-FFF2-40B4-BE49-F238E27FC236}">
+                <a16:creationId xmlns:a16="http://schemas.microsoft.com/office/drawing/2014/main" id="{6CAFAFB8-E371-E3AE-A268-B94AF5C8D546}"/>
+              </a:ext>
+            </a:extLst>
+          </p:cNvPr>
+          <p:cNvSpPr txBox="1"/>
+          <p:nvPr/>
+        </p:nvSpPr>
+        <p:spPr>
+          <a:xfrm>
+            <a:off x="3359076" y="2016965"/>
+            <a:ext cx="372218" cy="369332"/>
+          </a:xfrm>
+          <a:prstGeom prst="rect">
+            <a:avLst/>
+          </a:prstGeom>
+          <a:noFill/>
+        </p:spPr>
+        <p:txBody>
+          <a:bodyPr wrap="none" rtlCol="0">
+            <a:spAutoFit/>
+          </a:bodyPr>
+          <a:lstStyle/>
+          <a:p>
+            <a:r>
+              <a:rPr lang="fr-FR" dirty="0"/>
+              <a:t>-1</a:t>
+            </a:r>
+          </a:p>
+        </p:txBody>
+      </p:sp>
+      <p:sp>
+        <p:nvSpPr>
+          <p:cNvPr id="61" name="ZoneTexte 60">
+            <a:extLst>
+              <a:ext uri="{FF2B5EF4-FFF2-40B4-BE49-F238E27FC236}">
+                <a16:creationId xmlns:a16="http://schemas.microsoft.com/office/drawing/2014/main" id="{7BEFB0BF-2AF6-4050-62FE-CEE8CBDBB8BA}"/>
+              </a:ext>
+            </a:extLst>
+          </p:cNvPr>
+          <p:cNvSpPr txBox="1"/>
+          <p:nvPr/>
+        </p:nvSpPr>
+        <p:spPr>
+          <a:xfrm>
+            <a:off x="5504006" y="2023703"/>
+            <a:ext cx="301686" cy="369332"/>
+          </a:xfrm>
+          <a:prstGeom prst="rect">
+            <a:avLst/>
+          </a:prstGeom>
+          <a:noFill/>
+        </p:spPr>
+        <p:txBody>
+          <a:bodyPr wrap="none" rtlCol="0">
+            <a:spAutoFit/>
+          </a:bodyPr>
+          <a:lstStyle/>
+          <a:p>
+            <a:r>
+              <a:rPr lang="fr-FR" dirty="0"/>
+              <a:t>2</a:t>
+            </a:r>
+          </a:p>
+        </p:txBody>
+      </p:sp>
+      <p:sp>
+        <p:nvSpPr>
+          <p:cNvPr id="62" name="ZoneTexte 61">
+            <a:extLst>
+              <a:ext uri="{FF2B5EF4-FFF2-40B4-BE49-F238E27FC236}">
+                <a16:creationId xmlns:a16="http://schemas.microsoft.com/office/drawing/2014/main" id="{5E4B48FA-CD5A-2D31-5273-97CE13DE319E}"/>
+              </a:ext>
+            </a:extLst>
+          </p:cNvPr>
+          <p:cNvSpPr txBox="1"/>
+          <p:nvPr/>
+        </p:nvSpPr>
+        <p:spPr>
+          <a:xfrm>
+            <a:off x="1273945" y="3756616"/>
+            <a:ext cx="301686" cy="369332"/>
+          </a:xfrm>
+          <a:prstGeom prst="rect">
+            <a:avLst/>
+          </a:prstGeom>
+          <a:noFill/>
+        </p:spPr>
+        <p:txBody>
+          <a:bodyPr wrap="none" rtlCol="0">
+            <a:spAutoFit/>
+          </a:bodyPr>
+          <a:lstStyle/>
+          <a:p>
+            <a:r>
+              <a:rPr lang="fr-FR" dirty="0"/>
+              <a:t>1</a:t>
+            </a:r>
+          </a:p>
+        </p:txBody>
+      </p:sp>
+      <p:sp>
+        <p:nvSpPr>
+          <p:cNvPr id="63" name="ZoneTexte 62">
+            <a:extLst>
+              <a:ext uri="{FF2B5EF4-FFF2-40B4-BE49-F238E27FC236}">
+                <a16:creationId xmlns:a16="http://schemas.microsoft.com/office/drawing/2014/main" id="{A5702BF8-55E1-8B1E-217F-EA900C1E78CD}"/>
+              </a:ext>
+            </a:extLst>
+          </p:cNvPr>
+          <p:cNvSpPr txBox="1"/>
+          <p:nvPr/>
+        </p:nvSpPr>
+        <p:spPr>
+          <a:xfrm>
+            <a:off x="3359076" y="3722635"/>
+            <a:ext cx="301686" cy="369332"/>
+          </a:xfrm>
+          <a:prstGeom prst="rect">
+            <a:avLst/>
+          </a:prstGeom>
+          <a:noFill/>
+        </p:spPr>
+        <p:txBody>
+          <a:bodyPr wrap="none" rtlCol="0">
+            <a:spAutoFit/>
+          </a:bodyPr>
+          <a:lstStyle/>
+          <a:p>
+            <a:r>
+              <a:rPr lang="fr-FR" dirty="0"/>
+              <a:t>4</a:t>
+            </a:r>
+          </a:p>
+        </p:txBody>
+      </p:sp>
+      <p:sp>
+        <p:nvSpPr>
+          <p:cNvPr id="64" name="ZoneTexte 63">
+            <a:extLst>
+              <a:ext uri="{FF2B5EF4-FFF2-40B4-BE49-F238E27FC236}">
+                <a16:creationId xmlns:a16="http://schemas.microsoft.com/office/drawing/2014/main" id="{C8E889EF-DF3D-0130-D086-428225DA93BB}"/>
+              </a:ext>
+            </a:extLst>
+          </p:cNvPr>
+          <p:cNvSpPr txBox="1"/>
+          <p:nvPr/>
+        </p:nvSpPr>
+        <p:spPr>
+          <a:xfrm>
+            <a:off x="5443173" y="3739630"/>
+            <a:ext cx="301686" cy="369332"/>
+          </a:xfrm>
+          <a:prstGeom prst="rect">
+            <a:avLst/>
+          </a:prstGeom>
+          <a:noFill/>
+        </p:spPr>
+        <p:txBody>
+          <a:bodyPr wrap="none" rtlCol="0">
+            <a:spAutoFit/>
+          </a:bodyPr>
+          <a:lstStyle/>
+          <a:p>
+            <a:r>
+              <a:rPr lang="fr-FR" dirty="0"/>
+              <a:t>3</a:t>
+            </a:r>
+          </a:p>
+        </p:txBody>
+      </p:sp>
+    </p:spTree>
+    <p:extLst>
+      <p:ext uri="{BB962C8B-B14F-4D97-AF65-F5344CB8AC3E}">
+        <p14:creationId xmlns:p14="http://schemas.microsoft.com/office/powerpoint/2010/main" val="1551584279"/>
+      </p:ext>
+    </p:extLst>
+  </p:cSld>
+  <p:clrMapOvr>
+    <a:masterClrMapping/>
+  </p:clrMapOvr>
+</p:sld>
+</file>
+
+<file path=ppt/slides/slide22.xml><?xml version="1.0" encoding="utf-8"?>
+<p:sld xmlns:a="http://schemas.openxmlformats.org/drawingml/2006/main" xmlns:r="http://schemas.openxmlformats.org/officeDocument/2006/relationships" xmlns:p="http://schemas.openxmlformats.org/presentationml/2006/main">
+  <p:cSld>
+    <p:spTree>
+      <p:nvGrpSpPr>
+        <p:cNvPr id="1" name=""/>
+        <p:cNvGrpSpPr/>
+        <p:nvPr/>
+      </p:nvGrpSpPr>
+      <p:grpSpPr>
+        <a:xfrm>
+          <a:off x="0" y="0"/>
+          <a:ext cx="0" cy="0"/>
+          <a:chOff x="0" y="0"/>
+          <a:chExt cx="0" cy="0"/>
+        </a:xfrm>
+      </p:grpSpPr>
+      <p:sp>
+        <p:nvSpPr>
+          <p:cNvPr id="4" name="Ellipse 3">
+            <a:extLst>
+              <a:ext uri="{FF2B5EF4-FFF2-40B4-BE49-F238E27FC236}">
+                <a16:creationId xmlns:a16="http://schemas.microsoft.com/office/drawing/2014/main" id="{69CDDE79-E932-D1D6-E898-B57BDC118D7D}"/>
+              </a:ext>
+            </a:extLst>
+          </p:cNvPr>
+          <p:cNvSpPr/>
+          <p:nvPr/>
+        </p:nvSpPr>
+        <p:spPr>
+          <a:xfrm>
+            <a:off x="5871899" y="898074"/>
+            <a:ext cx="720000" cy="720000"/>
+          </a:xfrm>
+          <a:prstGeom prst="ellipse">
+            <a:avLst/>
+          </a:prstGeom>
+          <a:solidFill>
+            <a:srgbClr val="FF0000"/>
+          </a:solidFill>
+          <a:ln>
+            <a:solidFill>
+              <a:schemeClr val="tx2">
+                <a:lumMod val="75000"/>
+              </a:schemeClr>
+            </a:solidFill>
+          </a:ln>
+        </p:spPr>
+        <p:style>
+          <a:lnRef idx="2">
+            <a:schemeClr val="accent1">
+              <a:shade val="50000"/>
+            </a:schemeClr>
+          </a:lnRef>
+          <a:fillRef idx="1">
+            <a:schemeClr val="accent1"/>
+          </a:fillRef>
+          <a:effectRef idx="0">
+            <a:schemeClr val="accent1"/>
+          </a:effectRef>
+          <a:fontRef idx="minor">
+            <a:schemeClr val="lt1"/>
+          </a:fontRef>
+        </p:style>
+        <p:txBody>
+          <a:bodyPr rtlCol="0" anchor="ctr"/>
+          <a:lstStyle/>
+          <a:p>
+            <a:pPr algn="ctr"/>
+            <a:r>
+              <a:rPr lang="fr-FR" dirty="0">
+                <a:solidFill>
+                  <a:sysClr val="windowText" lastClr="000000"/>
+                </a:solidFill>
+              </a:rPr>
+              <a:t>A1</a:t>
+            </a:r>
+          </a:p>
+        </p:txBody>
+      </p:sp>
+      <p:sp>
+        <p:nvSpPr>
+          <p:cNvPr id="5" name="Ellipse 4">
+            <a:extLst>
+              <a:ext uri="{FF2B5EF4-FFF2-40B4-BE49-F238E27FC236}">
+                <a16:creationId xmlns:a16="http://schemas.microsoft.com/office/drawing/2014/main" id="{40258625-ED67-21EF-88C4-CF1926A0A92E}"/>
+              </a:ext>
+            </a:extLst>
+          </p:cNvPr>
+          <p:cNvSpPr/>
+          <p:nvPr/>
+        </p:nvSpPr>
+        <p:spPr>
+          <a:xfrm>
+            <a:off x="4724888" y="4498074"/>
+            <a:ext cx="720000" cy="720000"/>
+          </a:xfrm>
+          <a:prstGeom prst="ellipse">
+            <a:avLst/>
+          </a:prstGeom>
+          <a:solidFill>
+            <a:srgbClr val="FFC000"/>
+          </a:solidFill>
+          <a:ln>
+            <a:solidFill>
+              <a:schemeClr val="tx2">
+                <a:lumMod val="75000"/>
+              </a:schemeClr>
+            </a:solidFill>
+          </a:ln>
+        </p:spPr>
+        <p:style>
+          <a:lnRef idx="2">
+            <a:schemeClr val="accent1">
+              <a:shade val="50000"/>
+            </a:schemeClr>
+          </a:lnRef>
+          <a:fillRef idx="1">
+            <a:schemeClr val="accent1"/>
+          </a:fillRef>
+          <a:effectRef idx="0">
+            <a:schemeClr val="accent1"/>
+          </a:effectRef>
+          <a:fontRef idx="minor">
+            <a:schemeClr val="lt1"/>
+          </a:fontRef>
+        </p:style>
+        <p:txBody>
+          <a:bodyPr rtlCol="0" anchor="ctr"/>
+          <a:lstStyle/>
+          <a:p>
+            <a:pPr algn="ctr"/>
+            <a:r>
+              <a:rPr lang="fr-FR" dirty="0">
+                <a:solidFill>
+                  <a:sysClr val="windowText" lastClr="000000"/>
+                </a:solidFill>
+              </a:rPr>
+              <a:t>C3</a:t>
+            </a:r>
+          </a:p>
+        </p:txBody>
+      </p:sp>
+      <p:sp>
+        <p:nvSpPr>
+          <p:cNvPr id="6" name="Ellipse 5">
+            <a:extLst>
+              <a:ext uri="{FF2B5EF4-FFF2-40B4-BE49-F238E27FC236}">
+                <a16:creationId xmlns:a16="http://schemas.microsoft.com/office/drawing/2014/main" id="{F088B2BB-AB0D-B3C7-1FB5-FB39DF0472E2}"/>
+              </a:ext>
+            </a:extLst>
+          </p:cNvPr>
+          <p:cNvSpPr/>
+          <p:nvPr/>
+        </p:nvSpPr>
+        <p:spPr>
+          <a:xfrm>
+            <a:off x="7018912" y="4498074"/>
+            <a:ext cx="720000" cy="720000"/>
+          </a:xfrm>
+          <a:prstGeom prst="ellipse">
+            <a:avLst/>
+          </a:prstGeom>
+          <a:solidFill>
+            <a:srgbClr val="FF0000"/>
+          </a:solidFill>
+          <a:ln>
+            <a:solidFill>
+              <a:schemeClr val="tx2">
+                <a:lumMod val="75000"/>
+              </a:schemeClr>
+            </a:solidFill>
+          </a:ln>
+        </p:spPr>
+        <p:style>
+          <a:lnRef idx="2">
+            <a:schemeClr val="accent1">
+              <a:shade val="50000"/>
+            </a:schemeClr>
+          </a:lnRef>
+          <a:fillRef idx="1">
+            <a:schemeClr val="accent1"/>
+          </a:fillRef>
+          <a:effectRef idx="0">
+            <a:schemeClr val="accent1"/>
+          </a:effectRef>
+          <a:fontRef idx="minor">
+            <a:schemeClr val="lt1"/>
+          </a:fontRef>
+        </p:style>
+        <p:txBody>
+          <a:bodyPr rtlCol="0" anchor="ctr"/>
+          <a:lstStyle/>
+          <a:p>
+            <a:pPr algn="ctr"/>
+            <a:r>
+              <a:rPr lang="fr-FR" dirty="0">
+                <a:solidFill>
+                  <a:sysClr val="windowText" lastClr="000000"/>
+                </a:solidFill>
+              </a:rPr>
+              <a:t>C2</a:t>
+            </a:r>
+          </a:p>
+        </p:txBody>
+      </p:sp>
+      <p:sp>
+        <p:nvSpPr>
+          <p:cNvPr id="7" name="Ellipse 6">
+            <a:extLst>
+              <a:ext uri="{FF2B5EF4-FFF2-40B4-BE49-F238E27FC236}">
+                <a16:creationId xmlns:a16="http://schemas.microsoft.com/office/drawing/2014/main" id="{A213DD66-DE60-E5D6-F2AF-4E5E28E9E0B1}"/>
+              </a:ext>
+            </a:extLst>
+          </p:cNvPr>
+          <p:cNvSpPr/>
+          <p:nvPr/>
+        </p:nvSpPr>
+        <p:spPr>
+          <a:xfrm>
+            <a:off x="7671899" y="2338074"/>
+            <a:ext cx="720000" cy="720000"/>
+          </a:xfrm>
+          <a:prstGeom prst="ellipse">
+            <a:avLst/>
+          </a:prstGeom>
+          <a:solidFill>
+            <a:srgbClr val="00B050"/>
+          </a:solidFill>
+          <a:ln>
+            <a:solidFill>
+              <a:schemeClr val="tx2">
+                <a:lumMod val="75000"/>
+              </a:schemeClr>
+            </a:solidFill>
+          </a:ln>
+        </p:spPr>
+        <p:style>
+          <a:lnRef idx="2">
+            <a:schemeClr val="accent1">
+              <a:shade val="50000"/>
+            </a:schemeClr>
+          </a:lnRef>
+          <a:fillRef idx="1">
+            <a:schemeClr val="accent1"/>
+          </a:fillRef>
+          <a:effectRef idx="0">
+            <a:schemeClr val="accent1"/>
+          </a:effectRef>
+          <a:fontRef idx="minor">
+            <a:schemeClr val="lt1"/>
+          </a:fontRef>
+        </p:style>
+        <p:txBody>
+          <a:bodyPr rtlCol="0" anchor="ctr"/>
+          <a:lstStyle/>
+          <a:p>
+            <a:pPr algn="ctr"/>
+            <a:r>
+              <a:rPr lang="fr-FR" dirty="0">
+                <a:solidFill>
+                  <a:sysClr val="windowText" lastClr="000000"/>
+                </a:solidFill>
+              </a:rPr>
+              <a:t>A2</a:t>
+            </a:r>
+          </a:p>
+        </p:txBody>
+      </p:sp>
+      <p:sp>
+        <p:nvSpPr>
+          <p:cNvPr id="8" name="Ellipse 7">
+            <a:extLst>
+              <a:ext uri="{FF2B5EF4-FFF2-40B4-BE49-F238E27FC236}">
+                <a16:creationId xmlns:a16="http://schemas.microsoft.com/office/drawing/2014/main" id="{9A9243F6-E50F-7D31-EC48-8A202E75D739}"/>
+              </a:ext>
+            </a:extLst>
+          </p:cNvPr>
+          <p:cNvSpPr/>
+          <p:nvPr/>
+        </p:nvSpPr>
+        <p:spPr>
+          <a:xfrm>
+            <a:off x="4071900" y="2338074"/>
+            <a:ext cx="720000" cy="720000"/>
+          </a:xfrm>
+          <a:prstGeom prst="ellipse">
+            <a:avLst/>
+          </a:prstGeom>
+          <a:solidFill>
+            <a:srgbClr val="00B050"/>
+          </a:solidFill>
+          <a:ln>
+            <a:solidFill>
+              <a:schemeClr val="tx2">
+                <a:lumMod val="75000"/>
+              </a:schemeClr>
+            </a:solidFill>
+          </a:ln>
+        </p:spPr>
+        <p:style>
+          <a:lnRef idx="2">
+            <a:schemeClr val="accent1">
+              <a:shade val="50000"/>
+            </a:schemeClr>
+          </a:lnRef>
+          <a:fillRef idx="1">
+            <a:schemeClr val="accent1"/>
+          </a:fillRef>
+          <a:effectRef idx="0">
+            <a:schemeClr val="accent1"/>
+          </a:effectRef>
+          <a:fontRef idx="minor">
+            <a:schemeClr val="lt1"/>
+          </a:fontRef>
+        </p:style>
+        <p:txBody>
+          <a:bodyPr rtlCol="0" anchor="ctr"/>
+          <a:lstStyle/>
+          <a:p>
+            <a:pPr algn="ctr"/>
+            <a:r>
+              <a:rPr lang="fr-FR" dirty="0">
+                <a:solidFill>
+                  <a:sysClr val="windowText" lastClr="000000"/>
+                </a:solidFill>
+              </a:rPr>
+              <a:t>B3</a:t>
+            </a:r>
+          </a:p>
+        </p:txBody>
+      </p:sp>
+      <p:cxnSp>
+        <p:nvCxnSpPr>
+          <p:cNvPr id="46" name="Connecteur droit avec flèche 45">
+            <a:extLst>
+              <a:ext uri="{FF2B5EF4-FFF2-40B4-BE49-F238E27FC236}">
+                <a16:creationId xmlns:a16="http://schemas.microsoft.com/office/drawing/2014/main" id="{CD5CE313-F57B-1421-83DF-59D2E47B20D0}"/>
+              </a:ext>
+            </a:extLst>
+          </p:cNvPr>
+          <p:cNvCxnSpPr>
+            <a:stCxn id="5" idx="6"/>
+            <a:endCxn id="6" idx="2"/>
+          </p:cNvCxnSpPr>
+          <p:nvPr/>
+        </p:nvCxnSpPr>
+        <p:spPr>
+          <a:xfrm>
+            <a:off x="5444888" y="4858074"/>
+            <a:ext cx="1574024" cy="0"/>
+          </a:xfrm>
+          <a:prstGeom prst="straightConnector1">
+            <a:avLst/>
+          </a:prstGeom>
+          <a:ln w="57150">
+            <a:solidFill>
+              <a:srgbClr val="7030A0"/>
+            </a:solidFill>
+            <a:tailEnd type="triangle"/>
+          </a:ln>
+        </p:spPr>
+        <p:style>
+          <a:lnRef idx="1">
+            <a:schemeClr val="accent1"/>
+          </a:lnRef>
+          <a:fillRef idx="0">
+            <a:schemeClr val="accent1"/>
+          </a:fillRef>
+          <a:effectRef idx="0">
+            <a:schemeClr val="accent1"/>
+          </a:effectRef>
+          <a:fontRef idx="minor">
+            <a:schemeClr val="tx1"/>
+          </a:fontRef>
+        </p:style>
+      </p:cxnSp>
+      <p:cxnSp>
+        <p:nvCxnSpPr>
+          <p:cNvPr id="47" name="Connecteur droit avec flèche 46">
+            <a:extLst>
+              <a:ext uri="{FF2B5EF4-FFF2-40B4-BE49-F238E27FC236}">
+                <a16:creationId xmlns:a16="http://schemas.microsoft.com/office/drawing/2014/main" id="{6F7D4A90-E966-3FE2-8792-5D0257198F46}"/>
+              </a:ext>
+            </a:extLst>
+          </p:cNvPr>
+          <p:cNvCxnSpPr>
+            <a:cxnSpLocks/>
+            <a:stCxn id="6" idx="1"/>
+            <a:endCxn id="8" idx="5"/>
+          </p:cNvCxnSpPr>
+          <p:nvPr/>
+        </p:nvCxnSpPr>
+        <p:spPr>
+          <a:xfrm flipH="1" flipV="1">
+            <a:off x="4686458" y="2952632"/>
+            <a:ext cx="2437896" cy="1650884"/>
+          </a:xfrm>
+          <a:prstGeom prst="straightConnector1">
+            <a:avLst/>
+          </a:prstGeom>
+          <a:ln w="57150">
+            <a:solidFill>
+              <a:srgbClr val="7030A0"/>
+            </a:solidFill>
+            <a:tailEnd type="triangle"/>
+          </a:ln>
+        </p:spPr>
+        <p:style>
+          <a:lnRef idx="1">
+            <a:schemeClr val="accent1"/>
+          </a:lnRef>
+          <a:fillRef idx="0">
+            <a:schemeClr val="accent1"/>
+          </a:fillRef>
+          <a:effectRef idx="0">
+            <a:schemeClr val="accent1"/>
+          </a:effectRef>
+          <a:fontRef idx="minor">
+            <a:schemeClr val="tx1"/>
+          </a:fontRef>
+        </p:style>
+      </p:cxnSp>
+      <p:cxnSp>
+        <p:nvCxnSpPr>
+          <p:cNvPr id="51" name="Connecteur droit avec flèche 50">
+            <a:extLst>
+              <a:ext uri="{FF2B5EF4-FFF2-40B4-BE49-F238E27FC236}">
+                <a16:creationId xmlns:a16="http://schemas.microsoft.com/office/drawing/2014/main" id="{45DB3A96-33AC-01EF-846D-C89264D3BEAD}"/>
+              </a:ext>
+            </a:extLst>
+          </p:cNvPr>
+          <p:cNvCxnSpPr>
+            <a:cxnSpLocks/>
+            <a:stCxn id="8" idx="0"/>
+            <a:endCxn id="4" idx="2"/>
+          </p:cNvCxnSpPr>
+          <p:nvPr/>
+        </p:nvCxnSpPr>
+        <p:spPr>
+          <a:xfrm flipV="1">
+            <a:off x="4431900" y="1258074"/>
+            <a:ext cx="1439999" cy="1080000"/>
+          </a:xfrm>
+          <a:prstGeom prst="straightConnector1">
+            <a:avLst/>
+          </a:prstGeom>
+          <a:ln w="57150">
+            <a:solidFill>
+              <a:srgbClr val="7030A0"/>
+            </a:solidFill>
+            <a:tailEnd type="triangle"/>
+          </a:ln>
+        </p:spPr>
+        <p:style>
+          <a:lnRef idx="1">
+            <a:schemeClr val="accent1"/>
+          </a:lnRef>
+          <a:fillRef idx="0">
+            <a:schemeClr val="accent1"/>
+          </a:fillRef>
+          <a:effectRef idx="0">
+            <a:schemeClr val="accent1"/>
+          </a:effectRef>
+          <a:fontRef idx="minor">
+            <a:schemeClr val="tx1"/>
+          </a:fontRef>
+        </p:style>
+      </p:cxnSp>
+    </p:spTree>
+    <p:extLst>
+      <p:ext uri="{BB962C8B-B14F-4D97-AF65-F5344CB8AC3E}">
+        <p14:creationId xmlns:p14="http://schemas.microsoft.com/office/powerpoint/2010/main" val="3996276189"/>
+      </p:ext>
+    </p:extLst>
+  </p:cSld>
+  <p:clrMapOvr>
+    <a:masterClrMapping/>
+  </p:clrMapOvr>
+</p:sld>
+</file>
+
+<file path=ppt/slides/slide23.xml><?xml version="1.0" encoding="utf-8"?>
+<p:sld xmlns:a="http://schemas.openxmlformats.org/drawingml/2006/main" xmlns:r="http://schemas.openxmlformats.org/officeDocument/2006/relationships" xmlns:p="http://schemas.openxmlformats.org/presentationml/2006/main">
+  <p:cSld>
+    <p:spTree>
+      <p:nvGrpSpPr>
+        <p:cNvPr id="1" name=""/>
+        <p:cNvGrpSpPr/>
+        <p:nvPr/>
+      </p:nvGrpSpPr>
+      <p:grpSpPr>
+        <a:xfrm>
+          <a:off x="0" y="0"/>
+          <a:ext cx="0" cy="0"/>
+          <a:chOff x="0" y="0"/>
+          <a:chExt cx="0" cy="0"/>
+        </a:xfrm>
+      </p:grpSpPr>
+      <p:sp>
+        <p:nvSpPr>
+          <p:cNvPr id="2" name="Titre 1">
+            <a:extLst>
+              <a:ext uri="{FF2B5EF4-FFF2-40B4-BE49-F238E27FC236}">
+                <a16:creationId xmlns:a16="http://schemas.microsoft.com/office/drawing/2014/main" id="{DF184F47-BB91-0EAB-C64D-679A88AD26B5}"/>
+              </a:ext>
+            </a:extLst>
+          </p:cNvPr>
+          <p:cNvSpPr>
+            <a:spLocks noGrp="1"/>
+          </p:cNvSpPr>
+          <p:nvPr>
+            <p:ph type="title"/>
+          </p:nvPr>
+        </p:nvSpPr>
+        <p:spPr/>
+        <p:txBody>
+          <a:bodyPr/>
+          <a:lstStyle/>
+          <a:p>
+            <a:endParaRPr lang="fr-FR"/>
+          </a:p>
+        </p:txBody>
+      </p:sp>
+      <p:sp>
+        <p:nvSpPr>
+          <p:cNvPr id="3" name="Espace réservé du contenu 2">
+            <a:extLst>
+              <a:ext uri="{FF2B5EF4-FFF2-40B4-BE49-F238E27FC236}">
+                <a16:creationId xmlns:a16="http://schemas.microsoft.com/office/drawing/2014/main" id="{A439B972-8765-6E0B-AC6E-DD23354B2FA2}"/>
+              </a:ext>
+            </a:extLst>
+          </p:cNvPr>
+          <p:cNvSpPr>
+            <a:spLocks noGrp="1"/>
+          </p:cNvSpPr>
+          <p:nvPr>
+            <p:ph idx="1"/>
+          </p:nvPr>
+        </p:nvSpPr>
+        <p:spPr/>
+        <p:txBody>
+          <a:bodyPr/>
+          <a:lstStyle/>
+          <a:p>
+            <a:endParaRPr lang="fr-FR"/>
+          </a:p>
+        </p:txBody>
+      </p:sp>
+    </p:spTree>
+    <p:extLst>
+      <p:ext uri="{BB962C8B-B14F-4D97-AF65-F5344CB8AC3E}">
+        <p14:creationId xmlns:p14="http://schemas.microsoft.com/office/powerpoint/2010/main" val="3304467552"/>
+      </p:ext>
+    </p:extLst>
+  </p:cSld>
+  <p:clrMapOvr>
+    <a:masterClrMapping/>
+  </p:clrMapOvr>
+</p:sld>
+</file>
+
 <file path=ppt/slides/slide3.xml><?xml version="1.0" encoding="utf-8"?>
 <p:sld xmlns:a="http://schemas.openxmlformats.org/drawingml/2006/main" xmlns:r="http://schemas.openxmlformats.org/officeDocument/2006/relationships" xmlns:p="http://schemas.openxmlformats.org/presentationml/2006/main">
   <p:cSld>

</xml_diff>